<commit_message>
add principle of testing
</commit_message>
<xml_diff>
--- a/Softwaretesting.pptx
+++ b/Softwaretesting.pptx
@@ -1,23 +1,118 @@
 
 <file path=ppt/presentation.xml><?xml version="1.0" encoding="utf-8"?>
-<p:presentation xmlns:a="http://schemas.openxmlformats.org/drawingml/2006/main" xmlns:p="http://schemas.openxmlformats.org/presentationml/2006/main" xmlns:r="http://schemas.openxmlformats.org/officeDocument/2006/relationships" xmlns:p14="http://schemas.microsoft.com/office/powerpoint/2010/main" xmlns:p15="http://schemas.microsoft.com/office/powerpoint/2012/main" xmlns:mc="http://schemas.openxmlformats.org/markup-compatibility/2006">
+<p:presentation xmlns:a="http://schemas.openxmlformats.org/drawingml/2006/main" xmlns:r="http://schemas.openxmlformats.org/officeDocument/2006/relationships" xmlns:p="http://schemas.openxmlformats.org/presentationml/2006/main">
   <p:sldMasterIdLst>
-    <p:sldMasterId id="2147483648" r:id="rId2"/>
-    <p:sldMasterId id="2147483661" r:id="rId3"/>
-    <p:sldMasterId id="2147483674" r:id="rId4"/>
+    <p:sldMasterId id="2147483648" r:id="rId1"/>
+    <p:sldMasterId id="2147483661" r:id="rId2"/>
+    <p:sldMasterId id="2147483674" r:id="rId3"/>
   </p:sldMasterIdLst>
   <p:sldIdLst>
-    <p:sldId id="256" r:id="rId5"/>
-    <p:sldId id="257" r:id="rId6"/>
-    <p:sldId id="258" r:id="rId7"/>
+    <p:sldId id="256" r:id="rId4"/>
+    <p:sldId id="257" r:id="rId5"/>
+    <p:sldId id="259" r:id="rId6"/>
   </p:sldIdLst>
   <p:sldSz cx="10080625" cy="7559675"/>
   <p:notesSz cx="7772400" cy="10058400"/>
+  <p:defaultTextStyle>
+    <a:defPPr>
+      <a:defRPr lang="zh-CN"/>
+    </a:defPPr>
+    <a:lvl1pPr marL="0" algn="l" defTabSz="914400" rtl="0" eaLnBrk="1" latinLnBrk="0" hangingPunct="1">
+      <a:defRPr sz="1800" kern="1200">
+        <a:solidFill>
+          <a:schemeClr val="tx1"/>
+        </a:solidFill>
+        <a:latin typeface="+mn-lt"/>
+        <a:ea typeface="+mn-ea"/>
+        <a:cs typeface="+mn-cs"/>
+      </a:defRPr>
+    </a:lvl1pPr>
+    <a:lvl2pPr marL="457200" algn="l" defTabSz="914400" rtl="0" eaLnBrk="1" latinLnBrk="0" hangingPunct="1">
+      <a:defRPr sz="1800" kern="1200">
+        <a:solidFill>
+          <a:schemeClr val="tx1"/>
+        </a:solidFill>
+        <a:latin typeface="+mn-lt"/>
+        <a:ea typeface="+mn-ea"/>
+        <a:cs typeface="+mn-cs"/>
+      </a:defRPr>
+    </a:lvl2pPr>
+    <a:lvl3pPr marL="914400" algn="l" defTabSz="914400" rtl="0" eaLnBrk="1" latinLnBrk="0" hangingPunct="1">
+      <a:defRPr sz="1800" kern="1200">
+        <a:solidFill>
+          <a:schemeClr val="tx1"/>
+        </a:solidFill>
+        <a:latin typeface="+mn-lt"/>
+        <a:ea typeface="+mn-ea"/>
+        <a:cs typeface="+mn-cs"/>
+      </a:defRPr>
+    </a:lvl3pPr>
+    <a:lvl4pPr marL="1371600" algn="l" defTabSz="914400" rtl="0" eaLnBrk="1" latinLnBrk="0" hangingPunct="1">
+      <a:defRPr sz="1800" kern="1200">
+        <a:solidFill>
+          <a:schemeClr val="tx1"/>
+        </a:solidFill>
+        <a:latin typeface="+mn-lt"/>
+        <a:ea typeface="+mn-ea"/>
+        <a:cs typeface="+mn-cs"/>
+      </a:defRPr>
+    </a:lvl4pPr>
+    <a:lvl5pPr marL="1828800" algn="l" defTabSz="914400" rtl="0" eaLnBrk="1" latinLnBrk="0" hangingPunct="1">
+      <a:defRPr sz="1800" kern="1200">
+        <a:solidFill>
+          <a:schemeClr val="tx1"/>
+        </a:solidFill>
+        <a:latin typeface="+mn-lt"/>
+        <a:ea typeface="+mn-ea"/>
+        <a:cs typeface="+mn-cs"/>
+      </a:defRPr>
+    </a:lvl5pPr>
+    <a:lvl6pPr marL="2286000" algn="l" defTabSz="914400" rtl="0" eaLnBrk="1" latinLnBrk="0" hangingPunct="1">
+      <a:defRPr sz="1800" kern="1200">
+        <a:solidFill>
+          <a:schemeClr val="tx1"/>
+        </a:solidFill>
+        <a:latin typeface="+mn-lt"/>
+        <a:ea typeface="+mn-ea"/>
+        <a:cs typeface="+mn-cs"/>
+      </a:defRPr>
+    </a:lvl6pPr>
+    <a:lvl7pPr marL="2743200" algn="l" defTabSz="914400" rtl="0" eaLnBrk="1" latinLnBrk="0" hangingPunct="1">
+      <a:defRPr sz="1800" kern="1200">
+        <a:solidFill>
+          <a:schemeClr val="tx1"/>
+        </a:solidFill>
+        <a:latin typeface="+mn-lt"/>
+        <a:ea typeface="+mn-ea"/>
+        <a:cs typeface="+mn-cs"/>
+      </a:defRPr>
+    </a:lvl7pPr>
+    <a:lvl8pPr marL="3200400" algn="l" defTabSz="914400" rtl="0" eaLnBrk="1" latinLnBrk="0" hangingPunct="1">
+      <a:defRPr sz="1800" kern="1200">
+        <a:solidFill>
+          <a:schemeClr val="tx1"/>
+        </a:solidFill>
+        <a:latin typeface="+mn-lt"/>
+        <a:ea typeface="+mn-ea"/>
+        <a:cs typeface="+mn-cs"/>
+      </a:defRPr>
+    </a:lvl8pPr>
+    <a:lvl9pPr marL="3657600" algn="l" defTabSz="914400" rtl="0" eaLnBrk="1" latinLnBrk="0" hangingPunct="1">
+      <a:defRPr sz="1800" kern="1200">
+        <a:solidFill>
+          <a:schemeClr val="tx1"/>
+        </a:solidFill>
+        <a:latin typeface="+mn-lt"/>
+        <a:ea typeface="+mn-ea"/>
+        <a:cs typeface="+mn-cs"/>
+      </a:defRPr>
+    </a:lvl9pPr>
+  </p:defaultTextStyle>
 </p:presentation>
 </file>
 
 <file path=ppt/slideLayouts/slideLayout1.xml><?xml version="1.0" encoding="utf-8"?>
-<p:sldLayout xmlns:a="http://schemas.openxmlformats.org/drawingml/2006/main" xmlns:p="http://schemas.openxmlformats.org/presentationml/2006/main" xmlns:r="http://schemas.openxmlformats.org/officeDocument/2006/relationships" xmlns:p14="http://schemas.microsoft.com/office/powerpoint/2010/main" xmlns:p15="http://schemas.microsoft.com/office/powerpoint/2012/main" xmlns:mc="http://schemas.openxmlformats.org/markup-compatibility/2006" type="blank" preserve="1">
+<p:sldLayout xmlns:a="http://schemas.openxmlformats.org/drawingml/2006/main" xmlns:r="http://schemas.openxmlformats.org/officeDocument/2006/relationships" xmlns:p="http://schemas.openxmlformats.org/presentationml/2006/main" type="blank" preserve="1">
   <p:cSld name="Blank Slide">
     <p:spTree>
       <p:nvGrpSpPr>
@@ -35,11 +130,14 @@
       </p:grpSpPr>
     </p:spTree>
   </p:cSld>
+  <p:clrMapOvr>
+    <a:masterClrMapping/>
+  </p:clrMapOvr>
 </p:sldLayout>
 </file>
 
 <file path=ppt/slideLayouts/slideLayout10.xml><?xml version="1.0" encoding="utf-8"?>
-<p:sldLayout xmlns:a="http://schemas.openxmlformats.org/drawingml/2006/main" xmlns:p="http://schemas.openxmlformats.org/presentationml/2006/main" xmlns:r="http://schemas.openxmlformats.org/officeDocument/2006/relationships" xmlns:p14="http://schemas.microsoft.com/office/powerpoint/2010/main" xmlns:p15="http://schemas.microsoft.com/office/powerpoint/2012/main" xmlns:mc="http://schemas.openxmlformats.org/markup-compatibility/2006" type="objOverTx" preserve="1">
+<p:sldLayout xmlns:a="http://schemas.openxmlformats.org/drawingml/2006/main" xmlns:r="http://schemas.openxmlformats.org/officeDocument/2006/relationships" xmlns:p="http://schemas.openxmlformats.org/presentationml/2006/main" type="objOverTx" preserve="1">
   <p:cSld name="Title, Content over Content">
     <p:spTree>
       <p:nvGrpSpPr>
@@ -75,10 +173,11 @@
           </a:prstGeom>
         </p:spPr>
         <p:txBody>
-          <a:bodyPr lIns="0" rIns="0" tIns="0" bIns="0" anchor="ctr"/>
+          <a:bodyPr lIns="0" tIns="0" rIns="0" bIns="0" anchor="ctr"/>
+          <a:lstStyle/>
           <a:p>
             <a:pPr algn="ctr"/>
-            <a:endParaRPr b="0" lang="en-US" sz="4400" spc="-1" strike="noStrike">
+            <a:endParaRPr lang="en-US" sz="4400" b="0" strike="noStrike" spc="-1">
               <a:latin typeface="Arial"/>
             </a:endParaRPr>
           </a:p>
@@ -104,11 +203,12 @@
           </a:prstGeom>
         </p:spPr>
         <p:txBody>
-          <a:bodyPr lIns="0" rIns="0" tIns="0" bIns="0">
-            <a:normAutofit/>
-          </a:bodyPr>
-          <a:p>
-            <a:endParaRPr b="0" lang="en-US" sz="3200" spc="-1" strike="noStrike">
+          <a:bodyPr lIns="0" tIns="0" rIns="0" bIns="0">
+            <a:normAutofit/>
+          </a:bodyPr>
+          <a:lstStyle/>
+          <a:p>
+            <a:endParaRPr lang="en-US" sz="3200" b="0" strike="noStrike" spc="-1">
               <a:latin typeface="Arial"/>
             </a:endParaRPr>
           </a:p>
@@ -134,11 +234,12 @@
           </a:prstGeom>
         </p:spPr>
         <p:txBody>
-          <a:bodyPr lIns="0" rIns="0" tIns="0" bIns="0">
-            <a:normAutofit/>
-          </a:bodyPr>
-          <a:p>
-            <a:endParaRPr b="0" lang="en-US" sz="3200" spc="-1" strike="noStrike">
+          <a:bodyPr lIns="0" tIns="0" rIns="0" bIns="0">
+            <a:normAutofit/>
+          </a:bodyPr>
+          <a:lstStyle/>
+          <a:p>
+            <a:endParaRPr lang="en-US" sz="3200" b="0" strike="noStrike" spc="-1">
               <a:latin typeface="Arial"/>
             </a:endParaRPr>
           </a:p>
@@ -146,11 +247,14 @@
       </p:sp>
     </p:spTree>
   </p:cSld>
+  <p:clrMapOvr>
+    <a:masterClrMapping/>
+  </p:clrMapOvr>
 </p:sldLayout>
 </file>
 
 <file path=ppt/slideLayouts/slideLayout11.xml><?xml version="1.0" encoding="utf-8"?>
-<p:sldLayout xmlns:a="http://schemas.openxmlformats.org/drawingml/2006/main" xmlns:p="http://schemas.openxmlformats.org/presentationml/2006/main" xmlns:r="http://schemas.openxmlformats.org/officeDocument/2006/relationships" xmlns:p14="http://schemas.microsoft.com/office/powerpoint/2010/main" xmlns:p15="http://schemas.microsoft.com/office/powerpoint/2012/main" xmlns:mc="http://schemas.openxmlformats.org/markup-compatibility/2006" type="fourObj" preserve="1">
+<p:sldLayout xmlns:a="http://schemas.openxmlformats.org/drawingml/2006/main" xmlns:r="http://schemas.openxmlformats.org/officeDocument/2006/relationships" xmlns:p="http://schemas.openxmlformats.org/presentationml/2006/main" type="fourObj" preserve="1">
   <p:cSld name="Title, 4 Content">
     <p:spTree>
       <p:nvGrpSpPr>
@@ -186,10 +290,11 @@
           </a:prstGeom>
         </p:spPr>
         <p:txBody>
-          <a:bodyPr lIns="0" rIns="0" tIns="0" bIns="0" anchor="ctr"/>
+          <a:bodyPr lIns="0" tIns="0" rIns="0" bIns="0" anchor="ctr"/>
+          <a:lstStyle/>
           <a:p>
             <a:pPr algn="ctr"/>
-            <a:endParaRPr b="0" lang="en-US" sz="4400" spc="-1" strike="noStrike">
+            <a:endParaRPr lang="en-US" sz="4400" b="0" strike="noStrike" spc="-1">
               <a:latin typeface="Arial"/>
             </a:endParaRPr>
           </a:p>
@@ -215,11 +320,12 @@
           </a:prstGeom>
         </p:spPr>
         <p:txBody>
-          <a:bodyPr lIns="0" rIns="0" tIns="0" bIns="0">
-            <a:normAutofit/>
-          </a:bodyPr>
-          <a:p>
-            <a:endParaRPr b="0" lang="en-US" sz="3200" spc="-1" strike="noStrike">
+          <a:bodyPr lIns="0" tIns="0" rIns="0" bIns="0">
+            <a:normAutofit/>
+          </a:bodyPr>
+          <a:lstStyle/>
+          <a:p>
+            <a:endParaRPr lang="en-US" sz="3200" b="0" strike="noStrike" spc="-1">
               <a:latin typeface="Arial"/>
             </a:endParaRPr>
           </a:p>
@@ -245,11 +351,12 @@
           </a:prstGeom>
         </p:spPr>
         <p:txBody>
-          <a:bodyPr lIns="0" rIns="0" tIns="0" bIns="0">
-            <a:normAutofit/>
-          </a:bodyPr>
-          <a:p>
-            <a:endParaRPr b="0" lang="en-US" sz="3200" spc="-1" strike="noStrike">
+          <a:bodyPr lIns="0" tIns="0" rIns="0" bIns="0">
+            <a:normAutofit/>
+          </a:bodyPr>
+          <a:lstStyle/>
+          <a:p>
+            <a:endParaRPr lang="en-US" sz="3200" b="0" strike="noStrike" spc="-1">
               <a:latin typeface="Arial"/>
             </a:endParaRPr>
           </a:p>
@@ -275,11 +382,12 @@
           </a:prstGeom>
         </p:spPr>
         <p:txBody>
-          <a:bodyPr lIns="0" rIns="0" tIns="0" bIns="0">
-            <a:normAutofit/>
-          </a:bodyPr>
-          <a:p>
-            <a:endParaRPr b="0" lang="en-US" sz="3200" spc="-1" strike="noStrike">
+          <a:bodyPr lIns="0" tIns="0" rIns="0" bIns="0">
+            <a:normAutofit/>
+          </a:bodyPr>
+          <a:lstStyle/>
+          <a:p>
+            <a:endParaRPr lang="en-US" sz="3200" b="0" strike="noStrike" spc="-1">
               <a:latin typeface="Arial"/>
             </a:endParaRPr>
           </a:p>
@@ -305,11 +413,12 @@
           </a:prstGeom>
         </p:spPr>
         <p:txBody>
-          <a:bodyPr lIns="0" rIns="0" tIns="0" bIns="0">
-            <a:normAutofit/>
-          </a:bodyPr>
-          <a:p>
-            <a:endParaRPr b="0" lang="en-US" sz="3200" spc="-1" strike="noStrike">
+          <a:bodyPr lIns="0" tIns="0" rIns="0" bIns="0">
+            <a:normAutofit/>
+          </a:bodyPr>
+          <a:lstStyle/>
+          <a:p>
+            <a:endParaRPr lang="en-US" sz="3200" b="0" strike="noStrike" spc="-1">
               <a:latin typeface="Arial"/>
             </a:endParaRPr>
           </a:p>
@@ -317,11 +426,14 @@
       </p:sp>
     </p:spTree>
   </p:cSld>
+  <p:clrMapOvr>
+    <a:masterClrMapping/>
+  </p:clrMapOvr>
 </p:sldLayout>
 </file>
 
 <file path=ppt/slideLayouts/slideLayout12.xml><?xml version="1.0" encoding="utf-8"?>
-<p:sldLayout xmlns:a="http://schemas.openxmlformats.org/drawingml/2006/main" xmlns:p="http://schemas.openxmlformats.org/presentationml/2006/main" xmlns:r="http://schemas.openxmlformats.org/officeDocument/2006/relationships" xmlns:p14="http://schemas.microsoft.com/office/powerpoint/2010/main" xmlns:p15="http://schemas.microsoft.com/office/powerpoint/2012/main" xmlns:mc="http://schemas.openxmlformats.org/markup-compatibility/2006" type="blank" preserve="1">
+<p:sldLayout xmlns:a="http://schemas.openxmlformats.org/drawingml/2006/main" xmlns:r="http://schemas.openxmlformats.org/officeDocument/2006/relationships" xmlns:p="http://schemas.openxmlformats.org/presentationml/2006/main" type="blank" preserve="1">
   <p:cSld name="Title, 6 Content">
     <p:spTree>
       <p:nvGrpSpPr>
@@ -357,10 +469,11 @@
           </a:prstGeom>
         </p:spPr>
         <p:txBody>
-          <a:bodyPr lIns="0" rIns="0" tIns="0" bIns="0" anchor="ctr"/>
+          <a:bodyPr lIns="0" tIns="0" rIns="0" bIns="0" anchor="ctr"/>
+          <a:lstStyle/>
           <a:p>
             <a:pPr algn="ctr"/>
-            <a:endParaRPr b="0" lang="en-US" sz="4400" spc="-1" strike="noStrike">
+            <a:endParaRPr lang="en-US" sz="4400" b="0" strike="noStrike" spc="-1">
               <a:latin typeface="Arial"/>
             </a:endParaRPr>
           </a:p>
@@ -386,11 +499,12 @@
           </a:prstGeom>
         </p:spPr>
         <p:txBody>
-          <a:bodyPr lIns="0" rIns="0" tIns="0" bIns="0">
-            <a:normAutofit/>
-          </a:bodyPr>
-          <a:p>
-            <a:endParaRPr b="0" lang="en-US" sz="3200" spc="-1" strike="noStrike">
+          <a:bodyPr lIns="0" tIns="0" rIns="0" bIns="0">
+            <a:normAutofit/>
+          </a:bodyPr>
+          <a:lstStyle/>
+          <a:p>
+            <a:endParaRPr lang="en-US" sz="3200" b="0" strike="noStrike" spc="-1">
               <a:latin typeface="Arial"/>
             </a:endParaRPr>
           </a:p>
@@ -416,11 +530,12 @@
           </a:prstGeom>
         </p:spPr>
         <p:txBody>
-          <a:bodyPr lIns="0" rIns="0" tIns="0" bIns="0">
-            <a:normAutofit/>
-          </a:bodyPr>
-          <a:p>
-            <a:endParaRPr b="0" lang="en-US" sz="3200" spc="-1" strike="noStrike">
+          <a:bodyPr lIns="0" tIns="0" rIns="0" bIns="0">
+            <a:normAutofit/>
+          </a:bodyPr>
+          <a:lstStyle/>
+          <a:p>
+            <a:endParaRPr lang="en-US" sz="3200" b="0" strike="noStrike" spc="-1">
               <a:latin typeface="Arial"/>
             </a:endParaRPr>
           </a:p>
@@ -446,11 +561,12 @@
           </a:prstGeom>
         </p:spPr>
         <p:txBody>
-          <a:bodyPr lIns="0" rIns="0" tIns="0" bIns="0">
-            <a:normAutofit/>
-          </a:bodyPr>
-          <a:p>
-            <a:endParaRPr b="0" lang="en-US" sz="3200" spc="-1" strike="noStrike">
+          <a:bodyPr lIns="0" tIns="0" rIns="0" bIns="0">
+            <a:normAutofit/>
+          </a:bodyPr>
+          <a:lstStyle/>
+          <a:p>
+            <a:endParaRPr lang="en-US" sz="3200" b="0" strike="noStrike" spc="-1">
               <a:latin typeface="Arial"/>
             </a:endParaRPr>
           </a:p>
@@ -476,11 +592,12 @@
           </a:prstGeom>
         </p:spPr>
         <p:txBody>
-          <a:bodyPr lIns="0" rIns="0" tIns="0" bIns="0">
-            <a:normAutofit/>
-          </a:bodyPr>
-          <a:p>
-            <a:endParaRPr b="0" lang="en-US" sz="3200" spc="-1" strike="noStrike">
+          <a:bodyPr lIns="0" tIns="0" rIns="0" bIns="0">
+            <a:normAutofit/>
+          </a:bodyPr>
+          <a:lstStyle/>
+          <a:p>
+            <a:endParaRPr lang="en-US" sz="3200" b="0" strike="noStrike" spc="-1">
               <a:latin typeface="Arial"/>
             </a:endParaRPr>
           </a:p>
@@ -506,11 +623,12 @@
           </a:prstGeom>
         </p:spPr>
         <p:txBody>
-          <a:bodyPr lIns="0" rIns="0" tIns="0" bIns="0">
-            <a:normAutofit/>
-          </a:bodyPr>
-          <a:p>
-            <a:endParaRPr b="0" lang="en-US" sz="3200" spc="-1" strike="noStrike">
+          <a:bodyPr lIns="0" tIns="0" rIns="0" bIns="0">
+            <a:normAutofit/>
+          </a:bodyPr>
+          <a:lstStyle/>
+          <a:p>
+            <a:endParaRPr lang="en-US" sz="3200" b="0" strike="noStrike" spc="-1">
               <a:latin typeface="Arial"/>
             </a:endParaRPr>
           </a:p>
@@ -536,11 +654,12 @@
           </a:prstGeom>
         </p:spPr>
         <p:txBody>
-          <a:bodyPr lIns="0" rIns="0" tIns="0" bIns="0">
-            <a:normAutofit/>
-          </a:bodyPr>
-          <a:p>
-            <a:endParaRPr b="0" lang="en-US" sz="3200" spc="-1" strike="noStrike">
+          <a:bodyPr lIns="0" tIns="0" rIns="0" bIns="0">
+            <a:normAutofit/>
+          </a:bodyPr>
+          <a:lstStyle/>
+          <a:p>
+            <a:endParaRPr lang="en-US" sz="3200" b="0" strike="noStrike" spc="-1">
               <a:latin typeface="Arial"/>
             </a:endParaRPr>
           </a:p>
@@ -548,11 +667,14 @@
       </p:sp>
     </p:spTree>
   </p:cSld>
+  <p:clrMapOvr>
+    <a:masterClrMapping/>
+  </p:clrMapOvr>
 </p:sldLayout>
 </file>
 
 <file path=ppt/slideLayouts/slideLayout13.xml><?xml version="1.0" encoding="utf-8"?>
-<p:sldLayout xmlns:a="http://schemas.openxmlformats.org/drawingml/2006/main" xmlns:p="http://schemas.openxmlformats.org/presentationml/2006/main" xmlns:r="http://schemas.openxmlformats.org/officeDocument/2006/relationships" xmlns:p14="http://schemas.microsoft.com/office/powerpoint/2010/main" xmlns:p15="http://schemas.microsoft.com/office/powerpoint/2012/main" xmlns:mc="http://schemas.openxmlformats.org/markup-compatibility/2006" type="blank" preserve="1">
+<p:sldLayout xmlns:a="http://schemas.openxmlformats.org/drawingml/2006/main" xmlns:r="http://schemas.openxmlformats.org/officeDocument/2006/relationships" xmlns:p="http://schemas.openxmlformats.org/presentationml/2006/main" type="blank" preserve="1">
   <p:cSld name="Blank Slide">
     <p:spTree>
       <p:nvGrpSpPr>
@@ -570,11 +692,14 @@
       </p:grpSpPr>
     </p:spTree>
   </p:cSld>
+  <p:clrMapOvr>
+    <a:masterClrMapping/>
+  </p:clrMapOvr>
 </p:sldLayout>
 </file>
 
 <file path=ppt/slideLayouts/slideLayout14.xml><?xml version="1.0" encoding="utf-8"?>
-<p:sldLayout xmlns:a="http://schemas.openxmlformats.org/drawingml/2006/main" xmlns:p="http://schemas.openxmlformats.org/presentationml/2006/main" xmlns:r="http://schemas.openxmlformats.org/officeDocument/2006/relationships" xmlns:p14="http://schemas.microsoft.com/office/powerpoint/2010/main" xmlns:p15="http://schemas.microsoft.com/office/powerpoint/2012/main" xmlns:mc="http://schemas.openxmlformats.org/markup-compatibility/2006" type="tx" preserve="1">
+<p:sldLayout xmlns:a="http://schemas.openxmlformats.org/drawingml/2006/main" xmlns:r="http://schemas.openxmlformats.org/officeDocument/2006/relationships" xmlns:p="http://schemas.openxmlformats.org/presentationml/2006/main" type="tx" preserve="1">
   <p:cSld name="Title Slide">
     <p:spTree>
       <p:nvGrpSpPr>
@@ -610,10 +735,11 @@
           </a:prstGeom>
         </p:spPr>
         <p:txBody>
-          <a:bodyPr lIns="0" rIns="0" tIns="0" bIns="0" anchor="ctr"/>
+          <a:bodyPr lIns="0" tIns="0" rIns="0" bIns="0" anchor="ctr"/>
+          <a:lstStyle/>
           <a:p>
             <a:pPr algn="ctr"/>
-            <a:endParaRPr b="0" lang="en-US" sz="4400" spc="-1" strike="noStrike">
+            <a:endParaRPr lang="en-US" sz="4400" b="0" strike="noStrike" spc="-1">
               <a:latin typeface="Arial"/>
             </a:endParaRPr>
           </a:p>
@@ -639,10 +765,11 @@
           </a:prstGeom>
         </p:spPr>
         <p:txBody>
-          <a:bodyPr lIns="0" rIns="0" tIns="0" bIns="0" anchor="ctr"/>
+          <a:bodyPr lIns="0" tIns="0" rIns="0" bIns="0" anchor="ctr"/>
+          <a:lstStyle/>
           <a:p>
             <a:pPr algn="ctr"/>
-            <a:endParaRPr b="0" lang="en-US" sz="3200" spc="-1" strike="noStrike">
+            <a:endParaRPr lang="en-US" sz="3200" b="0" strike="noStrike" spc="-1">
               <a:latin typeface="Arial"/>
             </a:endParaRPr>
           </a:p>
@@ -650,11 +777,14 @@
       </p:sp>
     </p:spTree>
   </p:cSld>
+  <p:clrMapOvr>
+    <a:masterClrMapping/>
+  </p:clrMapOvr>
 </p:sldLayout>
 </file>
 
 <file path=ppt/slideLayouts/slideLayout15.xml><?xml version="1.0" encoding="utf-8"?>
-<p:sldLayout xmlns:a="http://schemas.openxmlformats.org/drawingml/2006/main" xmlns:p="http://schemas.openxmlformats.org/presentationml/2006/main" xmlns:r="http://schemas.openxmlformats.org/officeDocument/2006/relationships" xmlns:p14="http://schemas.microsoft.com/office/powerpoint/2010/main" xmlns:p15="http://schemas.microsoft.com/office/powerpoint/2012/main" xmlns:mc="http://schemas.openxmlformats.org/markup-compatibility/2006" type="obj" preserve="1">
+<p:sldLayout xmlns:a="http://schemas.openxmlformats.org/drawingml/2006/main" xmlns:r="http://schemas.openxmlformats.org/officeDocument/2006/relationships" xmlns:p="http://schemas.openxmlformats.org/presentationml/2006/main" type="obj" preserve="1">
   <p:cSld name="Title, Content">
     <p:spTree>
       <p:nvGrpSpPr>
@@ -690,10 +820,11 @@
           </a:prstGeom>
         </p:spPr>
         <p:txBody>
-          <a:bodyPr lIns="0" rIns="0" tIns="0" bIns="0" anchor="ctr"/>
+          <a:bodyPr lIns="0" tIns="0" rIns="0" bIns="0" anchor="ctr"/>
+          <a:lstStyle/>
           <a:p>
             <a:pPr algn="ctr"/>
-            <a:endParaRPr b="0" lang="en-US" sz="4400" spc="-1" strike="noStrike">
+            <a:endParaRPr lang="en-US" sz="4400" b="0" strike="noStrike" spc="-1">
               <a:latin typeface="Arial"/>
             </a:endParaRPr>
           </a:p>
@@ -719,11 +850,12 @@
           </a:prstGeom>
         </p:spPr>
         <p:txBody>
-          <a:bodyPr lIns="0" rIns="0" tIns="0" bIns="0">
-            <a:normAutofit/>
-          </a:bodyPr>
-          <a:p>
-            <a:endParaRPr b="0" lang="en-US" sz="3200" spc="-1" strike="noStrike">
+          <a:bodyPr lIns="0" tIns="0" rIns="0" bIns="0">
+            <a:normAutofit/>
+          </a:bodyPr>
+          <a:lstStyle/>
+          <a:p>
+            <a:endParaRPr lang="en-US" sz="3200" b="0" strike="noStrike" spc="-1">
               <a:latin typeface="Arial"/>
             </a:endParaRPr>
           </a:p>
@@ -731,11 +863,14 @@
       </p:sp>
     </p:spTree>
   </p:cSld>
+  <p:clrMapOvr>
+    <a:masterClrMapping/>
+  </p:clrMapOvr>
 </p:sldLayout>
 </file>
 
 <file path=ppt/slideLayouts/slideLayout16.xml><?xml version="1.0" encoding="utf-8"?>
-<p:sldLayout xmlns:a="http://schemas.openxmlformats.org/drawingml/2006/main" xmlns:p="http://schemas.openxmlformats.org/presentationml/2006/main" xmlns:r="http://schemas.openxmlformats.org/officeDocument/2006/relationships" xmlns:p14="http://schemas.microsoft.com/office/powerpoint/2010/main" xmlns:p15="http://schemas.microsoft.com/office/powerpoint/2012/main" xmlns:mc="http://schemas.openxmlformats.org/markup-compatibility/2006" type="twoObj" preserve="1">
+<p:sldLayout xmlns:a="http://schemas.openxmlformats.org/drawingml/2006/main" xmlns:r="http://schemas.openxmlformats.org/officeDocument/2006/relationships" xmlns:p="http://schemas.openxmlformats.org/presentationml/2006/main" type="twoObj" preserve="1">
   <p:cSld name="Title, 2 Content">
     <p:spTree>
       <p:nvGrpSpPr>
@@ -771,10 +906,11 @@
           </a:prstGeom>
         </p:spPr>
         <p:txBody>
-          <a:bodyPr lIns="0" rIns="0" tIns="0" bIns="0" anchor="ctr"/>
+          <a:bodyPr lIns="0" tIns="0" rIns="0" bIns="0" anchor="ctr"/>
+          <a:lstStyle/>
           <a:p>
             <a:pPr algn="ctr"/>
-            <a:endParaRPr b="0" lang="en-US" sz="4400" spc="-1" strike="noStrike">
+            <a:endParaRPr lang="en-US" sz="4400" b="0" strike="noStrike" spc="-1">
               <a:latin typeface="Arial"/>
             </a:endParaRPr>
           </a:p>
@@ -800,11 +936,12 @@
           </a:prstGeom>
         </p:spPr>
         <p:txBody>
-          <a:bodyPr lIns="0" rIns="0" tIns="0" bIns="0">
-            <a:normAutofit/>
-          </a:bodyPr>
-          <a:p>
-            <a:endParaRPr b="0" lang="en-US" sz="3200" spc="-1" strike="noStrike">
+          <a:bodyPr lIns="0" tIns="0" rIns="0" bIns="0">
+            <a:normAutofit/>
+          </a:bodyPr>
+          <a:lstStyle/>
+          <a:p>
+            <a:endParaRPr lang="en-US" sz="3200" b="0" strike="noStrike" spc="-1">
               <a:latin typeface="Arial"/>
             </a:endParaRPr>
           </a:p>
@@ -830,11 +967,12 @@
           </a:prstGeom>
         </p:spPr>
         <p:txBody>
-          <a:bodyPr lIns="0" rIns="0" tIns="0" bIns="0">
-            <a:normAutofit/>
-          </a:bodyPr>
-          <a:p>
-            <a:endParaRPr b="0" lang="en-US" sz="3200" spc="-1" strike="noStrike">
+          <a:bodyPr lIns="0" tIns="0" rIns="0" bIns="0">
+            <a:normAutofit/>
+          </a:bodyPr>
+          <a:lstStyle/>
+          <a:p>
+            <a:endParaRPr lang="en-US" sz="3200" b="0" strike="noStrike" spc="-1">
               <a:latin typeface="Arial"/>
             </a:endParaRPr>
           </a:p>
@@ -842,11 +980,14 @@
       </p:sp>
     </p:spTree>
   </p:cSld>
+  <p:clrMapOvr>
+    <a:masterClrMapping/>
+  </p:clrMapOvr>
 </p:sldLayout>
 </file>
 
 <file path=ppt/slideLayouts/slideLayout17.xml><?xml version="1.0" encoding="utf-8"?>
-<p:sldLayout xmlns:a="http://schemas.openxmlformats.org/drawingml/2006/main" xmlns:p="http://schemas.openxmlformats.org/presentationml/2006/main" xmlns:r="http://schemas.openxmlformats.org/officeDocument/2006/relationships" xmlns:p14="http://schemas.microsoft.com/office/powerpoint/2010/main" xmlns:p15="http://schemas.microsoft.com/office/powerpoint/2012/main" xmlns:mc="http://schemas.openxmlformats.org/markup-compatibility/2006" type="titleOnly" preserve="1">
+<p:sldLayout xmlns:a="http://schemas.openxmlformats.org/drawingml/2006/main" xmlns:r="http://schemas.openxmlformats.org/officeDocument/2006/relationships" xmlns:p="http://schemas.openxmlformats.org/presentationml/2006/main" type="titleOnly" preserve="1">
   <p:cSld name="Title Only">
     <p:spTree>
       <p:nvGrpSpPr>
@@ -882,10 +1023,11 @@
           </a:prstGeom>
         </p:spPr>
         <p:txBody>
-          <a:bodyPr lIns="0" rIns="0" tIns="0" bIns="0" anchor="ctr"/>
+          <a:bodyPr lIns="0" tIns="0" rIns="0" bIns="0" anchor="ctr"/>
+          <a:lstStyle/>
           <a:p>
             <a:pPr algn="ctr"/>
-            <a:endParaRPr b="0" lang="en-US" sz="4400" spc="-1" strike="noStrike">
+            <a:endParaRPr lang="en-US" sz="4400" b="0" strike="noStrike" spc="-1">
               <a:latin typeface="Arial"/>
             </a:endParaRPr>
           </a:p>
@@ -893,11 +1035,14 @@
       </p:sp>
     </p:spTree>
   </p:cSld>
+  <p:clrMapOvr>
+    <a:masterClrMapping/>
+  </p:clrMapOvr>
 </p:sldLayout>
 </file>
 
 <file path=ppt/slideLayouts/slideLayout18.xml><?xml version="1.0" encoding="utf-8"?>
-<p:sldLayout xmlns:a="http://schemas.openxmlformats.org/drawingml/2006/main" xmlns:p="http://schemas.openxmlformats.org/presentationml/2006/main" xmlns:r="http://schemas.openxmlformats.org/officeDocument/2006/relationships" xmlns:p14="http://schemas.microsoft.com/office/powerpoint/2010/main" xmlns:p15="http://schemas.microsoft.com/office/powerpoint/2012/main" xmlns:mc="http://schemas.openxmlformats.org/markup-compatibility/2006" type="objOnly" preserve="1">
+<p:sldLayout xmlns:a="http://schemas.openxmlformats.org/drawingml/2006/main" xmlns:r="http://schemas.openxmlformats.org/officeDocument/2006/relationships" xmlns:p="http://schemas.openxmlformats.org/presentationml/2006/main" type="objOnly" preserve="1">
   <p:cSld name="Centered Text">
     <p:spTree>
       <p:nvGrpSpPr>
@@ -933,10 +1078,11 @@
           </a:prstGeom>
         </p:spPr>
         <p:txBody>
-          <a:bodyPr lIns="0" rIns="0" tIns="0" bIns="0" anchor="ctr"/>
+          <a:bodyPr lIns="0" tIns="0" rIns="0" bIns="0" anchor="ctr"/>
+          <a:lstStyle/>
           <a:p>
             <a:pPr algn="ctr"/>
-            <a:endParaRPr b="0" lang="en-US" sz="3200" spc="-1" strike="noStrike">
+            <a:endParaRPr lang="en-US" sz="3200" b="0" strike="noStrike" spc="-1">
               <a:latin typeface="Arial"/>
             </a:endParaRPr>
           </a:p>
@@ -944,11 +1090,14 @@
       </p:sp>
     </p:spTree>
   </p:cSld>
+  <p:clrMapOvr>
+    <a:masterClrMapping/>
+  </p:clrMapOvr>
 </p:sldLayout>
 </file>
 
 <file path=ppt/slideLayouts/slideLayout19.xml><?xml version="1.0" encoding="utf-8"?>
-<p:sldLayout xmlns:a="http://schemas.openxmlformats.org/drawingml/2006/main" xmlns:p="http://schemas.openxmlformats.org/presentationml/2006/main" xmlns:r="http://schemas.openxmlformats.org/officeDocument/2006/relationships" xmlns:p14="http://schemas.microsoft.com/office/powerpoint/2010/main" xmlns:p15="http://schemas.microsoft.com/office/powerpoint/2012/main" xmlns:mc="http://schemas.openxmlformats.org/markup-compatibility/2006" type="twoObjAndObj" preserve="1">
+<p:sldLayout xmlns:a="http://schemas.openxmlformats.org/drawingml/2006/main" xmlns:r="http://schemas.openxmlformats.org/officeDocument/2006/relationships" xmlns:p="http://schemas.openxmlformats.org/presentationml/2006/main" type="twoObjAndObj" preserve="1">
   <p:cSld name="Title, 2 Content and Content">
     <p:spTree>
       <p:nvGrpSpPr>
@@ -984,10 +1133,11 @@
           </a:prstGeom>
         </p:spPr>
         <p:txBody>
-          <a:bodyPr lIns="0" rIns="0" tIns="0" bIns="0" anchor="ctr"/>
+          <a:bodyPr lIns="0" tIns="0" rIns="0" bIns="0" anchor="ctr"/>
+          <a:lstStyle/>
           <a:p>
             <a:pPr algn="ctr"/>
-            <a:endParaRPr b="0" lang="en-US" sz="4400" spc="-1" strike="noStrike">
+            <a:endParaRPr lang="en-US" sz="4400" b="0" strike="noStrike" spc="-1">
               <a:latin typeface="Arial"/>
             </a:endParaRPr>
           </a:p>
@@ -1013,11 +1163,12 @@
           </a:prstGeom>
         </p:spPr>
         <p:txBody>
-          <a:bodyPr lIns="0" rIns="0" tIns="0" bIns="0">
-            <a:normAutofit/>
-          </a:bodyPr>
-          <a:p>
-            <a:endParaRPr b="0" lang="en-US" sz="3200" spc="-1" strike="noStrike">
+          <a:bodyPr lIns="0" tIns="0" rIns="0" bIns="0">
+            <a:normAutofit/>
+          </a:bodyPr>
+          <a:lstStyle/>
+          <a:p>
+            <a:endParaRPr lang="en-US" sz="3200" b="0" strike="noStrike" spc="-1">
               <a:latin typeface="Arial"/>
             </a:endParaRPr>
           </a:p>
@@ -1043,11 +1194,12 @@
           </a:prstGeom>
         </p:spPr>
         <p:txBody>
-          <a:bodyPr lIns="0" rIns="0" tIns="0" bIns="0">
-            <a:normAutofit/>
-          </a:bodyPr>
-          <a:p>
-            <a:endParaRPr b="0" lang="en-US" sz="3200" spc="-1" strike="noStrike">
+          <a:bodyPr lIns="0" tIns="0" rIns="0" bIns="0">
+            <a:normAutofit/>
+          </a:bodyPr>
+          <a:lstStyle/>
+          <a:p>
+            <a:endParaRPr lang="en-US" sz="3200" b="0" strike="noStrike" spc="-1">
               <a:latin typeface="Arial"/>
             </a:endParaRPr>
           </a:p>
@@ -1073,11 +1225,12 @@
           </a:prstGeom>
         </p:spPr>
         <p:txBody>
-          <a:bodyPr lIns="0" rIns="0" tIns="0" bIns="0">
-            <a:normAutofit/>
-          </a:bodyPr>
-          <a:p>
-            <a:endParaRPr b="0" lang="en-US" sz="3200" spc="-1" strike="noStrike">
+          <a:bodyPr lIns="0" tIns="0" rIns="0" bIns="0">
+            <a:normAutofit/>
+          </a:bodyPr>
+          <a:lstStyle/>
+          <a:p>
+            <a:endParaRPr lang="en-US" sz="3200" b="0" strike="noStrike" spc="-1">
               <a:latin typeface="Arial"/>
             </a:endParaRPr>
           </a:p>
@@ -1085,11 +1238,14 @@
       </p:sp>
     </p:spTree>
   </p:cSld>
+  <p:clrMapOvr>
+    <a:masterClrMapping/>
+  </p:clrMapOvr>
 </p:sldLayout>
 </file>
 
 <file path=ppt/slideLayouts/slideLayout2.xml><?xml version="1.0" encoding="utf-8"?>
-<p:sldLayout xmlns:a="http://schemas.openxmlformats.org/drawingml/2006/main" xmlns:p="http://schemas.openxmlformats.org/presentationml/2006/main" xmlns:r="http://schemas.openxmlformats.org/officeDocument/2006/relationships" xmlns:p14="http://schemas.microsoft.com/office/powerpoint/2010/main" xmlns:p15="http://schemas.microsoft.com/office/powerpoint/2012/main" xmlns:mc="http://schemas.openxmlformats.org/markup-compatibility/2006" type="tx" preserve="1">
+<p:sldLayout xmlns:a="http://schemas.openxmlformats.org/drawingml/2006/main" xmlns:r="http://schemas.openxmlformats.org/officeDocument/2006/relationships" xmlns:p="http://schemas.openxmlformats.org/presentationml/2006/main" type="tx" preserve="1">
   <p:cSld name="Title Slide">
     <p:spTree>
       <p:nvGrpSpPr>
@@ -1125,10 +1281,11 @@
           </a:prstGeom>
         </p:spPr>
         <p:txBody>
-          <a:bodyPr lIns="0" rIns="0" tIns="0" bIns="0" anchor="ctr"/>
+          <a:bodyPr lIns="0" tIns="0" rIns="0" bIns="0" anchor="ctr"/>
+          <a:lstStyle/>
           <a:p>
             <a:pPr algn="ctr"/>
-            <a:endParaRPr b="0" lang="en-US" sz="4400" spc="-1" strike="noStrike">
+            <a:endParaRPr lang="en-US" sz="4400" b="0" strike="noStrike" spc="-1">
               <a:latin typeface="Arial"/>
             </a:endParaRPr>
           </a:p>
@@ -1154,10 +1311,11 @@
           </a:prstGeom>
         </p:spPr>
         <p:txBody>
-          <a:bodyPr lIns="0" rIns="0" tIns="0" bIns="0" anchor="ctr"/>
+          <a:bodyPr lIns="0" tIns="0" rIns="0" bIns="0" anchor="ctr"/>
+          <a:lstStyle/>
           <a:p>
             <a:pPr algn="ctr"/>
-            <a:endParaRPr b="0" lang="en-US" sz="3200" spc="-1" strike="noStrike">
+            <a:endParaRPr lang="en-US" sz="3200" b="0" strike="noStrike" spc="-1">
               <a:latin typeface="Arial"/>
             </a:endParaRPr>
           </a:p>
@@ -1165,11 +1323,14 @@
       </p:sp>
     </p:spTree>
   </p:cSld>
+  <p:clrMapOvr>
+    <a:masterClrMapping/>
+  </p:clrMapOvr>
 </p:sldLayout>
 </file>
 
 <file path=ppt/slideLayouts/slideLayout20.xml><?xml version="1.0" encoding="utf-8"?>
-<p:sldLayout xmlns:a="http://schemas.openxmlformats.org/drawingml/2006/main" xmlns:p="http://schemas.openxmlformats.org/presentationml/2006/main" xmlns:r="http://schemas.openxmlformats.org/officeDocument/2006/relationships" xmlns:p14="http://schemas.microsoft.com/office/powerpoint/2010/main" xmlns:p15="http://schemas.microsoft.com/office/powerpoint/2012/main" xmlns:mc="http://schemas.openxmlformats.org/markup-compatibility/2006" type="objAndTwoObj" preserve="1">
+<p:sldLayout xmlns:a="http://schemas.openxmlformats.org/drawingml/2006/main" xmlns:r="http://schemas.openxmlformats.org/officeDocument/2006/relationships" xmlns:p="http://schemas.openxmlformats.org/presentationml/2006/main" type="objAndTwoObj" preserve="1">
   <p:cSld name="Title Content and 2 Content">
     <p:spTree>
       <p:nvGrpSpPr>
@@ -1205,10 +1366,11 @@
           </a:prstGeom>
         </p:spPr>
         <p:txBody>
-          <a:bodyPr lIns="0" rIns="0" tIns="0" bIns="0" anchor="ctr"/>
+          <a:bodyPr lIns="0" tIns="0" rIns="0" bIns="0" anchor="ctr"/>
+          <a:lstStyle/>
           <a:p>
             <a:pPr algn="ctr"/>
-            <a:endParaRPr b="0" lang="en-US" sz="4400" spc="-1" strike="noStrike">
+            <a:endParaRPr lang="en-US" sz="4400" b="0" strike="noStrike" spc="-1">
               <a:latin typeface="Arial"/>
             </a:endParaRPr>
           </a:p>
@@ -1234,11 +1396,12 @@
           </a:prstGeom>
         </p:spPr>
         <p:txBody>
-          <a:bodyPr lIns="0" rIns="0" tIns="0" bIns="0">
-            <a:normAutofit/>
-          </a:bodyPr>
-          <a:p>
-            <a:endParaRPr b="0" lang="en-US" sz="3200" spc="-1" strike="noStrike">
+          <a:bodyPr lIns="0" tIns="0" rIns="0" bIns="0">
+            <a:normAutofit/>
+          </a:bodyPr>
+          <a:lstStyle/>
+          <a:p>
+            <a:endParaRPr lang="en-US" sz="3200" b="0" strike="noStrike" spc="-1">
               <a:latin typeface="Arial"/>
             </a:endParaRPr>
           </a:p>
@@ -1264,11 +1427,12 @@
           </a:prstGeom>
         </p:spPr>
         <p:txBody>
-          <a:bodyPr lIns="0" rIns="0" tIns="0" bIns="0">
-            <a:normAutofit/>
-          </a:bodyPr>
-          <a:p>
-            <a:endParaRPr b="0" lang="en-US" sz="3200" spc="-1" strike="noStrike">
+          <a:bodyPr lIns="0" tIns="0" rIns="0" bIns="0">
+            <a:normAutofit/>
+          </a:bodyPr>
+          <a:lstStyle/>
+          <a:p>
+            <a:endParaRPr lang="en-US" sz="3200" b="0" strike="noStrike" spc="-1">
               <a:latin typeface="Arial"/>
             </a:endParaRPr>
           </a:p>
@@ -1294,11 +1458,12 @@
           </a:prstGeom>
         </p:spPr>
         <p:txBody>
-          <a:bodyPr lIns="0" rIns="0" tIns="0" bIns="0">
-            <a:normAutofit/>
-          </a:bodyPr>
-          <a:p>
-            <a:endParaRPr b="0" lang="en-US" sz="3200" spc="-1" strike="noStrike">
+          <a:bodyPr lIns="0" tIns="0" rIns="0" bIns="0">
+            <a:normAutofit/>
+          </a:bodyPr>
+          <a:lstStyle/>
+          <a:p>
+            <a:endParaRPr lang="en-US" sz="3200" b="0" strike="noStrike" spc="-1">
               <a:latin typeface="Arial"/>
             </a:endParaRPr>
           </a:p>
@@ -1306,11 +1471,14 @@
       </p:sp>
     </p:spTree>
   </p:cSld>
+  <p:clrMapOvr>
+    <a:masterClrMapping/>
+  </p:clrMapOvr>
 </p:sldLayout>
 </file>
 
 <file path=ppt/slideLayouts/slideLayout21.xml><?xml version="1.0" encoding="utf-8"?>
-<p:sldLayout xmlns:a="http://schemas.openxmlformats.org/drawingml/2006/main" xmlns:p="http://schemas.openxmlformats.org/presentationml/2006/main" xmlns:r="http://schemas.openxmlformats.org/officeDocument/2006/relationships" xmlns:p14="http://schemas.microsoft.com/office/powerpoint/2010/main" xmlns:p15="http://schemas.microsoft.com/office/powerpoint/2012/main" xmlns:mc="http://schemas.openxmlformats.org/markup-compatibility/2006" type="twoObjOverTx" preserve="1">
+<p:sldLayout xmlns:a="http://schemas.openxmlformats.org/drawingml/2006/main" xmlns:r="http://schemas.openxmlformats.org/officeDocument/2006/relationships" xmlns:p="http://schemas.openxmlformats.org/presentationml/2006/main" type="twoObjOverTx" preserve="1">
   <p:cSld name="Title, 2 Content over Content">
     <p:spTree>
       <p:nvGrpSpPr>
@@ -1346,10 +1514,11 @@
           </a:prstGeom>
         </p:spPr>
         <p:txBody>
-          <a:bodyPr lIns="0" rIns="0" tIns="0" bIns="0" anchor="ctr"/>
+          <a:bodyPr lIns="0" tIns="0" rIns="0" bIns="0" anchor="ctr"/>
+          <a:lstStyle/>
           <a:p>
             <a:pPr algn="ctr"/>
-            <a:endParaRPr b="0" lang="en-US" sz="4400" spc="-1" strike="noStrike">
+            <a:endParaRPr lang="en-US" sz="4400" b="0" strike="noStrike" spc="-1">
               <a:latin typeface="Arial"/>
             </a:endParaRPr>
           </a:p>
@@ -1375,11 +1544,12 @@
           </a:prstGeom>
         </p:spPr>
         <p:txBody>
-          <a:bodyPr lIns="0" rIns="0" tIns="0" bIns="0">
-            <a:normAutofit/>
-          </a:bodyPr>
-          <a:p>
-            <a:endParaRPr b="0" lang="en-US" sz="3200" spc="-1" strike="noStrike">
+          <a:bodyPr lIns="0" tIns="0" rIns="0" bIns="0">
+            <a:normAutofit/>
+          </a:bodyPr>
+          <a:lstStyle/>
+          <a:p>
+            <a:endParaRPr lang="en-US" sz="3200" b="0" strike="noStrike" spc="-1">
               <a:latin typeface="Arial"/>
             </a:endParaRPr>
           </a:p>
@@ -1405,11 +1575,12 @@
           </a:prstGeom>
         </p:spPr>
         <p:txBody>
-          <a:bodyPr lIns="0" rIns="0" tIns="0" bIns="0">
-            <a:normAutofit/>
-          </a:bodyPr>
-          <a:p>
-            <a:endParaRPr b="0" lang="en-US" sz="3200" spc="-1" strike="noStrike">
+          <a:bodyPr lIns="0" tIns="0" rIns="0" bIns="0">
+            <a:normAutofit/>
+          </a:bodyPr>
+          <a:lstStyle/>
+          <a:p>
+            <a:endParaRPr lang="en-US" sz="3200" b="0" strike="noStrike" spc="-1">
               <a:latin typeface="Arial"/>
             </a:endParaRPr>
           </a:p>
@@ -1435,11 +1606,12 @@
           </a:prstGeom>
         </p:spPr>
         <p:txBody>
-          <a:bodyPr lIns="0" rIns="0" tIns="0" bIns="0">
-            <a:normAutofit/>
-          </a:bodyPr>
-          <a:p>
-            <a:endParaRPr b="0" lang="en-US" sz="3200" spc="-1" strike="noStrike">
+          <a:bodyPr lIns="0" tIns="0" rIns="0" bIns="0">
+            <a:normAutofit/>
+          </a:bodyPr>
+          <a:lstStyle/>
+          <a:p>
+            <a:endParaRPr lang="en-US" sz="3200" b="0" strike="noStrike" spc="-1">
               <a:latin typeface="Arial"/>
             </a:endParaRPr>
           </a:p>
@@ -1447,11 +1619,14 @@
       </p:sp>
     </p:spTree>
   </p:cSld>
+  <p:clrMapOvr>
+    <a:masterClrMapping/>
+  </p:clrMapOvr>
 </p:sldLayout>
 </file>
 
 <file path=ppt/slideLayouts/slideLayout22.xml><?xml version="1.0" encoding="utf-8"?>
-<p:sldLayout xmlns:a="http://schemas.openxmlformats.org/drawingml/2006/main" xmlns:p="http://schemas.openxmlformats.org/presentationml/2006/main" xmlns:r="http://schemas.openxmlformats.org/officeDocument/2006/relationships" xmlns:p14="http://schemas.microsoft.com/office/powerpoint/2010/main" xmlns:p15="http://schemas.microsoft.com/office/powerpoint/2012/main" xmlns:mc="http://schemas.openxmlformats.org/markup-compatibility/2006" type="objOverTx" preserve="1">
+<p:sldLayout xmlns:a="http://schemas.openxmlformats.org/drawingml/2006/main" xmlns:r="http://schemas.openxmlformats.org/officeDocument/2006/relationships" xmlns:p="http://schemas.openxmlformats.org/presentationml/2006/main" type="objOverTx" preserve="1">
   <p:cSld name="Title, Content over Content">
     <p:spTree>
       <p:nvGrpSpPr>
@@ -1487,10 +1662,11 @@
           </a:prstGeom>
         </p:spPr>
         <p:txBody>
-          <a:bodyPr lIns="0" rIns="0" tIns="0" bIns="0" anchor="ctr"/>
+          <a:bodyPr lIns="0" tIns="0" rIns="0" bIns="0" anchor="ctr"/>
+          <a:lstStyle/>
           <a:p>
             <a:pPr algn="ctr"/>
-            <a:endParaRPr b="0" lang="en-US" sz="4400" spc="-1" strike="noStrike">
+            <a:endParaRPr lang="en-US" sz="4400" b="0" strike="noStrike" spc="-1">
               <a:latin typeface="Arial"/>
             </a:endParaRPr>
           </a:p>
@@ -1516,11 +1692,12 @@
           </a:prstGeom>
         </p:spPr>
         <p:txBody>
-          <a:bodyPr lIns="0" rIns="0" tIns="0" bIns="0">
-            <a:normAutofit/>
-          </a:bodyPr>
-          <a:p>
-            <a:endParaRPr b="0" lang="en-US" sz="3200" spc="-1" strike="noStrike">
+          <a:bodyPr lIns="0" tIns="0" rIns="0" bIns="0">
+            <a:normAutofit/>
+          </a:bodyPr>
+          <a:lstStyle/>
+          <a:p>
+            <a:endParaRPr lang="en-US" sz="3200" b="0" strike="noStrike" spc="-1">
               <a:latin typeface="Arial"/>
             </a:endParaRPr>
           </a:p>
@@ -1546,11 +1723,12 @@
           </a:prstGeom>
         </p:spPr>
         <p:txBody>
-          <a:bodyPr lIns="0" rIns="0" tIns="0" bIns="0">
-            <a:normAutofit/>
-          </a:bodyPr>
-          <a:p>
-            <a:endParaRPr b="0" lang="en-US" sz="3200" spc="-1" strike="noStrike">
+          <a:bodyPr lIns="0" tIns="0" rIns="0" bIns="0">
+            <a:normAutofit/>
+          </a:bodyPr>
+          <a:lstStyle/>
+          <a:p>
+            <a:endParaRPr lang="en-US" sz="3200" b="0" strike="noStrike" spc="-1">
               <a:latin typeface="Arial"/>
             </a:endParaRPr>
           </a:p>
@@ -1558,11 +1736,14 @@
       </p:sp>
     </p:spTree>
   </p:cSld>
+  <p:clrMapOvr>
+    <a:masterClrMapping/>
+  </p:clrMapOvr>
 </p:sldLayout>
 </file>
 
 <file path=ppt/slideLayouts/slideLayout23.xml><?xml version="1.0" encoding="utf-8"?>
-<p:sldLayout xmlns:a="http://schemas.openxmlformats.org/drawingml/2006/main" xmlns:p="http://schemas.openxmlformats.org/presentationml/2006/main" xmlns:r="http://schemas.openxmlformats.org/officeDocument/2006/relationships" xmlns:p14="http://schemas.microsoft.com/office/powerpoint/2010/main" xmlns:p15="http://schemas.microsoft.com/office/powerpoint/2012/main" xmlns:mc="http://schemas.openxmlformats.org/markup-compatibility/2006" type="fourObj" preserve="1">
+<p:sldLayout xmlns:a="http://schemas.openxmlformats.org/drawingml/2006/main" xmlns:r="http://schemas.openxmlformats.org/officeDocument/2006/relationships" xmlns:p="http://schemas.openxmlformats.org/presentationml/2006/main" type="fourObj" preserve="1">
   <p:cSld name="Title, 4 Content">
     <p:spTree>
       <p:nvGrpSpPr>
@@ -1598,10 +1779,11 @@
           </a:prstGeom>
         </p:spPr>
         <p:txBody>
-          <a:bodyPr lIns="0" rIns="0" tIns="0" bIns="0" anchor="ctr"/>
+          <a:bodyPr lIns="0" tIns="0" rIns="0" bIns="0" anchor="ctr"/>
+          <a:lstStyle/>
           <a:p>
             <a:pPr algn="ctr"/>
-            <a:endParaRPr b="0" lang="en-US" sz="4400" spc="-1" strike="noStrike">
+            <a:endParaRPr lang="en-US" sz="4400" b="0" strike="noStrike" spc="-1">
               <a:latin typeface="Arial"/>
             </a:endParaRPr>
           </a:p>
@@ -1627,11 +1809,12 @@
           </a:prstGeom>
         </p:spPr>
         <p:txBody>
-          <a:bodyPr lIns="0" rIns="0" tIns="0" bIns="0">
-            <a:normAutofit/>
-          </a:bodyPr>
-          <a:p>
-            <a:endParaRPr b="0" lang="en-US" sz="3200" spc="-1" strike="noStrike">
+          <a:bodyPr lIns="0" tIns="0" rIns="0" bIns="0">
+            <a:normAutofit/>
+          </a:bodyPr>
+          <a:lstStyle/>
+          <a:p>
+            <a:endParaRPr lang="en-US" sz="3200" b="0" strike="noStrike" spc="-1">
               <a:latin typeface="Arial"/>
             </a:endParaRPr>
           </a:p>
@@ -1657,11 +1840,12 @@
           </a:prstGeom>
         </p:spPr>
         <p:txBody>
-          <a:bodyPr lIns="0" rIns="0" tIns="0" bIns="0">
-            <a:normAutofit/>
-          </a:bodyPr>
-          <a:p>
-            <a:endParaRPr b="0" lang="en-US" sz="3200" spc="-1" strike="noStrike">
+          <a:bodyPr lIns="0" tIns="0" rIns="0" bIns="0">
+            <a:normAutofit/>
+          </a:bodyPr>
+          <a:lstStyle/>
+          <a:p>
+            <a:endParaRPr lang="en-US" sz="3200" b="0" strike="noStrike" spc="-1">
               <a:latin typeface="Arial"/>
             </a:endParaRPr>
           </a:p>
@@ -1687,11 +1871,12 @@
           </a:prstGeom>
         </p:spPr>
         <p:txBody>
-          <a:bodyPr lIns="0" rIns="0" tIns="0" bIns="0">
-            <a:normAutofit/>
-          </a:bodyPr>
-          <a:p>
-            <a:endParaRPr b="0" lang="en-US" sz="3200" spc="-1" strike="noStrike">
+          <a:bodyPr lIns="0" tIns="0" rIns="0" bIns="0">
+            <a:normAutofit/>
+          </a:bodyPr>
+          <a:lstStyle/>
+          <a:p>
+            <a:endParaRPr lang="en-US" sz="3200" b="0" strike="noStrike" spc="-1">
               <a:latin typeface="Arial"/>
             </a:endParaRPr>
           </a:p>
@@ -1717,11 +1902,12 @@
           </a:prstGeom>
         </p:spPr>
         <p:txBody>
-          <a:bodyPr lIns="0" rIns="0" tIns="0" bIns="0">
-            <a:normAutofit/>
-          </a:bodyPr>
-          <a:p>
-            <a:endParaRPr b="0" lang="en-US" sz="3200" spc="-1" strike="noStrike">
+          <a:bodyPr lIns="0" tIns="0" rIns="0" bIns="0">
+            <a:normAutofit/>
+          </a:bodyPr>
+          <a:lstStyle/>
+          <a:p>
+            <a:endParaRPr lang="en-US" sz="3200" b="0" strike="noStrike" spc="-1">
               <a:latin typeface="Arial"/>
             </a:endParaRPr>
           </a:p>
@@ -1729,11 +1915,14 @@
       </p:sp>
     </p:spTree>
   </p:cSld>
+  <p:clrMapOvr>
+    <a:masterClrMapping/>
+  </p:clrMapOvr>
 </p:sldLayout>
 </file>
 
 <file path=ppt/slideLayouts/slideLayout24.xml><?xml version="1.0" encoding="utf-8"?>
-<p:sldLayout xmlns:a="http://schemas.openxmlformats.org/drawingml/2006/main" xmlns:p="http://schemas.openxmlformats.org/presentationml/2006/main" xmlns:r="http://schemas.openxmlformats.org/officeDocument/2006/relationships" xmlns:p14="http://schemas.microsoft.com/office/powerpoint/2010/main" xmlns:p15="http://schemas.microsoft.com/office/powerpoint/2012/main" xmlns:mc="http://schemas.openxmlformats.org/markup-compatibility/2006" type="blank" preserve="1">
+<p:sldLayout xmlns:a="http://schemas.openxmlformats.org/drawingml/2006/main" xmlns:r="http://schemas.openxmlformats.org/officeDocument/2006/relationships" xmlns:p="http://schemas.openxmlformats.org/presentationml/2006/main" type="blank" preserve="1">
   <p:cSld name="Title, 6 Content">
     <p:spTree>
       <p:nvGrpSpPr>
@@ -1769,10 +1958,11 @@
           </a:prstGeom>
         </p:spPr>
         <p:txBody>
-          <a:bodyPr lIns="0" rIns="0" tIns="0" bIns="0" anchor="ctr"/>
+          <a:bodyPr lIns="0" tIns="0" rIns="0" bIns="0" anchor="ctr"/>
+          <a:lstStyle/>
           <a:p>
             <a:pPr algn="ctr"/>
-            <a:endParaRPr b="0" lang="en-US" sz="4400" spc="-1" strike="noStrike">
+            <a:endParaRPr lang="en-US" sz="4400" b="0" strike="noStrike" spc="-1">
               <a:latin typeface="Arial"/>
             </a:endParaRPr>
           </a:p>
@@ -1798,11 +1988,12 @@
           </a:prstGeom>
         </p:spPr>
         <p:txBody>
-          <a:bodyPr lIns="0" rIns="0" tIns="0" bIns="0">
-            <a:normAutofit/>
-          </a:bodyPr>
-          <a:p>
-            <a:endParaRPr b="0" lang="en-US" sz="3200" spc="-1" strike="noStrike">
+          <a:bodyPr lIns="0" tIns="0" rIns="0" bIns="0">
+            <a:normAutofit/>
+          </a:bodyPr>
+          <a:lstStyle/>
+          <a:p>
+            <a:endParaRPr lang="en-US" sz="3200" b="0" strike="noStrike" spc="-1">
               <a:latin typeface="Arial"/>
             </a:endParaRPr>
           </a:p>
@@ -1828,11 +2019,12 @@
           </a:prstGeom>
         </p:spPr>
         <p:txBody>
-          <a:bodyPr lIns="0" rIns="0" tIns="0" bIns="0">
-            <a:normAutofit/>
-          </a:bodyPr>
-          <a:p>
-            <a:endParaRPr b="0" lang="en-US" sz="3200" spc="-1" strike="noStrike">
+          <a:bodyPr lIns="0" tIns="0" rIns="0" bIns="0">
+            <a:normAutofit/>
+          </a:bodyPr>
+          <a:lstStyle/>
+          <a:p>
+            <a:endParaRPr lang="en-US" sz="3200" b="0" strike="noStrike" spc="-1">
               <a:latin typeface="Arial"/>
             </a:endParaRPr>
           </a:p>
@@ -1858,11 +2050,12 @@
           </a:prstGeom>
         </p:spPr>
         <p:txBody>
-          <a:bodyPr lIns="0" rIns="0" tIns="0" bIns="0">
-            <a:normAutofit/>
-          </a:bodyPr>
-          <a:p>
-            <a:endParaRPr b="0" lang="en-US" sz="3200" spc="-1" strike="noStrike">
+          <a:bodyPr lIns="0" tIns="0" rIns="0" bIns="0">
+            <a:normAutofit/>
+          </a:bodyPr>
+          <a:lstStyle/>
+          <a:p>
+            <a:endParaRPr lang="en-US" sz="3200" b="0" strike="noStrike" spc="-1">
               <a:latin typeface="Arial"/>
             </a:endParaRPr>
           </a:p>
@@ -1888,11 +2081,12 @@
           </a:prstGeom>
         </p:spPr>
         <p:txBody>
-          <a:bodyPr lIns="0" rIns="0" tIns="0" bIns="0">
-            <a:normAutofit/>
-          </a:bodyPr>
-          <a:p>
-            <a:endParaRPr b="0" lang="en-US" sz="3200" spc="-1" strike="noStrike">
+          <a:bodyPr lIns="0" tIns="0" rIns="0" bIns="0">
+            <a:normAutofit/>
+          </a:bodyPr>
+          <a:lstStyle/>
+          <a:p>
+            <a:endParaRPr lang="en-US" sz="3200" b="0" strike="noStrike" spc="-1">
               <a:latin typeface="Arial"/>
             </a:endParaRPr>
           </a:p>
@@ -1918,11 +2112,12 @@
           </a:prstGeom>
         </p:spPr>
         <p:txBody>
-          <a:bodyPr lIns="0" rIns="0" tIns="0" bIns="0">
-            <a:normAutofit/>
-          </a:bodyPr>
-          <a:p>
-            <a:endParaRPr b="0" lang="en-US" sz="3200" spc="-1" strike="noStrike">
+          <a:bodyPr lIns="0" tIns="0" rIns="0" bIns="0">
+            <a:normAutofit/>
+          </a:bodyPr>
+          <a:lstStyle/>
+          <a:p>
+            <a:endParaRPr lang="en-US" sz="3200" b="0" strike="noStrike" spc="-1">
               <a:latin typeface="Arial"/>
             </a:endParaRPr>
           </a:p>
@@ -1948,11 +2143,12 @@
           </a:prstGeom>
         </p:spPr>
         <p:txBody>
-          <a:bodyPr lIns="0" rIns="0" tIns="0" bIns="0">
-            <a:normAutofit/>
-          </a:bodyPr>
-          <a:p>
-            <a:endParaRPr b="0" lang="en-US" sz="3200" spc="-1" strike="noStrike">
+          <a:bodyPr lIns="0" tIns="0" rIns="0" bIns="0">
+            <a:normAutofit/>
+          </a:bodyPr>
+          <a:lstStyle/>
+          <a:p>
+            <a:endParaRPr lang="en-US" sz="3200" b="0" strike="noStrike" spc="-1">
               <a:latin typeface="Arial"/>
             </a:endParaRPr>
           </a:p>
@@ -1960,11 +2156,14 @@
       </p:sp>
     </p:spTree>
   </p:cSld>
+  <p:clrMapOvr>
+    <a:masterClrMapping/>
+  </p:clrMapOvr>
 </p:sldLayout>
 </file>
 
 <file path=ppt/slideLayouts/slideLayout25.xml><?xml version="1.0" encoding="utf-8"?>
-<p:sldLayout xmlns:a="http://schemas.openxmlformats.org/drawingml/2006/main" xmlns:p="http://schemas.openxmlformats.org/presentationml/2006/main" xmlns:r="http://schemas.openxmlformats.org/officeDocument/2006/relationships" xmlns:p14="http://schemas.microsoft.com/office/powerpoint/2010/main" xmlns:p15="http://schemas.microsoft.com/office/powerpoint/2012/main" xmlns:mc="http://schemas.openxmlformats.org/markup-compatibility/2006" type="blank" preserve="1">
+<p:sldLayout xmlns:a="http://schemas.openxmlformats.org/drawingml/2006/main" xmlns:r="http://schemas.openxmlformats.org/officeDocument/2006/relationships" xmlns:p="http://schemas.openxmlformats.org/presentationml/2006/main" type="blank" preserve="1">
   <p:cSld name="Blank Slide">
     <p:spTree>
       <p:nvGrpSpPr>
@@ -1982,11 +2181,14 @@
       </p:grpSpPr>
     </p:spTree>
   </p:cSld>
+  <p:clrMapOvr>
+    <a:masterClrMapping/>
+  </p:clrMapOvr>
 </p:sldLayout>
 </file>
 
 <file path=ppt/slideLayouts/slideLayout26.xml><?xml version="1.0" encoding="utf-8"?>
-<p:sldLayout xmlns:a="http://schemas.openxmlformats.org/drawingml/2006/main" xmlns:p="http://schemas.openxmlformats.org/presentationml/2006/main" xmlns:r="http://schemas.openxmlformats.org/officeDocument/2006/relationships" xmlns:p14="http://schemas.microsoft.com/office/powerpoint/2010/main" xmlns:p15="http://schemas.microsoft.com/office/powerpoint/2012/main" xmlns:mc="http://schemas.openxmlformats.org/markup-compatibility/2006" type="tx" preserve="1">
+<p:sldLayout xmlns:a="http://schemas.openxmlformats.org/drawingml/2006/main" xmlns:r="http://schemas.openxmlformats.org/officeDocument/2006/relationships" xmlns:p="http://schemas.openxmlformats.org/presentationml/2006/main" type="tx" preserve="1">
   <p:cSld name="Title Slide">
     <p:spTree>
       <p:nvGrpSpPr>
@@ -2022,10 +2224,11 @@
           </a:prstGeom>
         </p:spPr>
         <p:txBody>
-          <a:bodyPr lIns="0" rIns="0" tIns="0" bIns="0" anchor="ctr"/>
+          <a:bodyPr lIns="0" tIns="0" rIns="0" bIns="0" anchor="ctr"/>
+          <a:lstStyle/>
           <a:p>
             <a:pPr algn="ctr"/>
-            <a:endParaRPr b="0" lang="en-US" sz="4400" spc="-1" strike="noStrike">
+            <a:endParaRPr lang="en-US" sz="4400" b="0" strike="noStrike" spc="-1">
               <a:latin typeface="Arial"/>
             </a:endParaRPr>
           </a:p>
@@ -2051,10 +2254,11 @@
           </a:prstGeom>
         </p:spPr>
         <p:txBody>
-          <a:bodyPr lIns="0" rIns="0" tIns="0" bIns="0" anchor="ctr"/>
+          <a:bodyPr lIns="0" tIns="0" rIns="0" bIns="0" anchor="ctr"/>
+          <a:lstStyle/>
           <a:p>
             <a:pPr algn="ctr"/>
-            <a:endParaRPr b="0" lang="en-US" sz="3200" spc="-1" strike="noStrike">
+            <a:endParaRPr lang="en-US" sz="3200" b="0" strike="noStrike" spc="-1">
               <a:latin typeface="Arial"/>
             </a:endParaRPr>
           </a:p>
@@ -2062,11 +2266,14 @@
       </p:sp>
     </p:spTree>
   </p:cSld>
+  <p:clrMapOvr>
+    <a:masterClrMapping/>
+  </p:clrMapOvr>
 </p:sldLayout>
 </file>
 
 <file path=ppt/slideLayouts/slideLayout27.xml><?xml version="1.0" encoding="utf-8"?>
-<p:sldLayout xmlns:a="http://schemas.openxmlformats.org/drawingml/2006/main" xmlns:p="http://schemas.openxmlformats.org/presentationml/2006/main" xmlns:r="http://schemas.openxmlformats.org/officeDocument/2006/relationships" xmlns:p14="http://schemas.microsoft.com/office/powerpoint/2010/main" xmlns:p15="http://schemas.microsoft.com/office/powerpoint/2012/main" xmlns:mc="http://schemas.openxmlformats.org/markup-compatibility/2006" type="obj" preserve="1">
+<p:sldLayout xmlns:a="http://schemas.openxmlformats.org/drawingml/2006/main" xmlns:r="http://schemas.openxmlformats.org/officeDocument/2006/relationships" xmlns:p="http://schemas.openxmlformats.org/presentationml/2006/main" type="obj" preserve="1">
   <p:cSld name="Title, Content">
     <p:spTree>
       <p:nvGrpSpPr>
@@ -2102,10 +2309,11 @@
           </a:prstGeom>
         </p:spPr>
         <p:txBody>
-          <a:bodyPr lIns="0" rIns="0" tIns="0" bIns="0" anchor="ctr"/>
+          <a:bodyPr lIns="0" tIns="0" rIns="0" bIns="0" anchor="ctr"/>
+          <a:lstStyle/>
           <a:p>
             <a:pPr algn="ctr"/>
-            <a:endParaRPr b="0" lang="en-US" sz="4400" spc="-1" strike="noStrike">
+            <a:endParaRPr lang="en-US" sz="4400" b="0" strike="noStrike" spc="-1">
               <a:latin typeface="Arial"/>
             </a:endParaRPr>
           </a:p>
@@ -2131,11 +2339,12 @@
           </a:prstGeom>
         </p:spPr>
         <p:txBody>
-          <a:bodyPr lIns="0" rIns="0" tIns="0" bIns="0">
-            <a:normAutofit/>
-          </a:bodyPr>
-          <a:p>
-            <a:endParaRPr b="0" lang="en-US" sz="3200" spc="-1" strike="noStrike">
+          <a:bodyPr lIns="0" tIns="0" rIns="0" bIns="0">
+            <a:normAutofit/>
+          </a:bodyPr>
+          <a:lstStyle/>
+          <a:p>
+            <a:endParaRPr lang="en-US" sz="3200" b="0" strike="noStrike" spc="-1">
               <a:latin typeface="Arial"/>
             </a:endParaRPr>
           </a:p>
@@ -2143,11 +2352,14 @@
       </p:sp>
     </p:spTree>
   </p:cSld>
+  <p:clrMapOvr>
+    <a:masterClrMapping/>
+  </p:clrMapOvr>
 </p:sldLayout>
 </file>
 
 <file path=ppt/slideLayouts/slideLayout28.xml><?xml version="1.0" encoding="utf-8"?>
-<p:sldLayout xmlns:a="http://schemas.openxmlformats.org/drawingml/2006/main" xmlns:p="http://schemas.openxmlformats.org/presentationml/2006/main" xmlns:r="http://schemas.openxmlformats.org/officeDocument/2006/relationships" xmlns:p14="http://schemas.microsoft.com/office/powerpoint/2010/main" xmlns:p15="http://schemas.microsoft.com/office/powerpoint/2012/main" xmlns:mc="http://schemas.openxmlformats.org/markup-compatibility/2006" type="twoObj" preserve="1">
+<p:sldLayout xmlns:a="http://schemas.openxmlformats.org/drawingml/2006/main" xmlns:r="http://schemas.openxmlformats.org/officeDocument/2006/relationships" xmlns:p="http://schemas.openxmlformats.org/presentationml/2006/main" type="twoObj" preserve="1">
   <p:cSld name="Title, 2 Content">
     <p:spTree>
       <p:nvGrpSpPr>
@@ -2183,10 +2395,11 @@
           </a:prstGeom>
         </p:spPr>
         <p:txBody>
-          <a:bodyPr lIns="0" rIns="0" tIns="0" bIns="0" anchor="ctr"/>
+          <a:bodyPr lIns="0" tIns="0" rIns="0" bIns="0" anchor="ctr"/>
+          <a:lstStyle/>
           <a:p>
             <a:pPr algn="ctr"/>
-            <a:endParaRPr b="0" lang="en-US" sz="4400" spc="-1" strike="noStrike">
+            <a:endParaRPr lang="en-US" sz="4400" b="0" strike="noStrike" spc="-1">
               <a:latin typeface="Arial"/>
             </a:endParaRPr>
           </a:p>
@@ -2212,11 +2425,12 @@
           </a:prstGeom>
         </p:spPr>
         <p:txBody>
-          <a:bodyPr lIns="0" rIns="0" tIns="0" bIns="0">
-            <a:normAutofit/>
-          </a:bodyPr>
-          <a:p>
-            <a:endParaRPr b="0" lang="en-US" sz="3200" spc="-1" strike="noStrike">
+          <a:bodyPr lIns="0" tIns="0" rIns="0" bIns="0">
+            <a:normAutofit/>
+          </a:bodyPr>
+          <a:lstStyle/>
+          <a:p>
+            <a:endParaRPr lang="en-US" sz="3200" b="0" strike="noStrike" spc="-1">
               <a:latin typeface="Arial"/>
             </a:endParaRPr>
           </a:p>
@@ -2242,11 +2456,12 @@
           </a:prstGeom>
         </p:spPr>
         <p:txBody>
-          <a:bodyPr lIns="0" rIns="0" tIns="0" bIns="0">
-            <a:normAutofit/>
-          </a:bodyPr>
-          <a:p>
-            <a:endParaRPr b="0" lang="en-US" sz="3200" spc="-1" strike="noStrike">
+          <a:bodyPr lIns="0" tIns="0" rIns="0" bIns="0">
+            <a:normAutofit/>
+          </a:bodyPr>
+          <a:lstStyle/>
+          <a:p>
+            <a:endParaRPr lang="en-US" sz="3200" b="0" strike="noStrike" spc="-1">
               <a:latin typeface="Arial"/>
             </a:endParaRPr>
           </a:p>
@@ -2254,11 +2469,14 @@
       </p:sp>
     </p:spTree>
   </p:cSld>
+  <p:clrMapOvr>
+    <a:masterClrMapping/>
+  </p:clrMapOvr>
 </p:sldLayout>
 </file>
 
 <file path=ppt/slideLayouts/slideLayout29.xml><?xml version="1.0" encoding="utf-8"?>
-<p:sldLayout xmlns:a="http://schemas.openxmlformats.org/drawingml/2006/main" xmlns:p="http://schemas.openxmlformats.org/presentationml/2006/main" xmlns:r="http://schemas.openxmlformats.org/officeDocument/2006/relationships" xmlns:p14="http://schemas.microsoft.com/office/powerpoint/2010/main" xmlns:p15="http://schemas.microsoft.com/office/powerpoint/2012/main" xmlns:mc="http://schemas.openxmlformats.org/markup-compatibility/2006" type="titleOnly" preserve="1">
+<p:sldLayout xmlns:a="http://schemas.openxmlformats.org/drawingml/2006/main" xmlns:r="http://schemas.openxmlformats.org/officeDocument/2006/relationships" xmlns:p="http://schemas.openxmlformats.org/presentationml/2006/main" type="titleOnly" preserve="1">
   <p:cSld name="Title Only">
     <p:spTree>
       <p:nvGrpSpPr>
@@ -2294,10 +2512,11 @@
           </a:prstGeom>
         </p:spPr>
         <p:txBody>
-          <a:bodyPr lIns="0" rIns="0" tIns="0" bIns="0" anchor="ctr"/>
+          <a:bodyPr lIns="0" tIns="0" rIns="0" bIns="0" anchor="ctr"/>
+          <a:lstStyle/>
           <a:p>
             <a:pPr algn="ctr"/>
-            <a:endParaRPr b="0" lang="en-US" sz="4400" spc="-1" strike="noStrike">
+            <a:endParaRPr lang="en-US" sz="4400" b="0" strike="noStrike" spc="-1">
               <a:latin typeface="Arial"/>
             </a:endParaRPr>
           </a:p>
@@ -2305,11 +2524,14 @@
       </p:sp>
     </p:spTree>
   </p:cSld>
+  <p:clrMapOvr>
+    <a:masterClrMapping/>
+  </p:clrMapOvr>
 </p:sldLayout>
 </file>
 
 <file path=ppt/slideLayouts/slideLayout3.xml><?xml version="1.0" encoding="utf-8"?>
-<p:sldLayout xmlns:a="http://schemas.openxmlformats.org/drawingml/2006/main" xmlns:p="http://schemas.openxmlformats.org/presentationml/2006/main" xmlns:r="http://schemas.openxmlformats.org/officeDocument/2006/relationships" xmlns:p14="http://schemas.microsoft.com/office/powerpoint/2010/main" xmlns:p15="http://schemas.microsoft.com/office/powerpoint/2012/main" xmlns:mc="http://schemas.openxmlformats.org/markup-compatibility/2006" type="obj" preserve="1">
+<p:sldLayout xmlns:a="http://schemas.openxmlformats.org/drawingml/2006/main" xmlns:r="http://schemas.openxmlformats.org/officeDocument/2006/relationships" xmlns:p="http://schemas.openxmlformats.org/presentationml/2006/main" type="obj" preserve="1">
   <p:cSld name="Title, Content">
     <p:spTree>
       <p:nvGrpSpPr>
@@ -2345,10 +2567,11 @@
           </a:prstGeom>
         </p:spPr>
         <p:txBody>
-          <a:bodyPr lIns="0" rIns="0" tIns="0" bIns="0" anchor="ctr"/>
+          <a:bodyPr lIns="0" tIns="0" rIns="0" bIns="0" anchor="ctr"/>
+          <a:lstStyle/>
           <a:p>
             <a:pPr algn="ctr"/>
-            <a:endParaRPr b="0" lang="en-US" sz="4400" spc="-1" strike="noStrike">
+            <a:endParaRPr lang="en-US" sz="4400" b="0" strike="noStrike" spc="-1">
               <a:latin typeface="Arial"/>
             </a:endParaRPr>
           </a:p>
@@ -2374,11 +2597,12 @@
           </a:prstGeom>
         </p:spPr>
         <p:txBody>
-          <a:bodyPr lIns="0" rIns="0" tIns="0" bIns="0">
-            <a:normAutofit/>
-          </a:bodyPr>
-          <a:p>
-            <a:endParaRPr b="0" lang="en-US" sz="3200" spc="-1" strike="noStrike">
+          <a:bodyPr lIns="0" tIns="0" rIns="0" bIns="0">
+            <a:normAutofit/>
+          </a:bodyPr>
+          <a:lstStyle/>
+          <a:p>
+            <a:endParaRPr lang="en-US" sz="3200" b="0" strike="noStrike" spc="-1">
               <a:latin typeface="Arial"/>
             </a:endParaRPr>
           </a:p>
@@ -2386,11 +2610,14 @@
       </p:sp>
     </p:spTree>
   </p:cSld>
+  <p:clrMapOvr>
+    <a:masterClrMapping/>
+  </p:clrMapOvr>
 </p:sldLayout>
 </file>
 
 <file path=ppt/slideLayouts/slideLayout30.xml><?xml version="1.0" encoding="utf-8"?>
-<p:sldLayout xmlns:a="http://schemas.openxmlformats.org/drawingml/2006/main" xmlns:p="http://schemas.openxmlformats.org/presentationml/2006/main" xmlns:r="http://schemas.openxmlformats.org/officeDocument/2006/relationships" xmlns:p14="http://schemas.microsoft.com/office/powerpoint/2010/main" xmlns:p15="http://schemas.microsoft.com/office/powerpoint/2012/main" xmlns:mc="http://schemas.openxmlformats.org/markup-compatibility/2006" type="objOnly" preserve="1">
+<p:sldLayout xmlns:a="http://schemas.openxmlformats.org/drawingml/2006/main" xmlns:r="http://schemas.openxmlformats.org/officeDocument/2006/relationships" xmlns:p="http://schemas.openxmlformats.org/presentationml/2006/main" type="objOnly" preserve="1">
   <p:cSld name="Centered Text">
     <p:spTree>
       <p:nvGrpSpPr>
@@ -2426,10 +2653,11 @@
           </a:prstGeom>
         </p:spPr>
         <p:txBody>
-          <a:bodyPr lIns="0" rIns="0" tIns="0" bIns="0" anchor="ctr"/>
+          <a:bodyPr lIns="0" tIns="0" rIns="0" bIns="0" anchor="ctr"/>
+          <a:lstStyle/>
           <a:p>
             <a:pPr algn="ctr"/>
-            <a:endParaRPr b="0" lang="en-US" sz="3200" spc="-1" strike="noStrike">
+            <a:endParaRPr lang="en-US" sz="3200" b="0" strike="noStrike" spc="-1">
               <a:latin typeface="Arial"/>
             </a:endParaRPr>
           </a:p>
@@ -2437,11 +2665,14 @@
       </p:sp>
     </p:spTree>
   </p:cSld>
+  <p:clrMapOvr>
+    <a:masterClrMapping/>
+  </p:clrMapOvr>
 </p:sldLayout>
 </file>
 
 <file path=ppt/slideLayouts/slideLayout31.xml><?xml version="1.0" encoding="utf-8"?>
-<p:sldLayout xmlns:a="http://schemas.openxmlformats.org/drawingml/2006/main" xmlns:p="http://schemas.openxmlformats.org/presentationml/2006/main" xmlns:r="http://schemas.openxmlformats.org/officeDocument/2006/relationships" xmlns:p14="http://schemas.microsoft.com/office/powerpoint/2010/main" xmlns:p15="http://schemas.microsoft.com/office/powerpoint/2012/main" xmlns:mc="http://schemas.openxmlformats.org/markup-compatibility/2006" type="twoObjAndObj" preserve="1">
+<p:sldLayout xmlns:a="http://schemas.openxmlformats.org/drawingml/2006/main" xmlns:r="http://schemas.openxmlformats.org/officeDocument/2006/relationships" xmlns:p="http://schemas.openxmlformats.org/presentationml/2006/main" type="twoObjAndObj" preserve="1">
   <p:cSld name="Title, 2 Content and Content">
     <p:spTree>
       <p:nvGrpSpPr>
@@ -2477,10 +2708,11 @@
           </a:prstGeom>
         </p:spPr>
         <p:txBody>
-          <a:bodyPr lIns="0" rIns="0" tIns="0" bIns="0" anchor="ctr"/>
+          <a:bodyPr lIns="0" tIns="0" rIns="0" bIns="0" anchor="ctr"/>
+          <a:lstStyle/>
           <a:p>
             <a:pPr algn="ctr"/>
-            <a:endParaRPr b="0" lang="en-US" sz="4400" spc="-1" strike="noStrike">
+            <a:endParaRPr lang="en-US" sz="4400" b="0" strike="noStrike" spc="-1">
               <a:latin typeface="Arial"/>
             </a:endParaRPr>
           </a:p>
@@ -2506,11 +2738,12 @@
           </a:prstGeom>
         </p:spPr>
         <p:txBody>
-          <a:bodyPr lIns="0" rIns="0" tIns="0" bIns="0">
-            <a:normAutofit/>
-          </a:bodyPr>
-          <a:p>
-            <a:endParaRPr b="0" lang="en-US" sz="3200" spc="-1" strike="noStrike">
+          <a:bodyPr lIns="0" tIns="0" rIns="0" bIns="0">
+            <a:normAutofit/>
+          </a:bodyPr>
+          <a:lstStyle/>
+          <a:p>
+            <a:endParaRPr lang="en-US" sz="3200" b="0" strike="noStrike" spc="-1">
               <a:latin typeface="Arial"/>
             </a:endParaRPr>
           </a:p>
@@ -2536,11 +2769,12 @@
           </a:prstGeom>
         </p:spPr>
         <p:txBody>
-          <a:bodyPr lIns="0" rIns="0" tIns="0" bIns="0">
-            <a:normAutofit/>
-          </a:bodyPr>
-          <a:p>
-            <a:endParaRPr b="0" lang="en-US" sz="3200" spc="-1" strike="noStrike">
+          <a:bodyPr lIns="0" tIns="0" rIns="0" bIns="0">
+            <a:normAutofit/>
+          </a:bodyPr>
+          <a:lstStyle/>
+          <a:p>
+            <a:endParaRPr lang="en-US" sz="3200" b="0" strike="noStrike" spc="-1">
               <a:latin typeface="Arial"/>
             </a:endParaRPr>
           </a:p>
@@ -2566,11 +2800,12 @@
           </a:prstGeom>
         </p:spPr>
         <p:txBody>
-          <a:bodyPr lIns="0" rIns="0" tIns="0" bIns="0">
-            <a:normAutofit/>
-          </a:bodyPr>
-          <a:p>
-            <a:endParaRPr b="0" lang="en-US" sz="3200" spc="-1" strike="noStrike">
+          <a:bodyPr lIns="0" tIns="0" rIns="0" bIns="0">
+            <a:normAutofit/>
+          </a:bodyPr>
+          <a:lstStyle/>
+          <a:p>
+            <a:endParaRPr lang="en-US" sz="3200" b="0" strike="noStrike" spc="-1">
               <a:latin typeface="Arial"/>
             </a:endParaRPr>
           </a:p>
@@ -2578,11 +2813,14 @@
       </p:sp>
     </p:spTree>
   </p:cSld>
+  <p:clrMapOvr>
+    <a:masterClrMapping/>
+  </p:clrMapOvr>
 </p:sldLayout>
 </file>
 
 <file path=ppt/slideLayouts/slideLayout32.xml><?xml version="1.0" encoding="utf-8"?>
-<p:sldLayout xmlns:a="http://schemas.openxmlformats.org/drawingml/2006/main" xmlns:p="http://schemas.openxmlformats.org/presentationml/2006/main" xmlns:r="http://schemas.openxmlformats.org/officeDocument/2006/relationships" xmlns:p14="http://schemas.microsoft.com/office/powerpoint/2010/main" xmlns:p15="http://schemas.microsoft.com/office/powerpoint/2012/main" xmlns:mc="http://schemas.openxmlformats.org/markup-compatibility/2006" type="objAndTwoObj" preserve="1">
+<p:sldLayout xmlns:a="http://schemas.openxmlformats.org/drawingml/2006/main" xmlns:r="http://schemas.openxmlformats.org/officeDocument/2006/relationships" xmlns:p="http://schemas.openxmlformats.org/presentationml/2006/main" type="objAndTwoObj" preserve="1">
   <p:cSld name="Title Content and 2 Content">
     <p:spTree>
       <p:nvGrpSpPr>
@@ -2618,10 +2856,11 @@
           </a:prstGeom>
         </p:spPr>
         <p:txBody>
-          <a:bodyPr lIns="0" rIns="0" tIns="0" bIns="0" anchor="ctr"/>
+          <a:bodyPr lIns="0" tIns="0" rIns="0" bIns="0" anchor="ctr"/>
+          <a:lstStyle/>
           <a:p>
             <a:pPr algn="ctr"/>
-            <a:endParaRPr b="0" lang="en-US" sz="4400" spc="-1" strike="noStrike">
+            <a:endParaRPr lang="en-US" sz="4400" b="0" strike="noStrike" spc="-1">
               <a:latin typeface="Arial"/>
             </a:endParaRPr>
           </a:p>
@@ -2647,11 +2886,12 @@
           </a:prstGeom>
         </p:spPr>
         <p:txBody>
-          <a:bodyPr lIns="0" rIns="0" tIns="0" bIns="0">
-            <a:normAutofit/>
-          </a:bodyPr>
-          <a:p>
-            <a:endParaRPr b="0" lang="en-US" sz="3200" spc="-1" strike="noStrike">
+          <a:bodyPr lIns="0" tIns="0" rIns="0" bIns="0">
+            <a:normAutofit/>
+          </a:bodyPr>
+          <a:lstStyle/>
+          <a:p>
+            <a:endParaRPr lang="en-US" sz="3200" b="0" strike="noStrike" spc="-1">
               <a:latin typeface="Arial"/>
             </a:endParaRPr>
           </a:p>
@@ -2677,11 +2917,12 @@
           </a:prstGeom>
         </p:spPr>
         <p:txBody>
-          <a:bodyPr lIns="0" rIns="0" tIns="0" bIns="0">
-            <a:normAutofit/>
-          </a:bodyPr>
-          <a:p>
-            <a:endParaRPr b="0" lang="en-US" sz="3200" spc="-1" strike="noStrike">
+          <a:bodyPr lIns="0" tIns="0" rIns="0" bIns="0">
+            <a:normAutofit/>
+          </a:bodyPr>
+          <a:lstStyle/>
+          <a:p>
+            <a:endParaRPr lang="en-US" sz="3200" b="0" strike="noStrike" spc="-1">
               <a:latin typeface="Arial"/>
             </a:endParaRPr>
           </a:p>
@@ -2707,11 +2948,12 @@
           </a:prstGeom>
         </p:spPr>
         <p:txBody>
-          <a:bodyPr lIns="0" rIns="0" tIns="0" bIns="0">
-            <a:normAutofit/>
-          </a:bodyPr>
-          <a:p>
-            <a:endParaRPr b="0" lang="en-US" sz="3200" spc="-1" strike="noStrike">
+          <a:bodyPr lIns="0" tIns="0" rIns="0" bIns="0">
+            <a:normAutofit/>
+          </a:bodyPr>
+          <a:lstStyle/>
+          <a:p>
+            <a:endParaRPr lang="en-US" sz="3200" b="0" strike="noStrike" spc="-1">
               <a:latin typeface="Arial"/>
             </a:endParaRPr>
           </a:p>
@@ -2719,11 +2961,14 @@
       </p:sp>
     </p:spTree>
   </p:cSld>
+  <p:clrMapOvr>
+    <a:masterClrMapping/>
+  </p:clrMapOvr>
 </p:sldLayout>
 </file>
 
 <file path=ppt/slideLayouts/slideLayout33.xml><?xml version="1.0" encoding="utf-8"?>
-<p:sldLayout xmlns:a="http://schemas.openxmlformats.org/drawingml/2006/main" xmlns:p="http://schemas.openxmlformats.org/presentationml/2006/main" xmlns:r="http://schemas.openxmlformats.org/officeDocument/2006/relationships" xmlns:p14="http://schemas.microsoft.com/office/powerpoint/2010/main" xmlns:p15="http://schemas.microsoft.com/office/powerpoint/2012/main" xmlns:mc="http://schemas.openxmlformats.org/markup-compatibility/2006" type="twoObjOverTx" preserve="1">
+<p:sldLayout xmlns:a="http://schemas.openxmlformats.org/drawingml/2006/main" xmlns:r="http://schemas.openxmlformats.org/officeDocument/2006/relationships" xmlns:p="http://schemas.openxmlformats.org/presentationml/2006/main" type="twoObjOverTx" preserve="1">
   <p:cSld name="Title, 2 Content over Content">
     <p:spTree>
       <p:nvGrpSpPr>
@@ -2759,10 +3004,11 @@
           </a:prstGeom>
         </p:spPr>
         <p:txBody>
-          <a:bodyPr lIns="0" rIns="0" tIns="0" bIns="0" anchor="ctr"/>
+          <a:bodyPr lIns="0" tIns="0" rIns="0" bIns="0" anchor="ctr"/>
+          <a:lstStyle/>
           <a:p>
             <a:pPr algn="ctr"/>
-            <a:endParaRPr b="0" lang="en-US" sz="4400" spc="-1" strike="noStrike">
+            <a:endParaRPr lang="en-US" sz="4400" b="0" strike="noStrike" spc="-1">
               <a:latin typeface="Arial"/>
             </a:endParaRPr>
           </a:p>
@@ -2788,11 +3034,12 @@
           </a:prstGeom>
         </p:spPr>
         <p:txBody>
-          <a:bodyPr lIns="0" rIns="0" tIns="0" bIns="0">
-            <a:normAutofit/>
-          </a:bodyPr>
-          <a:p>
-            <a:endParaRPr b="0" lang="en-US" sz="3200" spc="-1" strike="noStrike">
+          <a:bodyPr lIns="0" tIns="0" rIns="0" bIns="0">
+            <a:normAutofit/>
+          </a:bodyPr>
+          <a:lstStyle/>
+          <a:p>
+            <a:endParaRPr lang="en-US" sz="3200" b="0" strike="noStrike" spc="-1">
               <a:latin typeface="Arial"/>
             </a:endParaRPr>
           </a:p>
@@ -2818,11 +3065,12 @@
           </a:prstGeom>
         </p:spPr>
         <p:txBody>
-          <a:bodyPr lIns="0" rIns="0" tIns="0" bIns="0">
-            <a:normAutofit/>
-          </a:bodyPr>
-          <a:p>
-            <a:endParaRPr b="0" lang="en-US" sz="3200" spc="-1" strike="noStrike">
+          <a:bodyPr lIns="0" tIns="0" rIns="0" bIns="0">
+            <a:normAutofit/>
+          </a:bodyPr>
+          <a:lstStyle/>
+          <a:p>
+            <a:endParaRPr lang="en-US" sz="3200" b="0" strike="noStrike" spc="-1">
               <a:latin typeface="Arial"/>
             </a:endParaRPr>
           </a:p>
@@ -2848,11 +3096,12 @@
           </a:prstGeom>
         </p:spPr>
         <p:txBody>
-          <a:bodyPr lIns="0" rIns="0" tIns="0" bIns="0">
-            <a:normAutofit/>
-          </a:bodyPr>
-          <a:p>
-            <a:endParaRPr b="0" lang="en-US" sz="3200" spc="-1" strike="noStrike">
+          <a:bodyPr lIns="0" tIns="0" rIns="0" bIns="0">
+            <a:normAutofit/>
+          </a:bodyPr>
+          <a:lstStyle/>
+          <a:p>
+            <a:endParaRPr lang="en-US" sz="3200" b="0" strike="noStrike" spc="-1">
               <a:latin typeface="Arial"/>
             </a:endParaRPr>
           </a:p>
@@ -2860,11 +3109,14 @@
       </p:sp>
     </p:spTree>
   </p:cSld>
+  <p:clrMapOvr>
+    <a:masterClrMapping/>
+  </p:clrMapOvr>
 </p:sldLayout>
 </file>
 
 <file path=ppt/slideLayouts/slideLayout34.xml><?xml version="1.0" encoding="utf-8"?>
-<p:sldLayout xmlns:a="http://schemas.openxmlformats.org/drawingml/2006/main" xmlns:p="http://schemas.openxmlformats.org/presentationml/2006/main" xmlns:r="http://schemas.openxmlformats.org/officeDocument/2006/relationships" xmlns:p14="http://schemas.microsoft.com/office/powerpoint/2010/main" xmlns:p15="http://schemas.microsoft.com/office/powerpoint/2012/main" xmlns:mc="http://schemas.openxmlformats.org/markup-compatibility/2006" type="objOverTx" preserve="1">
+<p:sldLayout xmlns:a="http://schemas.openxmlformats.org/drawingml/2006/main" xmlns:r="http://schemas.openxmlformats.org/officeDocument/2006/relationships" xmlns:p="http://schemas.openxmlformats.org/presentationml/2006/main" type="objOverTx" preserve="1">
   <p:cSld name="Title, Content over Content">
     <p:spTree>
       <p:nvGrpSpPr>
@@ -2900,10 +3152,11 @@
           </a:prstGeom>
         </p:spPr>
         <p:txBody>
-          <a:bodyPr lIns="0" rIns="0" tIns="0" bIns="0" anchor="ctr"/>
+          <a:bodyPr lIns="0" tIns="0" rIns="0" bIns="0" anchor="ctr"/>
+          <a:lstStyle/>
           <a:p>
             <a:pPr algn="ctr"/>
-            <a:endParaRPr b="0" lang="en-US" sz="4400" spc="-1" strike="noStrike">
+            <a:endParaRPr lang="en-US" sz="4400" b="0" strike="noStrike" spc="-1">
               <a:latin typeface="Arial"/>
             </a:endParaRPr>
           </a:p>
@@ -2929,11 +3182,12 @@
           </a:prstGeom>
         </p:spPr>
         <p:txBody>
-          <a:bodyPr lIns="0" rIns="0" tIns="0" bIns="0">
-            <a:normAutofit/>
-          </a:bodyPr>
-          <a:p>
-            <a:endParaRPr b="0" lang="en-US" sz="3200" spc="-1" strike="noStrike">
+          <a:bodyPr lIns="0" tIns="0" rIns="0" bIns="0">
+            <a:normAutofit/>
+          </a:bodyPr>
+          <a:lstStyle/>
+          <a:p>
+            <a:endParaRPr lang="en-US" sz="3200" b="0" strike="noStrike" spc="-1">
               <a:latin typeface="Arial"/>
             </a:endParaRPr>
           </a:p>
@@ -2959,11 +3213,12 @@
           </a:prstGeom>
         </p:spPr>
         <p:txBody>
-          <a:bodyPr lIns="0" rIns="0" tIns="0" bIns="0">
-            <a:normAutofit/>
-          </a:bodyPr>
-          <a:p>
-            <a:endParaRPr b="0" lang="en-US" sz="3200" spc="-1" strike="noStrike">
+          <a:bodyPr lIns="0" tIns="0" rIns="0" bIns="0">
+            <a:normAutofit/>
+          </a:bodyPr>
+          <a:lstStyle/>
+          <a:p>
+            <a:endParaRPr lang="en-US" sz="3200" b="0" strike="noStrike" spc="-1">
               <a:latin typeface="Arial"/>
             </a:endParaRPr>
           </a:p>
@@ -2971,11 +3226,14 @@
       </p:sp>
     </p:spTree>
   </p:cSld>
+  <p:clrMapOvr>
+    <a:masterClrMapping/>
+  </p:clrMapOvr>
 </p:sldLayout>
 </file>
 
 <file path=ppt/slideLayouts/slideLayout35.xml><?xml version="1.0" encoding="utf-8"?>
-<p:sldLayout xmlns:a="http://schemas.openxmlformats.org/drawingml/2006/main" xmlns:p="http://schemas.openxmlformats.org/presentationml/2006/main" xmlns:r="http://schemas.openxmlformats.org/officeDocument/2006/relationships" xmlns:p14="http://schemas.microsoft.com/office/powerpoint/2010/main" xmlns:p15="http://schemas.microsoft.com/office/powerpoint/2012/main" xmlns:mc="http://schemas.openxmlformats.org/markup-compatibility/2006" type="fourObj" preserve="1">
+<p:sldLayout xmlns:a="http://schemas.openxmlformats.org/drawingml/2006/main" xmlns:r="http://schemas.openxmlformats.org/officeDocument/2006/relationships" xmlns:p="http://schemas.openxmlformats.org/presentationml/2006/main" type="fourObj" preserve="1">
   <p:cSld name="Title, 4 Content">
     <p:spTree>
       <p:nvGrpSpPr>
@@ -3011,10 +3269,11 @@
           </a:prstGeom>
         </p:spPr>
         <p:txBody>
-          <a:bodyPr lIns="0" rIns="0" tIns="0" bIns="0" anchor="ctr"/>
+          <a:bodyPr lIns="0" tIns="0" rIns="0" bIns="0" anchor="ctr"/>
+          <a:lstStyle/>
           <a:p>
             <a:pPr algn="ctr"/>
-            <a:endParaRPr b="0" lang="en-US" sz="4400" spc="-1" strike="noStrike">
+            <a:endParaRPr lang="en-US" sz="4400" b="0" strike="noStrike" spc="-1">
               <a:latin typeface="Arial"/>
             </a:endParaRPr>
           </a:p>
@@ -3040,11 +3299,12 @@
           </a:prstGeom>
         </p:spPr>
         <p:txBody>
-          <a:bodyPr lIns="0" rIns="0" tIns="0" bIns="0">
-            <a:normAutofit/>
-          </a:bodyPr>
-          <a:p>
-            <a:endParaRPr b="0" lang="en-US" sz="3200" spc="-1" strike="noStrike">
+          <a:bodyPr lIns="0" tIns="0" rIns="0" bIns="0">
+            <a:normAutofit/>
+          </a:bodyPr>
+          <a:lstStyle/>
+          <a:p>
+            <a:endParaRPr lang="en-US" sz="3200" b="0" strike="noStrike" spc="-1">
               <a:latin typeface="Arial"/>
             </a:endParaRPr>
           </a:p>
@@ -3070,11 +3330,12 @@
           </a:prstGeom>
         </p:spPr>
         <p:txBody>
-          <a:bodyPr lIns="0" rIns="0" tIns="0" bIns="0">
-            <a:normAutofit/>
-          </a:bodyPr>
-          <a:p>
-            <a:endParaRPr b="0" lang="en-US" sz="3200" spc="-1" strike="noStrike">
+          <a:bodyPr lIns="0" tIns="0" rIns="0" bIns="0">
+            <a:normAutofit/>
+          </a:bodyPr>
+          <a:lstStyle/>
+          <a:p>
+            <a:endParaRPr lang="en-US" sz="3200" b="0" strike="noStrike" spc="-1">
               <a:latin typeface="Arial"/>
             </a:endParaRPr>
           </a:p>
@@ -3100,11 +3361,12 @@
           </a:prstGeom>
         </p:spPr>
         <p:txBody>
-          <a:bodyPr lIns="0" rIns="0" tIns="0" bIns="0">
-            <a:normAutofit/>
-          </a:bodyPr>
-          <a:p>
-            <a:endParaRPr b="0" lang="en-US" sz="3200" spc="-1" strike="noStrike">
+          <a:bodyPr lIns="0" tIns="0" rIns="0" bIns="0">
+            <a:normAutofit/>
+          </a:bodyPr>
+          <a:lstStyle/>
+          <a:p>
+            <a:endParaRPr lang="en-US" sz="3200" b="0" strike="noStrike" spc="-1">
               <a:latin typeface="Arial"/>
             </a:endParaRPr>
           </a:p>
@@ -3130,11 +3392,12 @@
           </a:prstGeom>
         </p:spPr>
         <p:txBody>
-          <a:bodyPr lIns="0" rIns="0" tIns="0" bIns="0">
-            <a:normAutofit/>
-          </a:bodyPr>
-          <a:p>
-            <a:endParaRPr b="0" lang="en-US" sz="3200" spc="-1" strike="noStrike">
+          <a:bodyPr lIns="0" tIns="0" rIns="0" bIns="0">
+            <a:normAutofit/>
+          </a:bodyPr>
+          <a:lstStyle/>
+          <a:p>
+            <a:endParaRPr lang="en-US" sz="3200" b="0" strike="noStrike" spc="-1">
               <a:latin typeface="Arial"/>
             </a:endParaRPr>
           </a:p>
@@ -3142,11 +3405,14 @@
       </p:sp>
     </p:spTree>
   </p:cSld>
+  <p:clrMapOvr>
+    <a:masterClrMapping/>
+  </p:clrMapOvr>
 </p:sldLayout>
 </file>
 
 <file path=ppt/slideLayouts/slideLayout36.xml><?xml version="1.0" encoding="utf-8"?>
-<p:sldLayout xmlns:a="http://schemas.openxmlformats.org/drawingml/2006/main" xmlns:p="http://schemas.openxmlformats.org/presentationml/2006/main" xmlns:r="http://schemas.openxmlformats.org/officeDocument/2006/relationships" xmlns:p14="http://schemas.microsoft.com/office/powerpoint/2010/main" xmlns:p15="http://schemas.microsoft.com/office/powerpoint/2012/main" xmlns:mc="http://schemas.openxmlformats.org/markup-compatibility/2006" type="blank" preserve="1">
+<p:sldLayout xmlns:a="http://schemas.openxmlformats.org/drawingml/2006/main" xmlns:r="http://schemas.openxmlformats.org/officeDocument/2006/relationships" xmlns:p="http://schemas.openxmlformats.org/presentationml/2006/main" type="blank" preserve="1">
   <p:cSld name="Title, 6 Content">
     <p:spTree>
       <p:nvGrpSpPr>
@@ -3182,10 +3448,11 @@
           </a:prstGeom>
         </p:spPr>
         <p:txBody>
-          <a:bodyPr lIns="0" rIns="0" tIns="0" bIns="0" anchor="ctr"/>
+          <a:bodyPr lIns="0" tIns="0" rIns="0" bIns="0" anchor="ctr"/>
+          <a:lstStyle/>
           <a:p>
             <a:pPr algn="ctr"/>
-            <a:endParaRPr b="0" lang="en-US" sz="4400" spc="-1" strike="noStrike">
+            <a:endParaRPr lang="en-US" sz="4400" b="0" strike="noStrike" spc="-1">
               <a:latin typeface="Arial"/>
             </a:endParaRPr>
           </a:p>
@@ -3211,11 +3478,12 @@
           </a:prstGeom>
         </p:spPr>
         <p:txBody>
-          <a:bodyPr lIns="0" rIns="0" tIns="0" bIns="0">
-            <a:normAutofit/>
-          </a:bodyPr>
-          <a:p>
-            <a:endParaRPr b="0" lang="en-US" sz="3200" spc="-1" strike="noStrike">
+          <a:bodyPr lIns="0" tIns="0" rIns="0" bIns="0">
+            <a:normAutofit/>
+          </a:bodyPr>
+          <a:lstStyle/>
+          <a:p>
+            <a:endParaRPr lang="en-US" sz="3200" b="0" strike="noStrike" spc="-1">
               <a:latin typeface="Arial"/>
             </a:endParaRPr>
           </a:p>
@@ -3241,11 +3509,12 @@
           </a:prstGeom>
         </p:spPr>
         <p:txBody>
-          <a:bodyPr lIns="0" rIns="0" tIns="0" bIns="0">
-            <a:normAutofit/>
-          </a:bodyPr>
-          <a:p>
-            <a:endParaRPr b="0" lang="en-US" sz="3200" spc="-1" strike="noStrike">
+          <a:bodyPr lIns="0" tIns="0" rIns="0" bIns="0">
+            <a:normAutofit/>
+          </a:bodyPr>
+          <a:lstStyle/>
+          <a:p>
+            <a:endParaRPr lang="en-US" sz="3200" b="0" strike="noStrike" spc="-1">
               <a:latin typeface="Arial"/>
             </a:endParaRPr>
           </a:p>
@@ -3271,11 +3540,12 @@
           </a:prstGeom>
         </p:spPr>
         <p:txBody>
-          <a:bodyPr lIns="0" rIns="0" tIns="0" bIns="0">
-            <a:normAutofit/>
-          </a:bodyPr>
-          <a:p>
-            <a:endParaRPr b="0" lang="en-US" sz="3200" spc="-1" strike="noStrike">
+          <a:bodyPr lIns="0" tIns="0" rIns="0" bIns="0">
+            <a:normAutofit/>
+          </a:bodyPr>
+          <a:lstStyle/>
+          <a:p>
+            <a:endParaRPr lang="en-US" sz="3200" b="0" strike="noStrike" spc="-1">
               <a:latin typeface="Arial"/>
             </a:endParaRPr>
           </a:p>
@@ -3301,11 +3571,12 @@
           </a:prstGeom>
         </p:spPr>
         <p:txBody>
-          <a:bodyPr lIns="0" rIns="0" tIns="0" bIns="0">
-            <a:normAutofit/>
-          </a:bodyPr>
-          <a:p>
-            <a:endParaRPr b="0" lang="en-US" sz="3200" spc="-1" strike="noStrike">
+          <a:bodyPr lIns="0" tIns="0" rIns="0" bIns="0">
+            <a:normAutofit/>
+          </a:bodyPr>
+          <a:lstStyle/>
+          <a:p>
+            <a:endParaRPr lang="en-US" sz="3200" b="0" strike="noStrike" spc="-1">
               <a:latin typeface="Arial"/>
             </a:endParaRPr>
           </a:p>
@@ -3331,11 +3602,12 @@
           </a:prstGeom>
         </p:spPr>
         <p:txBody>
-          <a:bodyPr lIns="0" rIns="0" tIns="0" bIns="0">
-            <a:normAutofit/>
-          </a:bodyPr>
-          <a:p>
-            <a:endParaRPr b="0" lang="en-US" sz="3200" spc="-1" strike="noStrike">
+          <a:bodyPr lIns="0" tIns="0" rIns="0" bIns="0">
+            <a:normAutofit/>
+          </a:bodyPr>
+          <a:lstStyle/>
+          <a:p>
+            <a:endParaRPr lang="en-US" sz="3200" b="0" strike="noStrike" spc="-1">
               <a:latin typeface="Arial"/>
             </a:endParaRPr>
           </a:p>
@@ -3361,11 +3633,12 @@
           </a:prstGeom>
         </p:spPr>
         <p:txBody>
-          <a:bodyPr lIns="0" rIns="0" tIns="0" bIns="0">
-            <a:normAutofit/>
-          </a:bodyPr>
-          <a:p>
-            <a:endParaRPr b="0" lang="en-US" sz="3200" spc="-1" strike="noStrike">
+          <a:bodyPr lIns="0" tIns="0" rIns="0" bIns="0">
+            <a:normAutofit/>
+          </a:bodyPr>
+          <a:lstStyle/>
+          <a:p>
+            <a:endParaRPr lang="en-US" sz="3200" b="0" strike="noStrike" spc="-1">
               <a:latin typeface="Arial"/>
             </a:endParaRPr>
           </a:p>
@@ -3373,11 +3646,14 @@
       </p:sp>
     </p:spTree>
   </p:cSld>
+  <p:clrMapOvr>
+    <a:masterClrMapping/>
+  </p:clrMapOvr>
 </p:sldLayout>
 </file>
 
 <file path=ppt/slideLayouts/slideLayout4.xml><?xml version="1.0" encoding="utf-8"?>
-<p:sldLayout xmlns:a="http://schemas.openxmlformats.org/drawingml/2006/main" xmlns:p="http://schemas.openxmlformats.org/presentationml/2006/main" xmlns:r="http://schemas.openxmlformats.org/officeDocument/2006/relationships" xmlns:p14="http://schemas.microsoft.com/office/powerpoint/2010/main" xmlns:p15="http://schemas.microsoft.com/office/powerpoint/2012/main" xmlns:mc="http://schemas.openxmlformats.org/markup-compatibility/2006" type="twoObj" preserve="1">
+<p:sldLayout xmlns:a="http://schemas.openxmlformats.org/drawingml/2006/main" xmlns:r="http://schemas.openxmlformats.org/officeDocument/2006/relationships" xmlns:p="http://schemas.openxmlformats.org/presentationml/2006/main" type="twoObj" preserve="1">
   <p:cSld name="Title, 2 Content">
     <p:spTree>
       <p:nvGrpSpPr>
@@ -3413,10 +3689,11 @@
           </a:prstGeom>
         </p:spPr>
         <p:txBody>
-          <a:bodyPr lIns="0" rIns="0" tIns="0" bIns="0" anchor="ctr"/>
+          <a:bodyPr lIns="0" tIns="0" rIns="0" bIns="0" anchor="ctr"/>
+          <a:lstStyle/>
           <a:p>
             <a:pPr algn="ctr"/>
-            <a:endParaRPr b="0" lang="en-US" sz="4400" spc="-1" strike="noStrike">
+            <a:endParaRPr lang="en-US" sz="4400" b="0" strike="noStrike" spc="-1">
               <a:latin typeface="Arial"/>
             </a:endParaRPr>
           </a:p>
@@ -3442,11 +3719,12 @@
           </a:prstGeom>
         </p:spPr>
         <p:txBody>
-          <a:bodyPr lIns="0" rIns="0" tIns="0" bIns="0">
-            <a:normAutofit/>
-          </a:bodyPr>
-          <a:p>
-            <a:endParaRPr b="0" lang="en-US" sz="3200" spc="-1" strike="noStrike">
+          <a:bodyPr lIns="0" tIns="0" rIns="0" bIns="0">
+            <a:normAutofit/>
+          </a:bodyPr>
+          <a:lstStyle/>
+          <a:p>
+            <a:endParaRPr lang="en-US" sz="3200" b="0" strike="noStrike" spc="-1">
               <a:latin typeface="Arial"/>
             </a:endParaRPr>
           </a:p>
@@ -3472,11 +3750,12 @@
           </a:prstGeom>
         </p:spPr>
         <p:txBody>
-          <a:bodyPr lIns="0" rIns="0" tIns="0" bIns="0">
-            <a:normAutofit/>
-          </a:bodyPr>
-          <a:p>
-            <a:endParaRPr b="0" lang="en-US" sz="3200" spc="-1" strike="noStrike">
+          <a:bodyPr lIns="0" tIns="0" rIns="0" bIns="0">
+            <a:normAutofit/>
+          </a:bodyPr>
+          <a:lstStyle/>
+          <a:p>
+            <a:endParaRPr lang="en-US" sz="3200" b="0" strike="noStrike" spc="-1">
               <a:latin typeface="Arial"/>
             </a:endParaRPr>
           </a:p>
@@ -3484,11 +3763,14 @@
       </p:sp>
     </p:spTree>
   </p:cSld>
+  <p:clrMapOvr>
+    <a:masterClrMapping/>
+  </p:clrMapOvr>
 </p:sldLayout>
 </file>
 
 <file path=ppt/slideLayouts/slideLayout5.xml><?xml version="1.0" encoding="utf-8"?>
-<p:sldLayout xmlns:a="http://schemas.openxmlformats.org/drawingml/2006/main" xmlns:p="http://schemas.openxmlformats.org/presentationml/2006/main" xmlns:r="http://schemas.openxmlformats.org/officeDocument/2006/relationships" xmlns:p14="http://schemas.microsoft.com/office/powerpoint/2010/main" xmlns:p15="http://schemas.microsoft.com/office/powerpoint/2012/main" xmlns:mc="http://schemas.openxmlformats.org/markup-compatibility/2006" type="titleOnly" preserve="1">
+<p:sldLayout xmlns:a="http://schemas.openxmlformats.org/drawingml/2006/main" xmlns:r="http://schemas.openxmlformats.org/officeDocument/2006/relationships" xmlns:p="http://schemas.openxmlformats.org/presentationml/2006/main" type="titleOnly" preserve="1">
   <p:cSld name="Title Only">
     <p:spTree>
       <p:nvGrpSpPr>
@@ -3524,10 +3806,11 @@
           </a:prstGeom>
         </p:spPr>
         <p:txBody>
-          <a:bodyPr lIns="0" rIns="0" tIns="0" bIns="0" anchor="ctr"/>
+          <a:bodyPr lIns="0" tIns="0" rIns="0" bIns="0" anchor="ctr"/>
+          <a:lstStyle/>
           <a:p>
             <a:pPr algn="ctr"/>
-            <a:endParaRPr b="0" lang="en-US" sz="4400" spc="-1" strike="noStrike">
+            <a:endParaRPr lang="en-US" sz="4400" b="0" strike="noStrike" spc="-1">
               <a:latin typeface="Arial"/>
             </a:endParaRPr>
           </a:p>
@@ -3535,11 +3818,14 @@
       </p:sp>
     </p:spTree>
   </p:cSld>
+  <p:clrMapOvr>
+    <a:masterClrMapping/>
+  </p:clrMapOvr>
 </p:sldLayout>
 </file>
 
 <file path=ppt/slideLayouts/slideLayout6.xml><?xml version="1.0" encoding="utf-8"?>
-<p:sldLayout xmlns:a="http://schemas.openxmlformats.org/drawingml/2006/main" xmlns:p="http://schemas.openxmlformats.org/presentationml/2006/main" xmlns:r="http://schemas.openxmlformats.org/officeDocument/2006/relationships" xmlns:p14="http://schemas.microsoft.com/office/powerpoint/2010/main" xmlns:p15="http://schemas.microsoft.com/office/powerpoint/2012/main" xmlns:mc="http://schemas.openxmlformats.org/markup-compatibility/2006" type="objOnly" preserve="1">
+<p:sldLayout xmlns:a="http://schemas.openxmlformats.org/drawingml/2006/main" xmlns:r="http://schemas.openxmlformats.org/officeDocument/2006/relationships" xmlns:p="http://schemas.openxmlformats.org/presentationml/2006/main" type="objOnly" preserve="1">
   <p:cSld name="Centered Text">
     <p:spTree>
       <p:nvGrpSpPr>
@@ -3575,10 +3861,11 @@
           </a:prstGeom>
         </p:spPr>
         <p:txBody>
-          <a:bodyPr lIns="0" rIns="0" tIns="0" bIns="0" anchor="ctr"/>
+          <a:bodyPr lIns="0" tIns="0" rIns="0" bIns="0" anchor="ctr"/>
+          <a:lstStyle/>
           <a:p>
             <a:pPr algn="ctr"/>
-            <a:endParaRPr b="0" lang="en-US" sz="3200" spc="-1" strike="noStrike">
+            <a:endParaRPr lang="en-US" sz="3200" b="0" strike="noStrike" spc="-1">
               <a:latin typeface="Arial"/>
             </a:endParaRPr>
           </a:p>
@@ -3586,11 +3873,14 @@
       </p:sp>
     </p:spTree>
   </p:cSld>
+  <p:clrMapOvr>
+    <a:masterClrMapping/>
+  </p:clrMapOvr>
 </p:sldLayout>
 </file>
 
 <file path=ppt/slideLayouts/slideLayout7.xml><?xml version="1.0" encoding="utf-8"?>
-<p:sldLayout xmlns:a="http://schemas.openxmlformats.org/drawingml/2006/main" xmlns:p="http://schemas.openxmlformats.org/presentationml/2006/main" xmlns:r="http://schemas.openxmlformats.org/officeDocument/2006/relationships" xmlns:p14="http://schemas.microsoft.com/office/powerpoint/2010/main" xmlns:p15="http://schemas.microsoft.com/office/powerpoint/2012/main" xmlns:mc="http://schemas.openxmlformats.org/markup-compatibility/2006" type="twoObjAndObj" preserve="1">
+<p:sldLayout xmlns:a="http://schemas.openxmlformats.org/drawingml/2006/main" xmlns:r="http://schemas.openxmlformats.org/officeDocument/2006/relationships" xmlns:p="http://schemas.openxmlformats.org/presentationml/2006/main" type="twoObjAndObj" preserve="1">
   <p:cSld name="Title, 2 Content and Content">
     <p:spTree>
       <p:nvGrpSpPr>
@@ -3626,10 +3916,11 @@
           </a:prstGeom>
         </p:spPr>
         <p:txBody>
-          <a:bodyPr lIns="0" rIns="0" tIns="0" bIns="0" anchor="ctr"/>
+          <a:bodyPr lIns="0" tIns="0" rIns="0" bIns="0" anchor="ctr"/>
+          <a:lstStyle/>
           <a:p>
             <a:pPr algn="ctr"/>
-            <a:endParaRPr b="0" lang="en-US" sz="4400" spc="-1" strike="noStrike">
+            <a:endParaRPr lang="en-US" sz="4400" b="0" strike="noStrike" spc="-1">
               <a:latin typeface="Arial"/>
             </a:endParaRPr>
           </a:p>
@@ -3655,11 +3946,12 @@
           </a:prstGeom>
         </p:spPr>
         <p:txBody>
-          <a:bodyPr lIns="0" rIns="0" tIns="0" bIns="0">
-            <a:normAutofit/>
-          </a:bodyPr>
-          <a:p>
-            <a:endParaRPr b="0" lang="en-US" sz="3200" spc="-1" strike="noStrike">
+          <a:bodyPr lIns="0" tIns="0" rIns="0" bIns="0">
+            <a:normAutofit/>
+          </a:bodyPr>
+          <a:lstStyle/>
+          <a:p>
+            <a:endParaRPr lang="en-US" sz="3200" b="0" strike="noStrike" spc="-1">
               <a:latin typeface="Arial"/>
             </a:endParaRPr>
           </a:p>
@@ -3685,11 +3977,12 @@
           </a:prstGeom>
         </p:spPr>
         <p:txBody>
-          <a:bodyPr lIns="0" rIns="0" tIns="0" bIns="0">
-            <a:normAutofit/>
-          </a:bodyPr>
-          <a:p>
-            <a:endParaRPr b="0" lang="en-US" sz="3200" spc="-1" strike="noStrike">
+          <a:bodyPr lIns="0" tIns="0" rIns="0" bIns="0">
+            <a:normAutofit/>
+          </a:bodyPr>
+          <a:lstStyle/>
+          <a:p>
+            <a:endParaRPr lang="en-US" sz="3200" b="0" strike="noStrike" spc="-1">
               <a:latin typeface="Arial"/>
             </a:endParaRPr>
           </a:p>
@@ -3715,11 +4008,12 @@
           </a:prstGeom>
         </p:spPr>
         <p:txBody>
-          <a:bodyPr lIns="0" rIns="0" tIns="0" bIns="0">
-            <a:normAutofit/>
-          </a:bodyPr>
-          <a:p>
-            <a:endParaRPr b="0" lang="en-US" sz="3200" spc="-1" strike="noStrike">
+          <a:bodyPr lIns="0" tIns="0" rIns="0" bIns="0">
+            <a:normAutofit/>
+          </a:bodyPr>
+          <a:lstStyle/>
+          <a:p>
+            <a:endParaRPr lang="en-US" sz="3200" b="0" strike="noStrike" spc="-1">
               <a:latin typeface="Arial"/>
             </a:endParaRPr>
           </a:p>
@@ -3727,11 +4021,14 @@
       </p:sp>
     </p:spTree>
   </p:cSld>
+  <p:clrMapOvr>
+    <a:masterClrMapping/>
+  </p:clrMapOvr>
 </p:sldLayout>
 </file>
 
 <file path=ppt/slideLayouts/slideLayout8.xml><?xml version="1.0" encoding="utf-8"?>
-<p:sldLayout xmlns:a="http://schemas.openxmlformats.org/drawingml/2006/main" xmlns:p="http://schemas.openxmlformats.org/presentationml/2006/main" xmlns:r="http://schemas.openxmlformats.org/officeDocument/2006/relationships" xmlns:p14="http://schemas.microsoft.com/office/powerpoint/2010/main" xmlns:p15="http://schemas.microsoft.com/office/powerpoint/2012/main" xmlns:mc="http://schemas.openxmlformats.org/markup-compatibility/2006" type="objAndTwoObj" preserve="1">
+<p:sldLayout xmlns:a="http://schemas.openxmlformats.org/drawingml/2006/main" xmlns:r="http://schemas.openxmlformats.org/officeDocument/2006/relationships" xmlns:p="http://schemas.openxmlformats.org/presentationml/2006/main" type="objAndTwoObj" preserve="1">
   <p:cSld name="Title Content and 2 Content">
     <p:spTree>
       <p:nvGrpSpPr>
@@ -3767,10 +4064,11 @@
           </a:prstGeom>
         </p:spPr>
         <p:txBody>
-          <a:bodyPr lIns="0" rIns="0" tIns="0" bIns="0" anchor="ctr"/>
+          <a:bodyPr lIns="0" tIns="0" rIns="0" bIns="0" anchor="ctr"/>
+          <a:lstStyle/>
           <a:p>
             <a:pPr algn="ctr"/>
-            <a:endParaRPr b="0" lang="en-US" sz="4400" spc="-1" strike="noStrike">
+            <a:endParaRPr lang="en-US" sz="4400" b="0" strike="noStrike" spc="-1">
               <a:latin typeface="Arial"/>
             </a:endParaRPr>
           </a:p>
@@ -3796,11 +4094,12 @@
           </a:prstGeom>
         </p:spPr>
         <p:txBody>
-          <a:bodyPr lIns="0" rIns="0" tIns="0" bIns="0">
-            <a:normAutofit/>
-          </a:bodyPr>
-          <a:p>
-            <a:endParaRPr b="0" lang="en-US" sz="3200" spc="-1" strike="noStrike">
+          <a:bodyPr lIns="0" tIns="0" rIns="0" bIns="0">
+            <a:normAutofit/>
+          </a:bodyPr>
+          <a:lstStyle/>
+          <a:p>
+            <a:endParaRPr lang="en-US" sz="3200" b="0" strike="noStrike" spc="-1">
               <a:latin typeface="Arial"/>
             </a:endParaRPr>
           </a:p>
@@ -3826,11 +4125,12 @@
           </a:prstGeom>
         </p:spPr>
         <p:txBody>
-          <a:bodyPr lIns="0" rIns="0" tIns="0" bIns="0">
-            <a:normAutofit/>
-          </a:bodyPr>
-          <a:p>
-            <a:endParaRPr b="0" lang="en-US" sz="3200" spc="-1" strike="noStrike">
+          <a:bodyPr lIns="0" tIns="0" rIns="0" bIns="0">
+            <a:normAutofit/>
+          </a:bodyPr>
+          <a:lstStyle/>
+          <a:p>
+            <a:endParaRPr lang="en-US" sz="3200" b="0" strike="noStrike" spc="-1">
               <a:latin typeface="Arial"/>
             </a:endParaRPr>
           </a:p>
@@ -3856,11 +4156,12 @@
           </a:prstGeom>
         </p:spPr>
         <p:txBody>
-          <a:bodyPr lIns="0" rIns="0" tIns="0" bIns="0">
-            <a:normAutofit/>
-          </a:bodyPr>
-          <a:p>
-            <a:endParaRPr b="0" lang="en-US" sz="3200" spc="-1" strike="noStrike">
+          <a:bodyPr lIns="0" tIns="0" rIns="0" bIns="0">
+            <a:normAutofit/>
+          </a:bodyPr>
+          <a:lstStyle/>
+          <a:p>
+            <a:endParaRPr lang="en-US" sz="3200" b="0" strike="noStrike" spc="-1">
               <a:latin typeface="Arial"/>
             </a:endParaRPr>
           </a:p>
@@ -3868,11 +4169,14 @@
       </p:sp>
     </p:spTree>
   </p:cSld>
+  <p:clrMapOvr>
+    <a:masterClrMapping/>
+  </p:clrMapOvr>
 </p:sldLayout>
 </file>
 
 <file path=ppt/slideLayouts/slideLayout9.xml><?xml version="1.0" encoding="utf-8"?>
-<p:sldLayout xmlns:a="http://schemas.openxmlformats.org/drawingml/2006/main" xmlns:p="http://schemas.openxmlformats.org/presentationml/2006/main" xmlns:r="http://schemas.openxmlformats.org/officeDocument/2006/relationships" xmlns:p14="http://schemas.microsoft.com/office/powerpoint/2010/main" xmlns:p15="http://schemas.microsoft.com/office/powerpoint/2012/main" xmlns:mc="http://schemas.openxmlformats.org/markup-compatibility/2006" type="twoObjOverTx" preserve="1">
+<p:sldLayout xmlns:a="http://schemas.openxmlformats.org/drawingml/2006/main" xmlns:r="http://schemas.openxmlformats.org/officeDocument/2006/relationships" xmlns:p="http://schemas.openxmlformats.org/presentationml/2006/main" type="twoObjOverTx" preserve="1">
   <p:cSld name="Title, 2 Content over Content">
     <p:spTree>
       <p:nvGrpSpPr>
@@ -3908,10 +4212,11 @@
           </a:prstGeom>
         </p:spPr>
         <p:txBody>
-          <a:bodyPr lIns="0" rIns="0" tIns="0" bIns="0" anchor="ctr"/>
+          <a:bodyPr lIns="0" tIns="0" rIns="0" bIns="0" anchor="ctr"/>
+          <a:lstStyle/>
           <a:p>
             <a:pPr algn="ctr"/>
-            <a:endParaRPr b="0" lang="en-US" sz="4400" spc="-1" strike="noStrike">
+            <a:endParaRPr lang="en-US" sz="4400" b="0" strike="noStrike" spc="-1">
               <a:latin typeface="Arial"/>
             </a:endParaRPr>
           </a:p>
@@ -3937,11 +4242,12 @@
           </a:prstGeom>
         </p:spPr>
         <p:txBody>
-          <a:bodyPr lIns="0" rIns="0" tIns="0" bIns="0">
-            <a:normAutofit/>
-          </a:bodyPr>
-          <a:p>
-            <a:endParaRPr b="0" lang="en-US" sz="3200" spc="-1" strike="noStrike">
+          <a:bodyPr lIns="0" tIns="0" rIns="0" bIns="0">
+            <a:normAutofit/>
+          </a:bodyPr>
+          <a:lstStyle/>
+          <a:p>
+            <a:endParaRPr lang="en-US" sz="3200" b="0" strike="noStrike" spc="-1">
               <a:latin typeface="Arial"/>
             </a:endParaRPr>
           </a:p>
@@ -3967,11 +4273,12 @@
           </a:prstGeom>
         </p:spPr>
         <p:txBody>
-          <a:bodyPr lIns="0" rIns="0" tIns="0" bIns="0">
-            <a:normAutofit/>
-          </a:bodyPr>
-          <a:p>
-            <a:endParaRPr b="0" lang="en-US" sz="3200" spc="-1" strike="noStrike">
+          <a:bodyPr lIns="0" tIns="0" rIns="0" bIns="0">
+            <a:normAutofit/>
+          </a:bodyPr>
+          <a:lstStyle/>
+          <a:p>
+            <a:endParaRPr lang="en-US" sz="3200" b="0" strike="noStrike" spc="-1">
               <a:latin typeface="Arial"/>
             </a:endParaRPr>
           </a:p>
@@ -3997,11 +4304,12 @@
           </a:prstGeom>
         </p:spPr>
         <p:txBody>
-          <a:bodyPr lIns="0" rIns="0" tIns="0" bIns="0">
-            <a:normAutofit/>
-          </a:bodyPr>
-          <a:p>
-            <a:endParaRPr b="0" lang="en-US" sz="3200" spc="-1" strike="noStrike">
+          <a:bodyPr lIns="0" tIns="0" rIns="0" bIns="0">
+            <a:normAutofit/>
+          </a:bodyPr>
+          <a:lstStyle/>
+          <a:p>
+            <a:endParaRPr lang="en-US" sz="3200" b="0" strike="noStrike" spc="-1">
               <a:latin typeface="Arial"/>
             </a:endParaRPr>
           </a:p>
@@ -4009,20 +4317,24 @@
       </p:sp>
     </p:spTree>
   </p:cSld>
+  <p:clrMapOvr>
+    <a:masterClrMapping/>
+  </p:clrMapOvr>
 </p:sldLayout>
 </file>
 
 <file path=ppt/slideMasters/slideMaster1.xml><?xml version="1.0" encoding="utf-8"?>
-<p:sldMaster xmlns:a="http://schemas.openxmlformats.org/drawingml/2006/main" xmlns:p="http://schemas.openxmlformats.org/presentationml/2006/main" xmlns:r="http://schemas.openxmlformats.org/officeDocument/2006/relationships" xmlns:p14="http://schemas.microsoft.com/office/powerpoint/2010/main" xmlns:p15="http://schemas.microsoft.com/office/powerpoint/2012/main" xmlns:mc="http://schemas.openxmlformats.org/markup-compatibility/2006">
+<p:sldMaster xmlns:a="http://schemas.openxmlformats.org/drawingml/2006/main" xmlns:r="http://schemas.openxmlformats.org/officeDocument/2006/relationships" xmlns:p="http://schemas.openxmlformats.org/presentationml/2006/main">
   <p:cSld>
     <p:bg>
       <p:bgPr>
         <a:blipFill rotWithShape="0">
-          <a:blip r:embed="rId2"/>
+          <a:blip r:embed="rId14"/>
           <a:stretch>
             <a:fillRect/>
           </a:stretch>
         </a:blipFill>
+        <a:effectLst/>
       </p:bgPr>
     </p:bg>
     <p:spTree>
@@ -4041,7 +4353,7 @@
       </p:grpSpPr>
       <p:sp>
         <p:nvSpPr>
-          <p:cNvPr id="0" name="PlaceHolder 1"/>
+          <p:cNvPr id="2" name="PlaceHolder 1"/>
           <p:cNvSpPr>
             <a:spLocks noGrp="1"/>
           </p:cNvSpPr>
@@ -4059,23 +4371,21 @@
           </a:prstGeom>
         </p:spPr>
         <p:txBody>
-          <a:bodyPr lIns="0" rIns="0" tIns="0" bIns="0" anchor="ctr"/>
+          <a:bodyPr lIns="0" tIns="0" rIns="0" bIns="0" anchor="ctr"/>
+          <a:lstStyle/>
           <a:p>
             <a:r>
-              <a:rPr b="0" lang="en-US" sz="1800" spc="-1" strike="noStrike">
+              <a:rPr lang="en-US" sz="1800" b="0" strike="noStrike" spc="-1">
                 <a:latin typeface="Arial"/>
               </a:rPr>
               <a:t>Click to edit the title text format</a:t>
             </a:r>
-            <a:endParaRPr b="0" lang="en-US" sz="1800" spc="-1" strike="noStrike">
-              <a:latin typeface="Arial"/>
-            </a:endParaRPr>
-          </a:p>
-        </p:txBody>
-      </p:sp>
-      <p:sp>
-        <p:nvSpPr>
-          <p:cNvPr id="1" name="PlaceHolder 2"/>
+          </a:p>
+        </p:txBody>
+      </p:sp>
+      <p:sp>
+        <p:nvSpPr>
+          <p:cNvPr id="3" name="PlaceHolder 2"/>
           <p:cNvSpPr>
             <a:spLocks noGrp="1"/>
           </p:cNvSpPr>
@@ -4093,9 +4403,10 @@
           </a:prstGeom>
         </p:spPr>
         <p:txBody>
-          <a:bodyPr lIns="0" rIns="0" tIns="0" bIns="0">
-            <a:normAutofit/>
-          </a:bodyPr>
+          <a:bodyPr lIns="0" tIns="0" rIns="0" bIns="0">
+            <a:normAutofit/>
+          </a:bodyPr>
+          <a:lstStyle/>
           <a:p>
             <a:pPr marL="432000" indent="-324000">
               <a:spcBef>
@@ -4109,17 +4420,14 @@
               <a:buChar char=""/>
             </a:pPr>
             <a:r>
-              <a:rPr b="0" lang="en-US" sz="3200" spc="-1" strike="noStrike">
+              <a:rPr lang="en-US" sz="3200" b="0" strike="noStrike" spc="-1">
                 <a:latin typeface="Arial"/>
               </a:rPr>
               <a:t>Click to edit the outline text format</a:t>
             </a:r>
-            <a:endParaRPr b="0" lang="en-US" sz="3200" spc="-1" strike="noStrike">
-              <a:latin typeface="Arial"/>
-            </a:endParaRPr>
-          </a:p>
-          <a:p>
-            <a:pPr lvl="1" marL="864000" indent="-324000">
+          </a:p>
+          <a:p>
+            <a:pPr marL="864000" lvl="1" indent="-324000">
               <a:spcBef>
                 <a:spcPts val="1134"/>
               </a:spcBef>
@@ -4131,17 +4439,14 @@
               <a:buChar char=""/>
             </a:pPr>
             <a:r>
-              <a:rPr b="0" lang="en-US" sz="2800" spc="-1" strike="noStrike">
+              <a:rPr lang="en-US" sz="2800" b="0" strike="noStrike" spc="-1">
                 <a:latin typeface="Arial"/>
               </a:rPr>
               <a:t>Second Outline Level</a:t>
             </a:r>
-            <a:endParaRPr b="0" lang="en-US" sz="2800" spc="-1" strike="noStrike">
-              <a:latin typeface="Arial"/>
-            </a:endParaRPr>
-          </a:p>
-          <a:p>
-            <a:pPr lvl="2" marL="1296000" indent="-288000">
+          </a:p>
+          <a:p>
+            <a:pPr marL="1296000" lvl="2" indent="-288000">
               <a:spcBef>
                 <a:spcPts val="850"/>
               </a:spcBef>
@@ -4153,17 +4458,14 @@
               <a:buChar char=""/>
             </a:pPr>
             <a:r>
-              <a:rPr b="0" lang="en-US" sz="2400" spc="-1" strike="noStrike">
+              <a:rPr lang="en-US" sz="2400" b="0" strike="noStrike" spc="-1">
                 <a:latin typeface="Arial"/>
               </a:rPr>
               <a:t>Third Outline Level</a:t>
             </a:r>
-            <a:endParaRPr b="0" lang="en-US" sz="2400" spc="-1" strike="noStrike">
-              <a:latin typeface="Arial"/>
-            </a:endParaRPr>
-          </a:p>
-          <a:p>
-            <a:pPr lvl="3" marL="1728000" indent="-216000">
+          </a:p>
+          <a:p>
+            <a:pPr marL="1728000" lvl="3" indent="-216000">
               <a:spcBef>
                 <a:spcPts val="567"/>
               </a:spcBef>
@@ -4175,17 +4477,14 @@
               <a:buChar char=""/>
             </a:pPr>
             <a:r>
-              <a:rPr b="0" lang="en-US" sz="2000" spc="-1" strike="noStrike">
+              <a:rPr lang="en-US" sz="2000" b="0" strike="noStrike" spc="-1">
                 <a:latin typeface="Arial"/>
               </a:rPr>
               <a:t>Fourth Outline Level</a:t>
             </a:r>
-            <a:endParaRPr b="0" lang="en-US" sz="2000" spc="-1" strike="noStrike">
-              <a:latin typeface="Arial"/>
-            </a:endParaRPr>
-          </a:p>
-          <a:p>
-            <a:pPr lvl="4" marL="2160000" indent="-216000">
+          </a:p>
+          <a:p>
+            <a:pPr marL="2160000" lvl="4" indent="-216000">
               <a:spcBef>
                 <a:spcPts val="283"/>
               </a:spcBef>
@@ -4197,17 +4496,14 @@
               <a:buChar char=""/>
             </a:pPr>
             <a:r>
-              <a:rPr b="0" lang="en-US" sz="2000" spc="-1" strike="noStrike">
+              <a:rPr lang="en-US" sz="2000" b="0" strike="noStrike" spc="-1">
                 <a:latin typeface="Arial"/>
               </a:rPr>
               <a:t>Fifth Outline Level</a:t>
             </a:r>
-            <a:endParaRPr b="0" lang="en-US" sz="2000" spc="-1" strike="noStrike">
-              <a:latin typeface="Arial"/>
-            </a:endParaRPr>
-          </a:p>
-          <a:p>
-            <a:pPr lvl="5" marL="2592000" indent="-216000">
+          </a:p>
+          <a:p>
+            <a:pPr marL="2592000" lvl="5" indent="-216000">
               <a:spcBef>
                 <a:spcPts val="283"/>
               </a:spcBef>
@@ -4219,17 +4515,14 @@
               <a:buChar char=""/>
             </a:pPr>
             <a:r>
-              <a:rPr b="0" lang="en-US" sz="2000" spc="-1" strike="noStrike">
+              <a:rPr lang="en-US" sz="2000" b="0" strike="noStrike" spc="-1">
                 <a:latin typeface="Arial"/>
               </a:rPr>
               <a:t>Sixth Outline Level</a:t>
             </a:r>
-            <a:endParaRPr b="0" lang="en-US" sz="2000" spc="-1" strike="noStrike">
-              <a:latin typeface="Arial"/>
-            </a:endParaRPr>
-          </a:p>
-          <a:p>
-            <a:pPr lvl="6" marL="3024000" indent="-216000">
+          </a:p>
+          <a:p>
+            <a:pPr marL="3024000" lvl="6" indent="-216000">
               <a:spcBef>
                 <a:spcPts val="283"/>
               </a:spcBef>
@@ -4241,48 +4534,326 @@
               <a:buChar char=""/>
             </a:pPr>
             <a:r>
-              <a:rPr b="0" lang="en-US" sz="2000" spc="-1" strike="noStrike">
+              <a:rPr lang="en-US" sz="2000" b="0" strike="noStrike" spc="-1">
                 <a:latin typeface="Arial"/>
               </a:rPr>
               <a:t>Seventh Outline Level</a:t>
             </a:r>
-            <a:endParaRPr b="0" lang="en-US" sz="2000" spc="-1" strike="noStrike">
-              <a:latin typeface="Arial"/>
-            </a:endParaRPr>
           </a:p>
         </p:txBody>
       </p:sp>
     </p:spTree>
   </p:cSld>
-  <p:clrMap bg1="lt1" bg2="lt2" tx1="dk1" tx2="dk2" accent1="accent1" accent2="accent2" accent3="accent3" accent4="accent4" accent5="accent5" accent6="accent6" hlink="hlink" folHlink="folHlink"/>
+  <p:clrMap bg1="lt1" tx1="dk1" bg2="lt2" tx2="dk2" accent1="accent1" accent2="accent2" accent3="accent3" accent4="accent4" accent5="accent5" accent6="accent6" hlink="hlink" folHlink="folHlink"/>
   <p:sldLayoutIdLst>
-    <p:sldLayoutId id="2147483649" r:id="rId3"/>
-    <p:sldLayoutId id="2147483650" r:id="rId4"/>
-    <p:sldLayoutId id="2147483651" r:id="rId5"/>
-    <p:sldLayoutId id="2147483652" r:id="rId6"/>
-    <p:sldLayoutId id="2147483653" r:id="rId7"/>
-    <p:sldLayoutId id="2147483654" r:id="rId8"/>
-    <p:sldLayoutId id="2147483655" r:id="rId9"/>
-    <p:sldLayoutId id="2147483656" r:id="rId10"/>
-    <p:sldLayoutId id="2147483657" r:id="rId11"/>
-    <p:sldLayoutId id="2147483658" r:id="rId12"/>
-    <p:sldLayoutId id="2147483659" r:id="rId13"/>
-    <p:sldLayoutId id="2147483660" r:id="rId14"/>
+    <p:sldLayoutId id="2147483649" r:id="rId1"/>
+    <p:sldLayoutId id="2147483650" r:id="rId2"/>
+    <p:sldLayoutId id="2147483651" r:id="rId3"/>
+    <p:sldLayoutId id="2147483652" r:id="rId4"/>
+    <p:sldLayoutId id="2147483653" r:id="rId5"/>
+    <p:sldLayoutId id="2147483654" r:id="rId6"/>
+    <p:sldLayoutId id="2147483655" r:id="rId7"/>
+    <p:sldLayoutId id="2147483656" r:id="rId8"/>
+    <p:sldLayoutId id="2147483657" r:id="rId9"/>
+    <p:sldLayoutId id="2147483658" r:id="rId10"/>
+    <p:sldLayoutId id="2147483659" r:id="rId11"/>
+    <p:sldLayoutId id="2147483660" r:id="rId12"/>
   </p:sldLayoutIdLst>
+  <p:txStyles>
+    <p:titleStyle>
+      <a:lvl1pPr algn="l" defTabSz="914400" rtl="0" eaLnBrk="1" latinLnBrk="0" hangingPunct="1">
+        <a:lnSpc>
+          <a:spcPct val="90000"/>
+        </a:lnSpc>
+        <a:spcBef>
+          <a:spcPct val="0"/>
+        </a:spcBef>
+        <a:buNone/>
+        <a:defRPr sz="4400" kern="1200">
+          <a:solidFill>
+            <a:schemeClr val="tx1"/>
+          </a:solidFill>
+          <a:latin typeface="+mj-lt"/>
+          <a:ea typeface="+mj-ea"/>
+          <a:cs typeface="+mj-cs"/>
+        </a:defRPr>
+      </a:lvl1pPr>
+    </p:titleStyle>
+    <p:bodyStyle>
+      <a:lvl1pPr marL="228600" indent="-228600" algn="l" defTabSz="914400" rtl="0" eaLnBrk="1" latinLnBrk="0" hangingPunct="1">
+        <a:lnSpc>
+          <a:spcPct val="90000"/>
+        </a:lnSpc>
+        <a:spcBef>
+          <a:spcPts val="1000"/>
+        </a:spcBef>
+        <a:buFont typeface="Arial" panose="020B0604020202020204" pitchFamily="34" charset="0"/>
+        <a:buChar char="•"/>
+        <a:defRPr sz="2800" kern="1200">
+          <a:solidFill>
+            <a:schemeClr val="tx1"/>
+          </a:solidFill>
+          <a:latin typeface="+mn-lt"/>
+          <a:ea typeface="+mn-ea"/>
+          <a:cs typeface="+mn-cs"/>
+        </a:defRPr>
+      </a:lvl1pPr>
+      <a:lvl2pPr marL="685800" indent="-228600" algn="l" defTabSz="914400" rtl="0" eaLnBrk="1" latinLnBrk="0" hangingPunct="1">
+        <a:lnSpc>
+          <a:spcPct val="90000"/>
+        </a:lnSpc>
+        <a:spcBef>
+          <a:spcPts val="500"/>
+        </a:spcBef>
+        <a:buFont typeface="Arial" panose="020B0604020202020204" pitchFamily="34" charset="0"/>
+        <a:buChar char="•"/>
+        <a:defRPr sz="2400" kern="1200">
+          <a:solidFill>
+            <a:schemeClr val="tx1"/>
+          </a:solidFill>
+          <a:latin typeface="+mn-lt"/>
+          <a:ea typeface="+mn-ea"/>
+          <a:cs typeface="+mn-cs"/>
+        </a:defRPr>
+      </a:lvl2pPr>
+      <a:lvl3pPr marL="1143000" indent="-228600" algn="l" defTabSz="914400" rtl="0" eaLnBrk="1" latinLnBrk="0" hangingPunct="1">
+        <a:lnSpc>
+          <a:spcPct val="90000"/>
+        </a:lnSpc>
+        <a:spcBef>
+          <a:spcPts val="500"/>
+        </a:spcBef>
+        <a:buFont typeface="Arial" panose="020B0604020202020204" pitchFamily="34" charset="0"/>
+        <a:buChar char="•"/>
+        <a:defRPr sz="2000" kern="1200">
+          <a:solidFill>
+            <a:schemeClr val="tx1"/>
+          </a:solidFill>
+          <a:latin typeface="+mn-lt"/>
+          <a:ea typeface="+mn-ea"/>
+          <a:cs typeface="+mn-cs"/>
+        </a:defRPr>
+      </a:lvl3pPr>
+      <a:lvl4pPr marL="1600200" indent="-228600" algn="l" defTabSz="914400" rtl="0" eaLnBrk="1" latinLnBrk="0" hangingPunct="1">
+        <a:lnSpc>
+          <a:spcPct val="90000"/>
+        </a:lnSpc>
+        <a:spcBef>
+          <a:spcPts val="500"/>
+        </a:spcBef>
+        <a:buFont typeface="Arial" panose="020B0604020202020204" pitchFamily="34" charset="0"/>
+        <a:buChar char="•"/>
+        <a:defRPr sz="1800" kern="1200">
+          <a:solidFill>
+            <a:schemeClr val="tx1"/>
+          </a:solidFill>
+          <a:latin typeface="+mn-lt"/>
+          <a:ea typeface="+mn-ea"/>
+          <a:cs typeface="+mn-cs"/>
+        </a:defRPr>
+      </a:lvl4pPr>
+      <a:lvl5pPr marL="2057400" indent="-228600" algn="l" defTabSz="914400" rtl="0" eaLnBrk="1" latinLnBrk="0" hangingPunct="1">
+        <a:lnSpc>
+          <a:spcPct val="90000"/>
+        </a:lnSpc>
+        <a:spcBef>
+          <a:spcPts val="500"/>
+        </a:spcBef>
+        <a:buFont typeface="Arial" panose="020B0604020202020204" pitchFamily="34" charset="0"/>
+        <a:buChar char="•"/>
+        <a:defRPr sz="1800" kern="1200">
+          <a:solidFill>
+            <a:schemeClr val="tx1"/>
+          </a:solidFill>
+          <a:latin typeface="+mn-lt"/>
+          <a:ea typeface="+mn-ea"/>
+          <a:cs typeface="+mn-cs"/>
+        </a:defRPr>
+      </a:lvl5pPr>
+      <a:lvl6pPr marL="2514600" indent="-228600" algn="l" defTabSz="914400" rtl="0" eaLnBrk="1" latinLnBrk="0" hangingPunct="1">
+        <a:lnSpc>
+          <a:spcPct val="90000"/>
+        </a:lnSpc>
+        <a:spcBef>
+          <a:spcPts val="500"/>
+        </a:spcBef>
+        <a:buFont typeface="Arial" panose="020B0604020202020204" pitchFamily="34" charset="0"/>
+        <a:buChar char="•"/>
+        <a:defRPr sz="1800" kern="1200">
+          <a:solidFill>
+            <a:schemeClr val="tx1"/>
+          </a:solidFill>
+          <a:latin typeface="+mn-lt"/>
+          <a:ea typeface="+mn-ea"/>
+          <a:cs typeface="+mn-cs"/>
+        </a:defRPr>
+      </a:lvl6pPr>
+      <a:lvl7pPr marL="2971800" indent="-228600" algn="l" defTabSz="914400" rtl="0" eaLnBrk="1" latinLnBrk="0" hangingPunct="1">
+        <a:lnSpc>
+          <a:spcPct val="90000"/>
+        </a:lnSpc>
+        <a:spcBef>
+          <a:spcPts val="500"/>
+        </a:spcBef>
+        <a:buFont typeface="Arial" panose="020B0604020202020204" pitchFamily="34" charset="0"/>
+        <a:buChar char="•"/>
+        <a:defRPr sz="1800" kern="1200">
+          <a:solidFill>
+            <a:schemeClr val="tx1"/>
+          </a:solidFill>
+          <a:latin typeface="+mn-lt"/>
+          <a:ea typeface="+mn-ea"/>
+          <a:cs typeface="+mn-cs"/>
+        </a:defRPr>
+      </a:lvl7pPr>
+      <a:lvl8pPr marL="3429000" indent="-228600" algn="l" defTabSz="914400" rtl="0" eaLnBrk="1" latinLnBrk="0" hangingPunct="1">
+        <a:lnSpc>
+          <a:spcPct val="90000"/>
+        </a:lnSpc>
+        <a:spcBef>
+          <a:spcPts val="500"/>
+        </a:spcBef>
+        <a:buFont typeface="Arial" panose="020B0604020202020204" pitchFamily="34" charset="0"/>
+        <a:buChar char="•"/>
+        <a:defRPr sz="1800" kern="1200">
+          <a:solidFill>
+            <a:schemeClr val="tx1"/>
+          </a:solidFill>
+          <a:latin typeface="+mn-lt"/>
+          <a:ea typeface="+mn-ea"/>
+          <a:cs typeface="+mn-cs"/>
+        </a:defRPr>
+      </a:lvl8pPr>
+      <a:lvl9pPr marL="3886200" indent="-228600" algn="l" defTabSz="914400" rtl="0" eaLnBrk="1" latinLnBrk="0" hangingPunct="1">
+        <a:lnSpc>
+          <a:spcPct val="90000"/>
+        </a:lnSpc>
+        <a:spcBef>
+          <a:spcPts val="500"/>
+        </a:spcBef>
+        <a:buFont typeface="Arial" panose="020B0604020202020204" pitchFamily="34" charset="0"/>
+        <a:buChar char="•"/>
+        <a:defRPr sz="1800" kern="1200">
+          <a:solidFill>
+            <a:schemeClr val="tx1"/>
+          </a:solidFill>
+          <a:latin typeface="+mn-lt"/>
+          <a:ea typeface="+mn-ea"/>
+          <a:cs typeface="+mn-cs"/>
+        </a:defRPr>
+      </a:lvl9pPr>
+    </p:bodyStyle>
+    <p:otherStyle>
+      <a:defPPr>
+        <a:defRPr lang="zh-CN"/>
+      </a:defPPr>
+      <a:lvl1pPr marL="0" algn="l" defTabSz="914400" rtl="0" eaLnBrk="1" latinLnBrk="0" hangingPunct="1">
+        <a:defRPr sz="1800" kern="1200">
+          <a:solidFill>
+            <a:schemeClr val="tx1"/>
+          </a:solidFill>
+          <a:latin typeface="+mn-lt"/>
+          <a:ea typeface="+mn-ea"/>
+          <a:cs typeface="+mn-cs"/>
+        </a:defRPr>
+      </a:lvl1pPr>
+      <a:lvl2pPr marL="457200" algn="l" defTabSz="914400" rtl="0" eaLnBrk="1" latinLnBrk="0" hangingPunct="1">
+        <a:defRPr sz="1800" kern="1200">
+          <a:solidFill>
+            <a:schemeClr val="tx1"/>
+          </a:solidFill>
+          <a:latin typeface="+mn-lt"/>
+          <a:ea typeface="+mn-ea"/>
+          <a:cs typeface="+mn-cs"/>
+        </a:defRPr>
+      </a:lvl2pPr>
+      <a:lvl3pPr marL="914400" algn="l" defTabSz="914400" rtl="0" eaLnBrk="1" latinLnBrk="0" hangingPunct="1">
+        <a:defRPr sz="1800" kern="1200">
+          <a:solidFill>
+            <a:schemeClr val="tx1"/>
+          </a:solidFill>
+          <a:latin typeface="+mn-lt"/>
+          <a:ea typeface="+mn-ea"/>
+          <a:cs typeface="+mn-cs"/>
+        </a:defRPr>
+      </a:lvl3pPr>
+      <a:lvl4pPr marL="1371600" algn="l" defTabSz="914400" rtl="0" eaLnBrk="1" latinLnBrk="0" hangingPunct="1">
+        <a:defRPr sz="1800" kern="1200">
+          <a:solidFill>
+            <a:schemeClr val="tx1"/>
+          </a:solidFill>
+          <a:latin typeface="+mn-lt"/>
+          <a:ea typeface="+mn-ea"/>
+          <a:cs typeface="+mn-cs"/>
+        </a:defRPr>
+      </a:lvl4pPr>
+      <a:lvl5pPr marL="1828800" algn="l" defTabSz="914400" rtl="0" eaLnBrk="1" latinLnBrk="0" hangingPunct="1">
+        <a:defRPr sz="1800" kern="1200">
+          <a:solidFill>
+            <a:schemeClr val="tx1"/>
+          </a:solidFill>
+          <a:latin typeface="+mn-lt"/>
+          <a:ea typeface="+mn-ea"/>
+          <a:cs typeface="+mn-cs"/>
+        </a:defRPr>
+      </a:lvl5pPr>
+      <a:lvl6pPr marL="2286000" algn="l" defTabSz="914400" rtl="0" eaLnBrk="1" latinLnBrk="0" hangingPunct="1">
+        <a:defRPr sz="1800" kern="1200">
+          <a:solidFill>
+            <a:schemeClr val="tx1"/>
+          </a:solidFill>
+          <a:latin typeface="+mn-lt"/>
+          <a:ea typeface="+mn-ea"/>
+          <a:cs typeface="+mn-cs"/>
+        </a:defRPr>
+      </a:lvl6pPr>
+      <a:lvl7pPr marL="2743200" algn="l" defTabSz="914400" rtl="0" eaLnBrk="1" latinLnBrk="0" hangingPunct="1">
+        <a:defRPr sz="1800" kern="1200">
+          <a:solidFill>
+            <a:schemeClr val="tx1"/>
+          </a:solidFill>
+          <a:latin typeface="+mn-lt"/>
+          <a:ea typeface="+mn-ea"/>
+          <a:cs typeface="+mn-cs"/>
+        </a:defRPr>
+      </a:lvl7pPr>
+      <a:lvl8pPr marL="3200400" algn="l" defTabSz="914400" rtl="0" eaLnBrk="1" latinLnBrk="0" hangingPunct="1">
+        <a:defRPr sz="1800" kern="1200">
+          <a:solidFill>
+            <a:schemeClr val="tx1"/>
+          </a:solidFill>
+          <a:latin typeface="+mn-lt"/>
+          <a:ea typeface="+mn-ea"/>
+          <a:cs typeface="+mn-cs"/>
+        </a:defRPr>
+      </a:lvl8pPr>
+      <a:lvl9pPr marL="3657600" algn="l" defTabSz="914400" rtl="0" eaLnBrk="1" latinLnBrk="0" hangingPunct="1">
+        <a:defRPr sz="1800" kern="1200">
+          <a:solidFill>
+            <a:schemeClr val="tx1"/>
+          </a:solidFill>
+          <a:latin typeface="+mn-lt"/>
+          <a:ea typeface="+mn-ea"/>
+          <a:cs typeface="+mn-cs"/>
+        </a:defRPr>
+      </a:lvl9pPr>
+    </p:otherStyle>
+  </p:txStyles>
 </p:sldMaster>
 </file>
 
 <file path=ppt/slideMasters/slideMaster2.xml><?xml version="1.0" encoding="utf-8"?>
-<p:sldMaster xmlns:a="http://schemas.openxmlformats.org/drawingml/2006/main" xmlns:p="http://schemas.openxmlformats.org/presentationml/2006/main" xmlns:r="http://schemas.openxmlformats.org/officeDocument/2006/relationships" xmlns:p14="http://schemas.microsoft.com/office/powerpoint/2010/main" xmlns:p15="http://schemas.microsoft.com/office/powerpoint/2012/main" xmlns:mc="http://schemas.openxmlformats.org/markup-compatibility/2006">
+<p:sldMaster xmlns:a="http://schemas.openxmlformats.org/drawingml/2006/main" xmlns:r="http://schemas.openxmlformats.org/officeDocument/2006/relationships" xmlns:p="http://schemas.openxmlformats.org/presentationml/2006/main">
   <p:cSld>
     <p:bg>
       <p:bgPr>
         <a:blipFill rotWithShape="0">
-          <a:blip r:embed="rId2"/>
+          <a:blip r:embed="rId14"/>
           <a:stretch>
             <a:fillRect/>
           </a:stretch>
         </a:blipFill>
+        <a:effectLst/>
       </p:bgPr>
     </p:bg>
     <p:spTree>
@@ -4319,17 +4890,15 @@
           </a:prstGeom>
         </p:spPr>
         <p:txBody>
-          <a:bodyPr lIns="0" rIns="0" tIns="0" bIns="0" anchor="ctr"/>
+          <a:bodyPr lIns="0" tIns="0" rIns="0" bIns="0" anchor="ctr"/>
+          <a:lstStyle/>
           <a:p>
             <a:r>
-              <a:rPr b="0" lang="en-US" sz="1800" spc="-1" strike="noStrike">
+              <a:rPr lang="en-US" sz="1800" b="0" strike="noStrike" spc="-1">
                 <a:latin typeface="Arial"/>
               </a:rPr>
               <a:t>Click to edit the title text format</a:t>
             </a:r>
-            <a:endParaRPr b="0" lang="en-US" sz="1800" spc="-1" strike="noStrike">
-              <a:latin typeface="Arial"/>
-            </a:endParaRPr>
           </a:p>
         </p:txBody>
       </p:sp>
@@ -4353,9 +4922,10 @@
           </a:prstGeom>
         </p:spPr>
         <p:txBody>
-          <a:bodyPr lIns="0" rIns="0" tIns="0" bIns="0">
-            <a:normAutofit/>
-          </a:bodyPr>
+          <a:bodyPr lIns="0" tIns="0" rIns="0" bIns="0">
+            <a:normAutofit/>
+          </a:bodyPr>
+          <a:lstStyle/>
           <a:p>
             <a:pPr marL="432000" indent="-324000">
               <a:spcBef>
@@ -4369,17 +4939,14 @@
               <a:buChar char=""/>
             </a:pPr>
             <a:r>
-              <a:rPr b="0" lang="en-US" sz="1800" spc="-1" strike="noStrike">
+              <a:rPr lang="en-US" sz="1800" b="0" strike="noStrike" spc="-1">
                 <a:latin typeface="Arial"/>
               </a:rPr>
               <a:t>Click to edit the outline text format</a:t>
             </a:r>
-            <a:endParaRPr b="0" lang="en-US" sz="1800" spc="-1" strike="noStrike">
-              <a:latin typeface="Arial"/>
-            </a:endParaRPr>
-          </a:p>
-          <a:p>
-            <a:pPr lvl="1" marL="864000" indent="-324000">
+          </a:p>
+          <a:p>
+            <a:pPr marL="864000" lvl="1" indent="-324000">
               <a:spcBef>
                 <a:spcPts val="1134"/>
               </a:spcBef>
@@ -4391,17 +4958,14 @@
               <a:buChar char=""/>
             </a:pPr>
             <a:r>
-              <a:rPr b="0" lang="en-US" sz="1800" spc="-1" strike="noStrike">
+              <a:rPr lang="en-US" sz="1800" b="0" strike="noStrike" spc="-1">
                 <a:latin typeface="Arial"/>
               </a:rPr>
               <a:t>Second Outline Level</a:t>
             </a:r>
-            <a:endParaRPr b="0" lang="en-US" sz="1800" spc="-1" strike="noStrike">
-              <a:latin typeface="Arial"/>
-            </a:endParaRPr>
-          </a:p>
-          <a:p>
-            <a:pPr lvl="2" marL="1296000" indent="-288000">
+          </a:p>
+          <a:p>
+            <a:pPr marL="1296000" lvl="2" indent="-288000">
               <a:spcBef>
                 <a:spcPts val="850"/>
               </a:spcBef>
@@ -4413,17 +4977,14 @@
               <a:buChar char=""/>
             </a:pPr>
             <a:r>
-              <a:rPr b="0" lang="en-US" sz="1800" spc="-1" strike="noStrike">
+              <a:rPr lang="en-US" sz="1800" b="0" strike="noStrike" spc="-1">
                 <a:latin typeface="Arial"/>
               </a:rPr>
               <a:t>Third Outline Level</a:t>
             </a:r>
-            <a:endParaRPr b="0" lang="en-US" sz="1800" spc="-1" strike="noStrike">
-              <a:latin typeface="Arial"/>
-            </a:endParaRPr>
-          </a:p>
-          <a:p>
-            <a:pPr lvl="3" marL="1728000" indent="-216000">
+          </a:p>
+          <a:p>
+            <a:pPr marL="1728000" lvl="3" indent="-216000">
               <a:spcBef>
                 <a:spcPts val="567"/>
               </a:spcBef>
@@ -4435,17 +4996,14 @@
               <a:buChar char=""/>
             </a:pPr>
             <a:r>
-              <a:rPr b="0" lang="en-US" sz="1800" spc="-1" strike="noStrike">
+              <a:rPr lang="en-US" sz="1800" b="0" strike="noStrike" spc="-1">
                 <a:latin typeface="Arial"/>
               </a:rPr>
               <a:t>Fourth Outline Level</a:t>
             </a:r>
-            <a:endParaRPr b="0" lang="en-US" sz="1800" spc="-1" strike="noStrike">
-              <a:latin typeface="Arial"/>
-            </a:endParaRPr>
-          </a:p>
-          <a:p>
-            <a:pPr lvl="4" marL="2160000" indent="-216000">
+          </a:p>
+          <a:p>
+            <a:pPr marL="2160000" lvl="4" indent="-216000">
               <a:spcBef>
                 <a:spcPts val="283"/>
               </a:spcBef>
@@ -4457,17 +5015,14 @@
               <a:buChar char=""/>
             </a:pPr>
             <a:r>
-              <a:rPr b="0" lang="en-US" sz="1800" spc="-1" strike="noStrike">
+              <a:rPr lang="en-US" sz="1800" b="0" strike="noStrike" spc="-1">
                 <a:latin typeface="Arial"/>
               </a:rPr>
               <a:t>Fifth Outline Level</a:t>
             </a:r>
-            <a:endParaRPr b="0" lang="en-US" sz="1800" spc="-1" strike="noStrike">
-              <a:latin typeface="Arial"/>
-            </a:endParaRPr>
-          </a:p>
-          <a:p>
-            <a:pPr lvl="5" marL="2592000" indent="-216000">
+          </a:p>
+          <a:p>
+            <a:pPr marL="2592000" lvl="5" indent="-216000">
               <a:spcBef>
                 <a:spcPts val="283"/>
               </a:spcBef>
@@ -4479,17 +5034,14 @@
               <a:buChar char=""/>
             </a:pPr>
             <a:r>
-              <a:rPr b="0" lang="en-US" sz="1800" spc="-1" strike="noStrike">
+              <a:rPr lang="en-US" sz="1800" b="0" strike="noStrike" spc="-1">
                 <a:latin typeface="Arial"/>
               </a:rPr>
               <a:t>Sixth Outline Level</a:t>
             </a:r>
-            <a:endParaRPr b="0" lang="en-US" sz="1800" spc="-1" strike="noStrike">
-              <a:latin typeface="Arial"/>
-            </a:endParaRPr>
-          </a:p>
-          <a:p>
-            <a:pPr lvl="6" marL="3024000" indent="-216000">
+          </a:p>
+          <a:p>
+            <a:pPr marL="3024000" lvl="6" indent="-216000">
               <a:spcBef>
                 <a:spcPts val="283"/>
               </a:spcBef>
@@ -4501,48 +5053,326 @@
               <a:buChar char=""/>
             </a:pPr>
             <a:r>
-              <a:rPr b="0" lang="en-US" sz="1800" spc="-1" strike="noStrike">
+              <a:rPr lang="en-US" sz="1800" b="0" strike="noStrike" spc="-1">
                 <a:latin typeface="Arial"/>
               </a:rPr>
               <a:t>Seventh Outline Level</a:t>
             </a:r>
-            <a:endParaRPr b="0" lang="en-US" sz="1800" spc="-1" strike="noStrike">
-              <a:latin typeface="Arial"/>
-            </a:endParaRPr>
           </a:p>
         </p:txBody>
       </p:sp>
     </p:spTree>
   </p:cSld>
-  <p:clrMap bg1="lt1" bg2="lt2" tx1="dk1" tx2="dk2" accent1="accent1" accent2="accent2" accent3="accent3" accent4="accent4" accent5="accent5" accent6="accent6" hlink="hlink" folHlink="folHlink"/>
+  <p:clrMap bg1="lt1" tx1="dk1" bg2="lt2" tx2="dk2" accent1="accent1" accent2="accent2" accent3="accent3" accent4="accent4" accent5="accent5" accent6="accent6" hlink="hlink" folHlink="folHlink"/>
   <p:sldLayoutIdLst>
-    <p:sldLayoutId id="2147483662" r:id="rId3"/>
-    <p:sldLayoutId id="2147483663" r:id="rId4"/>
-    <p:sldLayoutId id="2147483664" r:id="rId5"/>
-    <p:sldLayoutId id="2147483665" r:id="rId6"/>
-    <p:sldLayoutId id="2147483666" r:id="rId7"/>
-    <p:sldLayoutId id="2147483667" r:id="rId8"/>
-    <p:sldLayoutId id="2147483668" r:id="rId9"/>
-    <p:sldLayoutId id="2147483669" r:id="rId10"/>
-    <p:sldLayoutId id="2147483670" r:id="rId11"/>
-    <p:sldLayoutId id="2147483671" r:id="rId12"/>
-    <p:sldLayoutId id="2147483672" r:id="rId13"/>
-    <p:sldLayoutId id="2147483673" r:id="rId14"/>
+    <p:sldLayoutId id="2147483662" r:id="rId1"/>
+    <p:sldLayoutId id="2147483663" r:id="rId2"/>
+    <p:sldLayoutId id="2147483664" r:id="rId3"/>
+    <p:sldLayoutId id="2147483665" r:id="rId4"/>
+    <p:sldLayoutId id="2147483666" r:id="rId5"/>
+    <p:sldLayoutId id="2147483667" r:id="rId6"/>
+    <p:sldLayoutId id="2147483668" r:id="rId7"/>
+    <p:sldLayoutId id="2147483669" r:id="rId8"/>
+    <p:sldLayoutId id="2147483670" r:id="rId9"/>
+    <p:sldLayoutId id="2147483671" r:id="rId10"/>
+    <p:sldLayoutId id="2147483672" r:id="rId11"/>
+    <p:sldLayoutId id="2147483673" r:id="rId12"/>
   </p:sldLayoutIdLst>
+  <p:txStyles>
+    <p:titleStyle>
+      <a:lvl1pPr algn="l" defTabSz="914400" rtl="0" eaLnBrk="1" latinLnBrk="0" hangingPunct="1">
+        <a:lnSpc>
+          <a:spcPct val="90000"/>
+        </a:lnSpc>
+        <a:spcBef>
+          <a:spcPct val="0"/>
+        </a:spcBef>
+        <a:buNone/>
+        <a:defRPr sz="4400" kern="1200">
+          <a:solidFill>
+            <a:schemeClr val="tx1"/>
+          </a:solidFill>
+          <a:latin typeface="+mj-lt"/>
+          <a:ea typeface="+mj-ea"/>
+          <a:cs typeface="+mj-cs"/>
+        </a:defRPr>
+      </a:lvl1pPr>
+    </p:titleStyle>
+    <p:bodyStyle>
+      <a:lvl1pPr marL="228600" indent="-228600" algn="l" defTabSz="914400" rtl="0" eaLnBrk="1" latinLnBrk="0" hangingPunct="1">
+        <a:lnSpc>
+          <a:spcPct val="90000"/>
+        </a:lnSpc>
+        <a:spcBef>
+          <a:spcPts val="1000"/>
+        </a:spcBef>
+        <a:buFont typeface="Arial" panose="020B0604020202020204" pitchFamily="34" charset="0"/>
+        <a:buChar char="•"/>
+        <a:defRPr sz="2800" kern="1200">
+          <a:solidFill>
+            <a:schemeClr val="tx1"/>
+          </a:solidFill>
+          <a:latin typeface="+mn-lt"/>
+          <a:ea typeface="+mn-ea"/>
+          <a:cs typeface="+mn-cs"/>
+        </a:defRPr>
+      </a:lvl1pPr>
+      <a:lvl2pPr marL="685800" indent="-228600" algn="l" defTabSz="914400" rtl="0" eaLnBrk="1" latinLnBrk="0" hangingPunct="1">
+        <a:lnSpc>
+          <a:spcPct val="90000"/>
+        </a:lnSpc>
+        <a:spcBef>
+          <a:spcPts val="500"/>
+        </a:spcBef>
+        <a:buFont typeface="Arial" panose="020B0604020202020204" pitchFamily="34" charset="0"/>
+        <a:buChar char="•"/>
+        <a:defRPr sz="2400" kern="1200">
+          <a:solidFill>
+            <a:schemeClr val="tx1"/>
+          </a:solidFill>
+          <a:latin typeface="+mn-lt"/>
+          <a:ea typeface="+mn-ea"/>
+          <a:cs typeface="+mn-cs"/>
+        </a:defRPr>
+      </a:lvl2pPr>
+      <a:lvl3pPr marL="1143000" indent="-228600" algn="l" defTabSz="914400" rtl="0" eaLnBrk="1" latinLnBrk="0" hangingPunct="1">
+        <a:lnSpc>
+          <a:spcPct val="90000"/>
+        </a:lnSpc>
+        <a:spcBef>
+          <a:spcPts val="500"/>
+        </a:spcBef>
+        <a:buFont typeface="Arial" panose="020B0604020202020204" pitchFamily="34" charset="0"/>
+        <a:buChar char="•"/>
+        <a:defRPr sz="2000" kern="1200">
+          <a:solidFill>
+            <a:schemeClr val="tx1"/>
+          </a:solidFill>
+          <a:latin typeface="+mn-lt"/>
+          <a:ea typeface="+mn-ea"/>
+          <a:cs typeface="+mn-cs"/>
+        </a:defRPr>
+      </a:lvl3pPr>
+      <a:lvl4pPr marL="1600200" indent="-228600" algn="l" defTabSz="914400" rtl="0" eaLnBrk="1" latinLnBrk="0" hangingPunct="1">
+        <a:lnSpc>
+          <a:spcPct val="90000"/>
+        </a:lnSpc>
+        <a:spcBef>
+          <a:spcPts val="500"/>
+        </a:spcBef>
+        <a:buFont typeface="Arial" panose="020B0604020202020204" pitchFamily="34" charset="0"/>
+        <a:buChar char="•"/>
+        <a:defRPr sz="1800" kern="1200">
+          <a:solidFill>
+            <a:schemeClr val="tx1"/>
+          </a:solidFill>
+          <a:latin typeface="+mn-lt"/>
+          <a:ea typeface="+mn-ea"/>
+          <a:cs typeface="+mn-cs"/>
+        </a:defRPr>
+      </a:lvl4pPr>
+      <a:lvl5pPr marL="2057400" indent="-228600" algn="l" defTabSz="914400" rtl="0" eaLnBrk="1" latinLnBrk="0" hangingPunct="1">
+        <a:lnSpc>
+          <a:spcPct val="90000"/>
+        </a:lnSpc>
+        <a:spcBef>
+          <a:spcPts val="500"/>
+        </a:spcBef>
+        <a:buFont typeface="Arial" panose="020B0604020202020204" pitchFamily="34" charset="0"/>
+        <a:buChar char="•"/>
+        <a:defRPr sz="1800" kern="1200">
+          <a:solidFill>
+            <a:schemeClr val="tx1"/>
+          </a:solidFill>
+          <a:latin typeface="+mn-lt"/>
+          <a:ea typeface="+mn-ea"/>
+          <a:cs typeface="+mn-cs"/>
+        </a:defRPr>
+      </a:lvl5pPr>
+      <a:lvl6pPr marL="2514600" indent="-228600" algn="l" defTabSz="914400" rtl="0" eaLnBrk="1" latinLnBrk="0" hangingPunct="1">
+        <a:lnSpc>
+          <a:spcPct val="90000"/>
+        </a:lnSpc>
+        <a:spcBef>
+          <a:spcPts val="500"/>
+        </a:spcBef>
+        <a:buFont typeface="Arial" panose="020B0604020202020204" pitchFamily="34" charset="0"/>
+        <a:buChar char="•"/>
+        <a:defRPr sz="1800" kern="1200">
+          <a:solidFill>
+            <a:schemeClr val="tx1"/>
+          </a:solidFill>
+          <a:latin typeface="+mn-lt"/>
+          <a:ea typeface="+mn-ea"/>
+          <a:cs typeface="+mn-cs"/>
+        </a:defRPr>
+      </a:lvl6pPr>
+      <a:lvl7pPr marL="2971800" indent="-228600" algn="l" defTabSz="914400" rtl="0" eaLnBrk="1" latinLnBrk="0" hangingPunct="1">
+        <a:lnSpc>
+          <a:spcPct val="90000"/>
+        </a:lnSpc>
+        <a:spcBef>
+          <a:spcPts val="500"/>
+        </a:spcBef>
+        <a:buFont typeface="Arial" panose="020B0604020202020204" pitchFamily="34" charset="0"/>
+        <a:buChar char="•"/>
+        <a:defRPr sz="1800" kern="1200">
+          <a:solidFill>
+            <a:schemeClr val="tx1"/>
+          </a:solidFill>
+          <a:latin typeface="+mn-lt"/>
+          <a:ea typeface="+mn-ea"/>
+          <a:cs typeface="+mn-cs"/>
+        </a:defRPr>
+      </a:lvl7pPr>
+      <a:lvl8pPr marL="3429000" indent="-228600" algn="l" defTabSz="914400" rtl="0" eaLnBrk="1" latinLnBrk="0" hangingPunct="1">
+        <a:lnSpc>
+          <a:spcPct val="90000"/>
+        </a:lnSpc>
+        <a:spcBef>
+          <a:spcPts val="500"/>
+        </a:spcBef>
+        <a:buFont typeface="Arial" panose="020B0604020202020204" pitchFamily="34" charset="0"/>
+        <a:buChar char="•"/>
+        <a:defRPr sz="1800" kern="1200">
+          <a:solidFill>
+            <a:schemeClr val="tx1"/>
+          </a:solidFill>
+          <a:latin typeface="+mn-lt"/>
+          <a:ea typeface="+mn-ea"/>
+          <a:cs typeface="+mn-cs"/>
+        </a:defRPr>
+      </a:lvl8pPr>
+      <a:lvl9pPr marL="3886200" indent="-228600" algn="l" defTabSz="914400" rtl="0" eaLnBrk="1" latinLnBrk="0" hangingPunct="1">
+        <a:lnSpc>
+          <a:spcPct val="90000"/>
+        </a:lnSpc>
+        <a:spcBef>
+          <a:spcPts val="500"/>
+        </a:spcBef>
+        <a:buFont typeface="Arial" panose="020B0604020202020204" pitchFamily="34" charset="0"/>
+        <a:buChar char="•"/>
+        <a:defRPr sz="1800" kern="1200">
+          <a:solidFill>
+            <a:schemeClr val="tx1"/>
+          </a:solidFill>
+          <a:latin typeface="+mn-lt"/>
+          <a:ea typeface="+mn-ea"/>
+          <a:cs typeface="+mn-cs"/>
+        </a:defRPr>
+      </a:lvl9pPr>
+    </p:bodyStyle>
+    <p:otherStyle>
+      <a:defPPr>
+        <a:defRPr lang="zh-CN"/>
+      </a:defPPr>
+      <a:lvl1pPr marL="0" algn="l" defTabSz="914400" rtl="0" eaLnBrk="1" latinLnBrk="0" hangingPunct="1">
+        <a:defRPr sz="1800" kern="1200">
+          <a:solidFill>
+            <a:schemeClr val="tx1"/>
+          </a:solidFill>
+          <a:latin typeface="+mn-lt"/>
+          <a:ea typeface="+mn-ea"/>
+          <a:cs typeface="+mn-cs"/>
+        </a:defRPr>
+      </a:lvl1pPr>
+      <a:lvl2pPr marL="457200" algn="l" defTabSz="914400" rtl="0" eaLnBrk="1" latinLnBrk="0" hangingPunct="1">
+        <a:defRPr sz="1800" kern="1200">
+          <a:solidFill>
+            <a:schemeClr val="tx1"/>
+          </a:solidFill>
+          <a:latin typeface="+mn-lt"/>
+          <a:ea typeface="+mn-ea"/>
+          <a:cs typeface="+mn-cs"/>
+        </a:defRPr>
+      </a:lvl2pPr>
+      <a:lvl3pPr marL="914400" algn="l" defTabSz="914400" rtl="0" eaLnBrk="1" latinLnBrk="0" hangingPunct="1">
+        <a:defRPr sz="1800" kern="1200">
+          <a:solidFill>
+            <a:schemeClr val="tx1"/>
+          </a:solidFill>
+          <a:latin typeface="+mn-lt"/>
+          <a:ea typeface="+mn-ea"/>
+          <a:cs typeface="+mn-cs"/>
+        </a:defRPr>
+      </a:lvl3pPr>
+      <a:lvl4pPr marL="1371600" algn="l" defTabSz="914400" rtl="0" eaLnBrk="1" latinLnBrk="0" hangingPunct="1">
+        <a:defRPr sz="1800" kern="1200">
+          <a:solidFill>
+            <a:schemeClr val="tx1"/>
+          </a:solidFill>
+          <a:latin typeface="+mn-lt"/>
+          <a:ea typeface="+mn-ea"/>
+          <a:cs typeface="+mn-cs"/>
+        </a:defRPr>
+      </a:lvl4pPr>
+      <a:lvl5pPr marL="1828800" algn="l" defTabSz="914400" rtl="0" eaLnBrk="1" latinLnBrk="0" hangingPunct="1">
+        <a:defRPr sz="1800" kern="1200">
+          <a:solidFill>
+            <a:schemeClr val="tx1"/>
+          </a:solidFill>
+          <a:latin typeface="+mn-lt"/>
+          <a:ea typeface="+mn-ea"/>
+          <a:cs typeface="+mn-cs"/>
+        </a:defRPr>
+      </a:lvl5pPr>
+      <a:lvl6pPr marL="2286000" algn="l" defTabSz="914400" rtl="0" eaLnBrk="1" latinLnBrk="0" hangingPunct="1">
+        <a:defRPr sz="1800" kern="1200">
+          <a:solidFill>
+            <a:schemeClr val="tx1"/>
+          </a:solidFill>
+          <a:latin typeface="+mn-lt"/>
+          <a:ea typeface="+mn-ea"/>
+          <a:cs typeface="+mn-cs"/>
+        </a:defRPr>
+      </a:lvl6pPr>
+      <a:lvl7pPr marL="2743200" algn="l" defTabSz="914400" rtl="0" eaLnBrk="1" latinLnBrk="0" hangingPunct="1">
+        <a:defRPr sz="1800" kern="1200">
+          <a:solidFill>
+            <a:schemeClr val="tx1"/>
+          </a:solidFill>
+          <a:latin typeface="+mn-lt"/>
+          <a:ea typeface="+mn-ea"/>
+          <a:cs typeface="+mn-cs"/>
+        </a:defRPr>
+      </a:lvl7pPr>
+      <a:lvl8pPr marL="3200400" algn="l" defTabSz="914400" rtl="0" eaLnBrk="1" latinLnBrk="0" hangingPunct="1">
+        <a:defRPr sz="1800" kern="1200">
+          <a:solidFill>
+            <a:schemeClr val="tx1"/>
+          </a:solidFill>
+          <a:latin typeface="+mn-lt"/>
+          <a:ea typeface="+mn-ea"/>
+          <a:cs typeface="+mn-cs"/>
+        </a:defRPr>
+      </a:lvl8pPr>
+      <a:lvl9pPr marL="3657600" algn="l" defTabSz="914400" rtl="0" eaLnBrk="1" latinLnBrk="0" hangingPunct="1">
+        <a:defRPr sz="1800" kern="1200">
+          <a:solidFill>
+            <a:schemeClr val="tx1"/>
+          </a:solidFill>
+          <a:latin typeface="+mn-lt"/>
+          <a:ea typeface="+mn-ea"/>
+          <a:cs typeface="+mn-cs"/>
+        </a:defRPr>
+      </a:lvl9pPr>
+    </p:otherStyle>
+  </p:txStyles>
 </p:sldMaster>
 </file>
 
 <file path=ppt/slideMasters/slideMaster3.xml><?xml version="1.0" encoding="utf-8"?>
-<p:sldMaster xmlns:a="http://schemas.openxmlformats.org/drawingml/2006/main" xmlns:p="http://schemas.openxmlformats.org/presentationml/2006/main" xmlns:r="http://schemas.openxmlformats.org/officeDocument/2006/relationships" xmlns:p14="http://schemas.microsoft.com/office/powerpoint/2010/main" xmlns:p15="http://schemas.microsoft.com/office/powerpoint/2012/main" xmlns:mc="http://schemas.openxmlformats.org/markup-compatibility/2006">
+<p:sldMaster xmlns:a="http://schemas.openxmlformats.org/drawingml/2006/main" xmlns:r="http://schemas.openxmlformats.org/officeDocument/2006/relationships" xmlns:p="http://schemas.openxmlformats.org/presentationml/2006/main">
   <p:cSld>
     <p:bg>
       <p:bgPr>
         <a:blipFill rotWithShape="0">
-          <a:blip r:embed="rId2"/>
+          <a:blip r:embed="rId14"/>
           <a:stretch>
             <a:fillRect/>
           </a:stretch>
         </a:blipFill>
+        <a:effectLst/>
       </p:bgPr>
     </p:bg>
     <p:spTree>
@@ -4579,18 +5409,16 @@
           </a:prstGeom>
         </p:spPr>
         <p:txBody>
-          <a:bodyPr lIns="0" rIns="0" tIns="0" bIns="0" anchor="ctr"/>
+          <a:bodyPr lIns="0" tIns="0" rIns="0" bIns="0" anchor="ctr"/>
+          <a:lstStyle/>
           <a:p>
             <a:pPr algn="ctr"/>
             <a:r>
-              <a:rPr b="0" lang="en-US" sz="4400" spc="-1" strike="noStrike">
+              <a:rPr lang="en-US" sz="4400" b="0" strike="noStrike" spc="-1">
                 <a:latin typeface="Arial"/>
               </a:rPr>
               <a:t>Click to edit the title text format</a:t>
             </a:r>
-            <a:endParaRPr b="0" lang="en-US" sz="4400" spc="-1" strike="noStrike">
-              <a:latin typeface="Arial"/>
-            </a:endParaRPr>
           </a:p>
         </p:txBody>
       </p:sp>
@@ -4614,9 +5442,10 @@
           </a:prstGeom>
         </p:spPr>
         <p:txBody>
-          <a:bodyPr lIns="0" rIns="0" tIns="0" bIns="0">
-            <a:normAutofit/>
-          </a:bodyPr>
+          <a:bodyPr lIns="0" tIns="0" rIns="0" bIns="0">
+            <a:normAutofit/>
+          </a:bodyPr>
+          <a:lstStyle/>
           <a:p>
             <a:pPr marL="432000" indent="-324000">
               <a:spcBef>
@@ -4630,17 +5459,14 @@
               <a:buChar char=""/>
             </a:pPr>
             <a:r>
-              <a:rPr b="0" lang="en-US" sz="3200" spc="-1" strike="noStrike">
+              <a:rPr lang="en-US" sz="3200" b="0" strike="noStrike" spc="-1">
                 <a:latin typeface="Arial"/>
               </a:rPr>
               <a:t>Click to edit the outline text format</a:t>
             </a:r>
-            <a:endParaRPr b="0" lang="en-US" sz="3200" spc="-1" strike="noStrike">
-              <a:latin typeface="Arial"/>
-            </a:endParaRPr>
-          </a:p>
-          <a:p>
-            <a:pPr lvl="1" marL="864000" indent="-324000">
+          </a:p>
+          <a:p>
+            <a:pPr marL="864000" lvl="1" indent="-324000">
               <a:spcBef>
                 <a:spcPts val="1134"/>
               </a:spcBef>
@@ -4652,17 +5478,14 @@
               <a:buChar char=""/>
             </a:pPr>
             <a:r>
-              <a:rPr b="0" lang="en-US" sz="2800" spc="-1" strike="noStrike">
+              <a:rPr lang="en-US" sz="2800" b="0" strike="noStrike" spc="-1">
                 <a:latin typeface="Arial"/>
               </a:rPr>
               <a:t>Second Outline Level</a:t>
             </a:r>
-            <a:endParaRPr b="0" lang="en-US" sz="2800" spc="-1" strike="noStrike">
-              <a:latin typeface="Arial"/>
-            </a:endParaRPr>
-          </a:p>
-          <a:p>
-            <a:pPr lvl="2" marL="1296000" indent="-288000">
+          </a:p>
+          <a:p>
+            <a:pPr marL="1296000" lvl="2" indent="-288000">
               <a:spcBef>
                 <a:spcPts val="850"/>
               </a:spcBef>
@@ -4674,17 +5497,14 @@
               <a:buChar char=""/>
             </a:pPr>
             <a:r>
-              <a:rPr b="0" lang="en-US" sz="2400" spc="-1" strike="noStrike">
+              <a:rPr lang="en-US" sz="2400" b="0" strike="noStrike" spc="-1">
                 <a:latin typeface="Arial"/>
               </a:rPr>
               <a:t>Third Outline Level</a:t>
             </a:r>
-            <a:endParaRPr b="0" lang="en-US" sz="2400" spc="-1" strike="noStrike">
-              <a:latin typeface="Arial"/>
-            </a:endParaRPr>
-          </a:p>
-          <a:p>
-            <a:pPr lvl="3" marL="1728000" indent="-216000">
+          </a:p>
+          <a:p>
+            <a:pPr marL="1728000" lvl="3" indent="-216000">
               <a:spcBef>
                 <a:spcPts val="567"/>
               </a:spcBef>
@@ -4696,17 +5516,14 @@
               <a:buChar char=""/>
             </a:pPr>
             <a:r>
-              <a:rPr b="0" lang="en-US" sz="2000" spc="-1" strike="noStrike">
+              <a:rPr lang="en-US" sz="2000" b="0" strike="noStrike" spc="-1">
                 <a:latin typeface="Arial"/>
               </a:rPr>
               <a:t>Fourth Outline Level</a:t>
             </a:r>
-            <a:endParaRPr b="0" lang="en-US" sz="2000" spc="-1" strike="noStrike">
-              <a:latin typeface="Arial"/>
-            </a:endParaRPr>
-          </a:p>
-          <a:p>
-            <a:pPr lvl="4" marL="2160000" indent="-216000">
+          </a:p>
+          <a:p>
+            <a:pPr marL="2160000" lvl="4" indent="-216000">
               <a:spcBef>
                 <a:spcPts val="283"/>
               </a:spcBef>
@@ -4718,17 +5535,14 @@
               <a:buChar char=""/>
             </a:pPr>
             <a:r>
-              <a:rPr b="0" lang="en-US" sz="2000" spc="-1" strike="noStrike">
+              <a:rPr lang="en-US" sz="2000" b="0" strike="noStrike" spc="-1">
                 <a:latin typeface="Arial"/>
               </a:rPr>
               <a:t>Fifth Outline Level</a:t>
             </a:r>
-            <a:endParaRPr b="0" lang="en-US" sz="2000" spc="-1" strike="noStrike">
-              <a:latin typeface="Arial"/>
-            </a:endParaRPr>
-          </a:p>
-          <a:p>
-            <a:pPr lvl="5" marL="2592000" indent="-216000">
+          </a:p>
+          <a:p>
+            <a:pPr marL="2592000" lvl="5" indent="-216000">
               <a:spcBef>
                 <a:spcPts val="283"/>
               </a:spcBef>
@@ -4740,17 +5554,14 @@
               <a:buChar char=""/>
             </a:pPr>
             <a:r>
-              <a:rPr b="0" lang="en-US" sz="2000" spc="-1" strike="noStrike">
+              <a:rPr lang="en-US" sz="2000" b="0" strike="noStrike" spc="-1">
                 <a:latin typeface="Arial"/>
               </a:rPr>
               <a:t>Sixth Outline Level</a:t>
             </a:r>
-            <a:endParaRPr b="0" lang="en-US" sz="2000" spc="-1" strike="noStrike">
-              <a:latin typeface="Arial"/>
-            </a:endParaRPr>
-          </a:p>
-          <a:p>
-            <a:pPr lvl="6" marL="3024000" indent="-216000">
+          </a:p>
+          <a:p>
+            <a:pPr marL="3024000" lvl="6" indent="-216000">
               <a:spcBef>
                 <a:spcPts val="283"/>
               </a:spcBef>
@@ -4762,39 +5573,316 @@
               <a:buChar char=""/>
             </a:pPr>
             <a:r>
-              <a:rPr b="0" lang="en-US" sz="2000" spc="-1" strike="noStrike">
+              <a:rPr lang="en-US" sz="2000" b="0" strike="noStrike" spc="-1">
                 <a:latin typeface="Arial"/>
               </a:rPr>
               <a:t>Seventh Outline Level</a:t>
             </a:r>
-            <a:endParaRPr b="0" lang="en-US" sz="2000" spc="-1" strike="noStrike">
-              <a:latin typeface="Arial"/>
-            </a:endParaRPr>
           </a:p>
         </p:txBody>
       </p:sp>
     </p:spTree>
   </p:cSld>
-  <p:clrMap bg1="lt1" bg2="lt2" tx1="dk1" tx2="dk2" accent1="accent1" accent2="accent2" accent3="accent3" accent4="accent4" accent5="accent5" accent6="accent6" hlink="hlink" folHlink="folHlink"/>
+  <p:clrMap bg1="lt1" tx1="dk1" bg2="lt2" tx2="dk2" accent1="accent1" accent2="accent2" accent3="accent3" accent4="accent4" accent5="accent5" accent6="accent6" hlink="hlink" folHlink="folHlink"/>
   <p:sldLayoutIdLst>
-    <p:sldLayoutId id="2147483675" r:id="rId3"/>
-    <p:sldLayoutId id="2147483676" r:id="rId4"/>
-    <p:sldLayoutId id="2147483677" r:id="rId5"/>
-    <p:sldLayoutId id="2147483678" r:id="rId6"/>
-    <p:sldLayoutId id="2147483679" r:id="rId7"/>
-    <p:sldLayoutId id="2147483680" r:id="rId8"/>
-    <p:sldLayoutId id="2147483681" r:id="rId9"/>
-    <p:sldLayoutId id="2147483682" r:id="rId10"/>
-    <p:sldLayoutId id="2147483683" r:id="rId11"/>
-    <p:sldLayoutId id="2147483684" r:id="rId12"/>
-    <p:sldLayoutId id="2147483685" r:id="rId13"/>
-    <p:sldLayoutId id="2147483686" r:id="rId14"/>
+    <p:sldLayoutId id="2147483675" r:id="rId1"/>
+    <p:sldLayoutId id="2147483676" r:id="rId2"/>
+    <p:sldLayoutId id="2147483677" r:id="rId3"/>
+    <p:sldLayoutId id="2147483678" r:id="rId4"/>
+    <p:sldLayoutId id="2147483679" r:id="rId5"/>
+    <p:sldLayoutId id="2147483680" r:id="rId6"/>
+    <p:sldLayoutId id="2147483681" r:id="rId7"/>
+    <p:sldLayoutId id="2147483682" r:id="rId8"/>
+    <p:sldLayoutId id="2147483683" r:id="rId9"/>
+    <p:sldLayoutId id="2147483684" r:id="rId10"/>
+    <p:sldLayoutId id="2147483685" r:id="rId11"/>
+    <p:sldLayoutId id="2147483686" r:id="rId12"/>
   </p:sldLayoutIdLst>
+  <p:txStyles>
+    <p:titleStyle>
+      <a:lvl1pPr algn="l" defTabSz="914400" rtl="0" eaLnBrk="1" latinLnBrk="0" hangingPunct="1">
+        <a:lnSpc>
+          <a:spcPct val="90000"/>
+        </a:lnSpc>
+        <a:spcBef>
+          <a:spcPct val="0"/>
+        </a:spcBef>
+        <a:buNone/>
+        <a:defRPr sz="4400" kern="1200">
+          <a:solidFill>
+            <a:schemeClr val="tx1"/>
+          </a:solidFill>
+          <a:latin typeface="+mj-lt"/>
+          <a:ea typeface="+mj-ea"/>
+          <a:cs typeface="+mj-cs"/>
+        </a:defRPr>
+      </a:lvl1pPr>
+    </p:titleStyle>
+    <p:bodyStyle>
+      <a:lvl1pPr marL="228600" indent="-228600" algn="l" defTabSz="914400" rtl="0" eaLnBrk="1" latinLnBrk="0" hangingPunct="1">
+        <a:lnSpc>
+          <a:spcPct val="90000"/>
+        </a:lnSpc>
+        <a:spcBef>
+          <a:spcPts val="1000"/>
+        </a:spcBef>
+        <a:buFont typeface="Arial" panose="020B0604020202020204" pitchFamily="34" charset="0"/>
+        <a:buChar char="•"/>
+        <a:defRPr sz="2800" kern="1200">
+          <a:solidFill>
+            <a:schemeClr val="tx1"/>
+          </a:solidFill>
+          <a:latin typeface="+mn-lt"/>
+          <a:ea typeface="+mn-ea"/>
+          <a:cs typeface="+mn-cs"/>
+        </a:defRPr>
+      </a:lvl1pPr>
+      <a:lvl2pPr marL="685800" indent="-228600" algn="l" defTabSz="914400" rtl="0" eaLnBrk="1" latinLnBrk="0" hangingPunct="1">
+        <a:lnSpc>
+          <a:spcPct val="90000"/>
+        </a:lnSpc>
+        <a:spcBef>
+          <a:spcPts val="500"/>
+        </a:spcBef>
+        <a:buFont typeface="Arial" panose="020B0604020202020204" pitchFamily="34" charset="0"/>
+        <a:buChar char="•"/>
+        <a:defRPr sz="2400" kern="1200">
+          <a:solidFill>
+            <a:schemeClr val="tx1"/>
+          </a:solidFill>
+          <a:latin typeface="+mn-lt"/>
+          <a:ea typeface="+mn-ea"/>
+          <a:cs typeface="+mn-cs"/>
+        </a:defRPr>
+      </a:lvl2pPr>
+      <a:lvl3pPr marL="1143000" indent="-228600" algn="l" defTabSz="914400" rtl="0" eaLnBrk="1" latinLnBrk="0" hangingPunct="1">
+        <a:lnSpc>
+          <a:spcPct val="90000"/>
+        </a:lnSpc>
+        <a:spcBef>
+          <a:spcPts val="500"/>
+        </a:spcBef>
+        <a:buFont typeface="Arial" panose="020B0604020202020204" pitchFamily="34" charset="0"/>
+        <a:buChar char="•"/>
+        <a:defRPr sz="2000" kern="1200">
+          <a:solidFill>
+            <a:schemeClr val="tx1"/>
+          </a:solidFill>
+          <a:latin typeface="+mn-lt"/>
+          <a:ea typeface="+mn-ea"/>
+          <a:cs typeface="+mn-cs"/>
+        </a:defRPr>
+      </a:lvl3pPr>
+      <a:lvl4pPr marL="1600200" indent="-228600" algn="l" defTabSz="914400" rtl="0" eaLnBrk="1" latinLnBrk="0" hangingPunct="1">
+        <a:lnSpc>
+          <a:spcPct val="90000"/>
+        </a:lnSpc>
+        <a:spcBef>
+          <a:spcPts val="500"/>
+        </a:spcBef>
+        <a:buFont typeface="Arial" panose="020B0604020202020204" pitchFamily="34" charset="0"/>
+        <a:buChar char="•"/>
+        <a:defRPr sz="1800" kern="1200">
+          <a:solidFill>
+            <a:schemeClr val="tx1"/>
+          </a:solidFill>
+          <a:latin typeface="+mn-lt"/>
+          <a:ea typeface="+mn-ea"/>
+          <a:cs typeface="+mn-cs"/>
+        </a:defRPr>
+      </a:lvl4pPr>
+      <a:lvl5pPr marL="2057400" indent="-228600" algn="l" defTabSz="914400" rtl="0" eaLnBrk="1" latinLnBrk="0" hangingPunct="1">
+        <a:lnSpc>
+          <a:spcPct val="90000"/>
+        </a:lnSpc>
+        <a:spcBef>
+          <a:spcPts val="500"/>
+        </a:spcBef>
+        <a:buFont typeface="Arial" panose="020B0604020202020204" pitchFamily="34" charset="0"/>
+        <a:buChar char="•"/>
+        <a:defRPr sz="1800" kern="1200">
+          <a:solidFill>
+            <a:schemeClr val="tx1"/>
+          </a:solidFill>
+          <a:latin typeface="+mn-lt"/>
+          <a:ea typeface="+mn-ea"/>
+          <a:cs typeface="+mn-cs"/>
+        </a:defRPr>
+      </a:lvl5pPr>
+      <a:lvl6pPr marL="2514600" indent="-228600" algn="l" defTabSz="914400" rtl="0" eaLnBrk="1" latinLnBrk="0" hangingPunct="1">
+        <a:lnSpc>
+          <a:spcPct val="90000"/>
+        </a:lnSpc>
+        <a:spcBef>
+          <a:spcPts val="500"/>
+        </a:spcBef>
+        <a:buFont typeface="Arial" panose="020B0604020202020204" pitchFamily="34" charset="0"/>
+        <a:buChar char="•"/>
+        <a:defRPr sz="1800" kern="1200">
+          <a:solidFill>
+            <a:schemeClr val="tx1"/>
+          </a:solidFill>
+          <a:latin typeface="+mn-lt"/>
+          <a:ea typeface="+mn-ea"/>
+          <a:cs typeface="+mn-cs"/>
+        </a:defRPr>
+      </a:lvl6pPr>
+      <a:lvl7pPr marL="2971800" indent="-228600" algn="l" defTabSz="914400" rtl="0" eaLnBrk="1" latinLnBrk="0" hangingPunct="1">
+        <a:lnSpc>
+          <a:spcPct val="90000"/>
+        </a:lnSpc>
+        <a:spcBef>
+          <a:spcPts val="500"/>
+        </a:spcBef>
+        <a:buFont typeface="Arial" panose="020B0604020202020204" pitchFamily="34" charset="0"/>
+        <a:buChar char="•"/>
+        <a:defRPr sz="1800" kern="1200">
+          <a:solidFill>
+            <a:schemeClr val="tx1"/>
+          </a:solidFill>
+          <a:latin typeface="+mn-lt"/>
+          <a:ea typeface="+mn-ea"/>
+          <a:cs typeface="+mn-cs"/>
+        </a:defRPr>
+      </a:lvl7pPr>
+      <a:lvl8pPr marL="3429000" indent="-228600" algn="l" defTabSz="914400" rtl="0" eaLnBrk="1" latinLnBrk="0" hangingPunct="1">
+        <a:lnSpc>
+          <a:spcPct val="90000"/>
+        </a:lnSpc>
+        <a:spcBef>
+          <a:spcPts val="500"/>
+        </a:spcBef>
+        <a:buFont typeface="Arial" panose="020B0604020202020204" pitchFamily="34" charset="0"/>
+        <a:buChar char="•"/>
+        <a:defRPr sz="1800" kern="1200">
+          <a:solidFill>
+            <a:schemeClr val="tx1"/>
+          </a:solidFill>
+          <a:latin typeface="+mn-lt"/>
+          <a:ea typeface="+mn-ea"/>
+          <a:cs typeface="+mn-cs"/>
+        </a:defRPr>
+      </a:lvl8pPr>
+      <a:lvl9pPr marL="3886200" indent="-228600" algn="l" defTabSz="914400" rtl="0" eaLnBrk="1" latinLnBrk="0" hangingPunct="1">
+        <a:lnSpc>
+          <a:spcPct val="90000"/>
+        </a:lnSpc>
+        <a:spcBef>
+          <a:spcPts val="500"/>
+        </a:spcBef>
+        <a:buFont typeface="Arial" panose="020B0604020202020204" pitchFamily="34" charset="0"/>
+        <a:buChar char="•"/>
+        <a:defRPr sz="1800" kern="1200">
+          <a:solidFill>
+            <a:schemeClr val="tx1"/>
+          </a:solidFill>
+          <a:latin typeface="+mn-lt"/>
+          <a:ea typeface="+mn-ea"/>
+          <a:cs typeface="+mn-cs"/>
+        </a:defRPr>
+      </a:lvl9pPr>
+    </p:bodyStyle>
+    <p:otherStyle>
+      <a:defPPr>
+        <a:defRPr lang="zh-CN"/>
+      </a:defPPr>
+      <a:lvl1pPr marL="0" algn="l" defTabSz="914400" rtl="0" eaLnBrk="1" latinLnBrk="0" hangingPunct="1">
+        <a:defRPr sz="1800" kern="1200">
+          <a:solidFill>
+            <a:schemeClr val="tx1"/>
+          </a:solidFill>
+          <a:latin typeface="+mn-lt"/>
+          <a:ea typeface="+mn-ea"/>
+          <a:cs typeface="+mn-cs"/>
+        </a:defRPr>
+      </a:lvl1pPr>
+      <a:lvl2pPr marL="457200" algn="l" defTabSz="914400" rtl="0" eaLnBrk="1" latinLnBrk="0" hangingPunct="1">
+        <a:defRPr sz="1800" kern="1200">
+          <a:solidFill>
+            <a:schemeClr val="tx1"/>
+          </a:solidFill>
+          <a:latin typeface="+mn-lt"/>
+          <a:ea typeface="+mn-ea"/>
+          <a:cs typeface="+mn-cs"/>
+        </a:defRPr>
+      </a:lvl2pPr>
+      <a:lvl3pPr marL="914400" algn="l" defTabSz="914400" rtl="0" eaLnBrk="1" latinLnBrk="0" hangingPunct="1">
+        <a:defRPr sz="1800" kern="1200">
+          <a:solidFill>
+            <a:schemeClr val="tx1"/>
+          </a:solidFill>
+          <a:latin typeface="+mn-lt"/>
+          <a:ea typeface="+mn-ea"/>
+          <a:cs typeface="+mn-cs"/>
+        </a:defRPr>
+      </a:lvl3pPr>
+      <a:lvl4pPr marL="1371600" algn="l" defTabSz="914400" rtl="0" eaLnBrk="1" latinLnBrk="0" hangingPunct="1">
+        <a:defRPr sz="1800" kern="1200">
+          <a:solidFill>
+            <a:schemeClr val="tx1"/>
+          </a:solidFill>
+          <a:latin typeface="+mn-lt"/>
+          <a:ea typeface="+mn-ea"/>
+          <a:cs typeface="+mn-cs"/>
+        </a:defRPr>
+      </a:lvl4pPr>
+      <a:lvl5pPr marL="1828800" algn="l" defTabSz="914400" rtl="0" eaLnBrk="1" latinLnBrk="0" hangingPunct="1">
+        <a:defRPr sz="1800" kern="1200">
+          <a:solidFill>
+            <a:schemeClr val="tx1"/>
+          </a:solidFill>
+          <a:latin typeface="+mn-lt"/>
+          <a:ea typeface="+mn-ea"/>
+          <a:cs typeface="+mn-cs"/>
+        </a:defRPr>
+      </a:lvl5pPr>
+      <a:lvl6pPr marL="2286000" algn="l" defTabSz="914400" rtl="0" eaLnBrk="1" latinLnBrk="0" hangingPunct="1">
+        <a:defRPr sz="1800" kern="1200">
+          <a:solidFill>
+            <a:schemeClr val="tx1"/>
+          </a:solidFill>
+          <a:latin typeface="+mn-lt"/>
+          <a:ea typeface="+mn-ea"/>
+          <a:cs typeface="+mn-cs"/>
+        </a:defRPr>
+      </a:lvl6pPr>
+      <a:lvl7pPr marL="2743200" algn="l" defTabSz="914400" rtl="0" eaLnBrk="1" latinLnBrk="0" hangingPunct="1">
+        <a:defRPr sz="1800" kern="1200">
+          <a:solidFill>
+            <a:schemeClr val="tx1"/>
+          </a:solidFill>
+          <a:latin typeface="+mn-lt"/>
+          <a:ea typeface="+mn-ea"/>
+          <a:cs typeface="+mn-cs"/>
+        </a:defRPr>
+      </a:lvl7pPr>
+      <a:lvl8pPr marL="3200400" algn="l" defTabSz="914400" rtl="0" eaLnBrk="1" latinLnBrk="0" hangingPunct="1">
+        <a:defRPr sz="1800" kern="1200">
+          <a:solidFill>
+            <a:schemeClr val="tx1"/>
+          </a:solidFill>
+          <a:latin typeface="+mn-lt"/>
+          <a:ea typeface="+mn-ea"/>
+          <a:cs typeface="+mn-cs"/>
+        </a:defRPr>
+      </a:lvl8pPr>
+      <a:lvl9pPr marL="3657600" algn="l" defTabSz="914400" rtl="0" eaLnBrk="1" latinLnBrk="0" hangingPunct="1">
+        <a:defRPr sz="1800" kern="1200">
+          <a:solidFill>
+            <a:schemeClr val="tx1"/>
+          </a:solidFill>
+          <a:latin typeface="+mn-lt"/>
+          <a:ea typeface="+mn-ea"/>
+          <a:cs typeface="+mn-cs"/>
+        </a:defRPr>
+      </a:lvl9pPr>
+    </p:otherStyle>
+  </p:txStyles>
 </p:sldMaster>
 </file>
 
 <file path=ppt/slides/slide1.xml><?xml version="1.0" encoding="utf-8"?>
-<p:sld xmlns:a="http://schemas.openxmlformats.org/drawingml/2006/main" xmlns:p="http://schemas.openxmlformats.org/presentationml/2006/main" xmlns:r="http://schemas.openxmlformats.org/officeDocument/2006/relationships" xmlns:p14="http://schemas.microsoft.com/office/powerpoint/2010/main" xmlns:p15="http://schemas.microsoft.com/office/powerpoint/2012/main" xmlns:mc="http://schemas.openxmlformats.org/markup-compatibility/2006">
+<p:sld xmlns:a="http://schemas.openxmlformats.org/drawingml/2006/main" xmlns:r="http://schemas.openxmlformats.org/officeDocument/2006/relationships" xmlns:p="http://schemas.openxmlformats.org/presentationml/2006/main">
   <p:cSld>
     <p:spTree>
       <p:nvGrpSpPr>
@@ -4830,13 +5918,20 @@
           </a:ln>
         </p:spPr>
         <p:style>
-          <a:lnRef idx="0"/>
-          <a:fillRef idx="0"/>
-          <a:effectRef idx="0"/>
+          <a:lnRef idx="0">
+            <a:scrgbClr r="0" g="0" b="0"/>
+          </a:lnRef>
+          <a:fillRef idx="0">
+            <a:scrgbClr r="0" g="0" b="0"/>
+          </a:fillRef>
+          <a:effectRef idx="0">
+            <a:scrgbClr r="0" g="0" b="0"/>
+          </a:effectRef>
           <a:fontRef idx="minor"/>
         </p:style>
         <p:txBody>
-          <a:bodyPr lIns="0" rIns="0" tIns="0" bIns="0" anchor="ctr"/>
+          <a:bodyPr lIns="0" tIns="0" rIns="0" bIns="0" anchor="ctr"/>
+          <a:lstStyle/>
           <a:p>
             <a:pPr algn="ctr">
               <a:lnSpc>
@@ -4844,15 +5939,15 @@
               </a:lnSpc>
             </a:pPr>
             <a:r>
-              <a:rPr b="0" lang="en-US" sz="5860" spc="-1" strike="noStrike">
+              <a:rPr lang="en-US" sz="5860" b="0" strike="noStrike" spc="-1">
                 <a:solidFill>
-                  <a:srgbClr val="ffffff"/>
+                  <a:srgbClr val="FFFFFF"/>
                 </a:solidFill>
                 <a:latin typeface="Arial"/>
               </a:rPr>
               <a:t>A craftsman’s Approach</a:t>
             </a:r>
-            <a:endParaRPr b="0" lang="en-US" sz="5860" spc="-1" strike="noStrike">
+            <a:endParaRPr lang="en-US" sz="5860" b="0" strike="noStrike" spc="-1">
               <a:latin typeface="Arial"/>
             </a:endParaRPr>
           </a:p>
@@ -4878,13 +5973,20 @@
           </a:ln>
         </p:spPr>
         <p:style>
-          <a:lnRef idx="0"/>
-          <a:fillRef idx="0"/>
-          <a:effectRef idx="0"/>
+          <a:lnRef idx="0">
+            <a:scrgbClr r="0" g="0" b="0"/>
+          </a:lnRef>
+          <a:fillRef idx="0">
+            <a:scrgbClr r="0" g="0" b="0"/>
+          </a:fillRef>
+          <a:effectRef idx="0">
+            <a:scrgbClr r="0" g="0" b="0"/>
+          </a:effectRef>
           <a:fontRef idx="minor"/>
         </p:style>
         <p:txBody>
-          <a:bodyPr lIns="0" rIns="0" tIns="0" bIns="0" anchor="ctr"/>
+          <a:bodyPr lIns="0" tIns="0" rIns="0" bIns="0" anchor="ctr"/>
+          <a:lstStyle/>
           <a:p>
             <a:pPr algn="ctr">
               <a:lnSpc>
@@ -4892,15 +5994,15 @@
               </a:lnSpc>
             </a:pPr>
             <a:r>
-              <a:rPr b="0" lang="en-US" sz="3200" spc="-1" strike="noStrike">
+              <a:rPr lang="en-US" sz="3200" b="0" strike="noStrike" spc="-1">
                 <a:solidFill>
-                  <a:srgbClr val="ffffff"/>
+                  <a:srgbClr val="FFFFFF"/>
                 </a:solidFill>
                 <a:latin typeface="Arial"/>
               </a:rPr>
               <a:t>Li Zhuo</a:t>
             </a:r>
-            <a:endParaRPr b="0" lang="en-US" sz="3200" spc="-1" strike="noStrike">
+            <a:endParaRPr lang="en-US" sz="3200" b="0" strike="noStrike" spc="-1">
               <a:latin typeface="Arial"/>
             </a:endParaRPr>
           </a:p>
@@ -4908,6 +6010,9 @@
       </p:sp>
     </p:spTree>
   </p:cSld>
+  <p:clrMapOvr>
+    <a:masterClrMapping/>
+  </p:clrMapOvr>
   <p:timing>
     <p:tnLst>
       <p:par>
@@ -4916,14 +6021,14 @@
             <p:seq>
               <p:cTn id="2" dur="indefinite" nodeType="mainSeq"/>
               <p:prevCondLst>
-                <p:cond delay="0" evt="onPrev">
+                <p:cond evt="onPrev" delay="0">
                   <p:tgtEl>
                     <p:sldTgt/>
                   </p:tgtEl>
                 </p:cond>
               </p:prevCondLst>
               <p:nextCondLst>
-                <p:cond delay="0" evt="onNext">
+                <p:cond evt="onNext" delay="0">
                   <p:tgtEl>
                     <p:sldTgt/>
                   </p:tgtEl>
@@ -4939,7 +6044,7 @@
 </file>
 
 <file path=ppt/slides/slide2.xml><?xml version="1.0" encoding="utf-8"?>
-<p:sld xmlns:a="http://schemas.openxmlformats.org/drawingml/2006/main" xmlns:p="http://schemas.openxmlformats.org/presentationml/2006/main" xmlns:r="http://schemas.openxmlformats.org/officeDocument/2006/relationships" xmlns:p14="http://schemas.microsoft.com/office/powerpoint/2010/main" xmlns:p15="http://schemas.microsoft.com/office/powerpoint/2012/main" xmlns:mc="http://schemas.openxmlformats.org/markup-compatibility/2006">
+<p:sld xmlns:a="http://schemas.openxmlformats.org/drawingml/2006/main" xmlns:r="http://schemas.openxmlformats.org/officeDocument/2006/relationships" xmlns:p="http://schemas.openxmlformats.org/presentationml/2006/main">
   <p:cSld>
     <p:spTree>
       <p:nvGrpSpPr>
@@ -4975,9 +6080,15 @@
           </a:ln>
         </p:spPr>
         <p:style>
-          <a:lnRef idx="0"/>
-          <a:fillRef idx="0"/>
-          <a:effectRef idx="0"/>
+          <a:lnRef idx="0">
+            <a:scrgbClr r="0" g="0" b="0"/>
+          </a:lnRef>
+          <a:fillRef idx="0">
+            <a:scrgbClr r="0" g="0" b="0"/>
+          </a:fillRef>
+          <a:effectRef idx="0">
+            <a:scrgbClr r="0" g="0" b="0"/>
+          </a:effectRef>
           <a:fontRef idx="minor"/>
         </p:style>
       </p:sp>
@@ -5001,20 +6112,26 @@
           </a:ln>
         </p:spPr>
         <p:style>
-          <a:lnRef idx="0"/>
-          <a:fillRef idx="0"/>
-          <a:effectRef idx="0"/>
+          <a:lnRef idx="0">
+            <a:scrgbClr r="0" g="0" b="0"/>
+          </a:lnRef>
+          <a:fillRef idx="0">
+            <a:scrgbClr r="0" g="0" b="0"/>
+          </a:fillRef>
+          <a:effectRef idx="0">
+            <a:scrgbClr r="0" g="0" b="0"/>
+          </a:effectRef>
           <a:fontRef idx="minor"/>
         </p:style>
       </p:sp>
       <p:pic>
         <p:nvPicPr>
-          <p:cNvPr id="118" name="" descr=""/>
+          <p:cNvPr id="118" name="图片 117"/>
           <p:cNvPicPr/>
           <p:nvPr/>
         </p:nvPicPr>
         <p:blipFill>
-          <a:blip r:embed="rId1"/>
+          <a:blip r:embed="rId2"/>
           <a:stretch/>
         </p:blipFill>
         <p:spPr>
@@ -5032,22 +6149,25 @@
       </p:pic>
     </p:spTree>
   </p:cSld>
+  <p:clrMapOvr>
+    <a:masterClrMapping/>
+  </p:clrMapOvr>
   <p:timing>
     <p:tnLst>
       <p:par>
-        <p:cTn id="3" dur="indefinite" restart="never" nodeType="tmRoot">
+        <p:cTn id="1" dur="indefinite" restart="never" nodeType="tmRoot">
           <p:childTnLst>
             <p:seq>
-              <p:cTn id="4" dur="indefinite" nodeType="mainSeq"/>
+              <p:cTn id="2" dur="indefinite" nodeType="mainSeq"/>
               <p:prevCondLst>
-                <p:cond delay="0" evt="onPrev">
+                <p:cond evt="onPrev" delay="0">
                   <p:tgtEl>
                     <p:sldTgt/>
                   </p:tgtEl>
                 </p:cond>
               </p:prevCondLst>
               <p:nextCondLst>
-                <p:cond delay="0" evt="onNext">
+                <p:cond evt="onNext" delay="0">
                   <p:tgtEl>
                     <p:sldTgt/>
                   </p:tgtEl>
@@ -5063,7 +6183,7 @@
 </file>
 
 <file path=ppt/slides/slide3.xml><?xml version="1.0" encoding="utf-8"?>
-<p:sld xmlns:a="http://schemas.openxmlformats.org/drawingml/2006/main" xmlns:p="http://schemas.openxmlformats.org/presentationml/2006/main" xmlns:r="http://schemas.openxmlformats.org/officeDocument/2006/relationships" xmlns:p14="http://schemas.microsoft.com/office/powerpoint/2010/main" xmlns:p15="http://schemas.microsoft.com/office/powerpoint/2012/main" xmlns:mc="http://schemas.openxmlformats.org/markup-compatibility/2006">
+<p:sld xmlns:a="http://schemas.openxmlformats.org/drawingml/2006/main" xmlns:r="http://schemas.openxmlformats.org/officeDocument/2006/relationships" xmlns:p="http://schemas.openxmlformats.org/presentationml/2006/main">
   <p:cSld>
     <p:spTree>
       <p:nvGrpSpPr>
@@ -5081,114 +6201,114 @@
       </p:grpSpPr>
       <p:sp>
         <p:nvSpPr>
-          <p:cNvPr id="119" name="CustomShape 1"/>
-          <p:cNvSpPr/>
-          <p:nvPr/>
-        </p:nvSpPr>
-        <p:spPr>
-          <a:xfrm>
-            <a:off x="2376000" y="3168000"/>
-            <a:ext cx="7199280" cy="1261800"/>
-          </a:xfrm>
-          <a:prstGeom prst="rect">
-            <a:avLst/>
-          </a:prstGeom>
-          <a:noFill/>
-          <a:ln>
-            <a:noFill/>
-          </a:ln>
-        </p:spPr>
-        <p:style>
-          <a:lnRef idx="0"/>
-          <a:fillRef idx="0"/>
-          <a:effectRef idx="0"/>
-          <a:fontRef idx="minor"/>
-        </p:style>
-        <p:txBody>
-          <a:bodyPr lIns="0" rIns="0" tIns="0" bIns="0" anchor="ctr"/>
-          <a:p>
-            <a:pPr algn="ctr">
-              <a:lnSpc>
-                <a:spcPct val="100000"/>
-              </a:lnSpc>
-            </a:pPr>
+          <p:cNvPr id="2" name="标题 1">
+            <a:extLst>
+              <a:ext uri="{FF2B5EF4-FFF2-40B4-BE49-F238E27FC236}">
+                <a16:creationId xmlns:a16="http://schemas.microsoft.com/office/drawing/2014/main" id="{3BA385FF-8B86-4407-A792-18301827A176}"/>
+              </a:ext>
+            </a:extLst>
+          </p:cNvPr>
+          <p:cNvSpPr>
+            <a:spLocks noGrp="1"/>
+          </p:cNvSpPr>
+          <p:nvPr>
+            <p:ph type="title"/>
+          </p:nvPr>
+        </p:nvSpPr>
+        <p:spPr/>
+        <p:txBody>
+          <a:bodyPr/>
+          <a:lstStyle/>
+          <a:p>
             <a:r>
-              <a:rPr b="0" lang="en-US" sz="2200" spc="-1" strike="noStrike">
-                <a:solidFill>
-                  <a:srgbClr val="ffffff"/>
-                </a:solidFill>
-                <a:latin typeface="Arial"/>
-              </a:rPr>
-              <a:t>This work is licensed under a Creative Commons Attribution-ShareAlike 3.0 Unported License.</a:t>
+              <a:rPr lang="zh-CN" altLang="en-US" dirty="0"/>
+              <a:t>测试的精髓</a:t>
             </a:r>
-            <a:br/>
+            <a:br>
+              <a:rPr lang="en-US" altLang="zh-CN" dirty="0"/>
+            </a:br>
             <a:r>
-              <a:rPr b="0" lang="en-US" sz="2200" spc="-1" strike="noStrike">
-                <a:solidFill>
-                  <a:srgbClr val="ffffff"/>
-                </a:solidFill>
-                <a:latin typeface="Arial"/>
-              </a:rPr>
-              <a:t>It makes use of the works of Mateus Machado Luna.</a:t>
+              <a:rPr lang="en-US" altLang="zh-CN" dirty="0"/>
+              <a:t>	----</a:t>
             </a:r>
-            <a:endParaRPr b="0" lang="en-US" sz="2200" spc="-1" strike="noStrike">
-              <a:latin typeface="Arial"/>
-            </a:endParaRPr>
+            <a:r>
+              <a:rPr lang="zh-CN" altLang="en-US" dirty="0"/>
+              <a:t>为被测对象找到一组测试用例</a:t>
+            </a:r>
+          </a:p>
+        </p:txBody>
+      </p:sp>
+      <p:sp>
+        <p:nvSpPr>
+          <p:cNvPr id="3" name="副标题 2">
+            <a:extLst>
+              <a:ext uri="{FF2B5EF4-FFF2-40B4-BE49-F238E27FC236}">
+                <a16:creationId xmlns:a16="http://schemas.microsoft.com/office/drawing/2014/main" id="{33FD1934-327A-4852-A5C0-9BDD371D067A}"/>
+              </a:ext>
+            </a:extLst>
+          </p:cNvPr>
+          <p:cNvSpPr>
+            <a:spLocks noGrp="1"/>
+          </p:cNvSpPr>
+          <p:nvPr>
+            <p:ph type="subTitle"/>
+          </p:nvPr>
+        </p:nvSpPr>
+        <p:spPr/>
+        <p:txBody>
+          <a:bodyPr/>
+          <a:lstStyle/>
+          <a:p>
+            <a:endParaRPr lang="zh-CN" altLang="en-US" dirty="0"/>
           </a:p>
         </p:txBody>
       </p:sp>
       <p:pic>
         <p:nvPicPr>
-          <p:cNvPr id="120" name="" descr=""/>
-          <p:cNvPicPr/>
+          <p:cNvPr id="5" name="图片 4">
+            <a:extLst>
+              <a:ext uri="{FF2B5EF4-FFF2-40B4-BE49-F238E27FC236}">
+                <a16:creationId xmlns:a16="http://schemas.microsoft.com/office/drawing/2014/main" id="{A007A6F7-F954-46A2-A8E2-9B3FFE5B9845}"/>
+              </a:ext>
+            </a:extLst>
+          </p:cNvPr>
+          <p:cNvPicPr>
+            <a:picLocks noChangeAspect="1"/>
+          </p:cNvPicPr>
           <p:nvPr/>
         </p:nvPicPr>
         <p:blipFill>
-          <a:blip r:embed="rId1"/>
-          <a:stretch/>
+          <a:blip r:embed="rId2">
+            <a:extLst>
+              <a:ext uri="{28A0092B-C50C-407E-A947-70E740481C1C}">
+                <a14:useLocalDpi xmlns:a14="http://schemas.microsoft.com/office/drawing/2010/main" val="0"/>
+              </a:ext>
+            </a:extLst>
+          </a:blip>
+          <a:stretch>
+            <a:fillRect/>
+          </a:stretch>
         </p:blipFill>
         <p:spPr>
           <a:xfrm>
-            <a:off x="816120" y="3621600"/>
-            <a:ext cx="1271520" cy="447120"/>
-          </a:xfrm>
-          <a:prstGeom prst="rect">
-            <a:avLst/>
-          </a:prstGeom>
-          <a:ln>
-            <a:noFill/>
-          </a:ln>
+            <a:off x="1894898" y="1768680"/>
+            <a:ext cx="5940110" cy="5489675"/>
+          </a:xfrm>
+          <a:prstGeom prst="rect">
+            <a:avLst/>
+          </a:prstGeom>
         </p:spPr>
       </p:pic>
     </p:spTree>
+    <p:extLst>
+      <p:ext uri="{BB962C8B-B14F-4D97-AF65-F5344CB8AC3E}">
+        <p14:creationId xmlns:p14="http://schemas.microsoft.com/office/powerpoint/2010/main" val="3528611372"/>
+      </p:ext>
+    </p:extLst>
   </p:cSld>
-  <p:timing>
-    <p:tnLst>
-      <p:par>
-        <p:cTn id="5" dur="indefinite" restart="never" nodeType="tmRoot">
-          <p:childTnLst>
-            <p:seq>
-              <p:cTn id="6" dur="indefinite" nodeType="mainSeq"/>
-              <p:prevCondLst>
-                <p:cond delay="0" evt="onPrev">
-                  <p:tgtEl>
-                    <p:sldTgt/>
-                  </p:tgtEl>
-                </p:cond>
-              </p:prevCondLst>
-              <p:nextCondLst>
-                <p:cond delay="0" evt="onNext">
-                  <p:tgtEl>
-                    <p:sldTgt/>
-                  </p:tgtEl>
-                </p:cond>
-              </p:nextCondLst>
-            </p:seq>
-          </p:childTnLst>
-        </p:cTn>
-      </p:par>
-    </p:tnLst>
-  </p:timing>
+  <p:clrMapOvr>
+    <a:masterClrMapping/>
+  </p:clrMapOvr>
 </p:sld>
 </file>
 
@@ -5203,31 +6323,31 @@
         <a:sysClr val="window" lastClr="FFFFFF"/>
       </a:lt1>
       <a:dk2>
-        <a:srgbClr val="1f497d"/>
+        <a:srgbClr val="1F497D"/>
       </a:dk2>
       <a:lt2>
-        <a:srgbClr val="eeece1"/>
+        <a:srgbClr val="EEECE1"/>
       </a:lt2>
       <a:accent1>
-        <a:srgbClr val="4f81bd"/>
+        <a:srgbClr val="4F81BD"/>
       </a:accent1>
       <a:accent2>
-        <a:srgbClr val="c0504d"/>
+        <a:srgbClr val="C0504D"/>
       </a:accent2>
       <a:accent3>
-        <a:srgbClr val="9bbb59"/>
+        <a:srgbClr val="9BBB59"/>
       </a:accent3>
       <a:accent4>
-        <a:srgbClr val="8064a2"/>
+        <a:srgbClr val="8064A2"/>
       </a:accent4>
       <a:accent5>
-        <a:srgbClr val="4bacc6"/>
+        <a:srgbClr val="4BACC6"/>
       </a:accent5>
       <a:accent6>
-        <a:srgbClr val="f79646"/>
+        <a:srgbClr val="F79646"/>
       </a:accent6>
       <a:hlink>
-        <a:srgbClr val="0000ff"/>
+        <a:srgbClr val="0000FF"/>
       </a:hlink>
       <a:folHlink>
         <a:srgbClr val="800080"/>
@@ -5412,6 +6532,8 @@
       </a:bgFillStyleLst>
     </a:fmtScheme>
   </a:themeElements>
+  <a:objectDefaults/>
+  <a:extraClrSchemeLst/>
 </a:theme>
 </file>
 
@@ -5426,31 +6548,31 @@
         <a:sysClr val="window" lastClr="FFFFFF"/>
       </a:lt1>
       <a:dk2>
-        <a:srgbClr val="1f497d"/>
+        <a:srgbClr val="1F497D"/>
       </a:dk2>
       <a:lt2>
-        <a:srgbClr val="eeece1"/>
+        <a:srgbClr val="EEECE1"/>
       </a:lt2>
       <a:accent1>
-        <a:srgbClr val="4f81bd"/>
+        <a:srgbClr val="4F81BD"/>
       </a:accent1>
       <a:accent2>
-        <a:srgbClr val="c0504d"/>
+        <a:srgbClr val="C0504D"/>
       </a:accent2>
       <a:accent3>
-        <a:srgbClr val="9bbb59"/>
+        <a:srgbClr val="9BBB59"/>
       </a:accent3>
       <a:accent4>
-        <a:srgbClr val="8064a2"/>
+        <a:srgbClr val="8064A2"/>
       </a:accent4>
       <a:accent5>
-        <a:srgbClr val="4bacc6"/>
+        <a:srgbClr val="4BACC6"/>
       </a:accent5>
       <a:accent6>
-        <a:srgbClr val="f79646"/>
+        <a:srgbClr val="F79646"/>
       </a:accent6>
       <a:hlink>
-        <a:srgbClr val="0000ff"/>
+        <a:srgbClr val="0000FF"/>
       </a:hlink>
       <a:folHlink>
         <a:srgbClr val="800080"/>
@@ -5635,6 +6757,8 @@
       </a:bgFillStyleLst>
     </a:fmtScheme>
   </a:themeElements>
+  <a:objectDefaults/>
+  <a:extraClrSchemeLst/>
 </a:theme>
 </file>
 
@@ -5649,31 +6773,31 @@
         <a:sysClr val="window" lastClr="FFFFFF"/>
       </a:lt1>
       <a:dk2>
-        <a:srgbClr val="1f497d"/>
+        <a:srgbClr val="1F497D"/>
       </a:dk2>
       <a:lt2>
-        <a:srgbClr val="eeece1"/>
+        <a:srgbClr val="EEECE1"/>
       </a:lt2>
       <a:accent1>
-        <a:srgbClr val="4f81bd"/>
+        <a:srgbClr val="4F81BD"/>
       </a:accent1>
       <a:accent2>
-        <a:srgbClr val="c0504d"/>
+        <a:srgbClr val="C0504D"/>
       </a:accent2>
       <a:accent3>
-        <a:srgbClr val="9bbb59"/>
+        <a:srgbClr val="9BBB59"/>
       </a:accent3>
       <a:accent4>
-        <a:srgbClr val="8064a2"/>
+        <a:srgbClr val="8064A2"/>
       </a:accent4>
       <a:accent5>
-        <a:srgbClr val="4bacc6"/>
+        <a:srgbClr val="4BACC6"/>
       </a:accent5>
       <a:accent6>
-        <a:srgbClr val="f79646"/>
+        <a:srgbClr val="F79646"/>
       </a:accent6>
       <a:hlink>
-        <a:srgbClr val="0000ff"/>
+        <a:srgbClr val="0000FF"/>
       </a:hlink>
       <a:folHlink>
         <a:srgbClr val="800080"/>
@@ -5858,5 +6982,7 @@
       </a:bgFillStyleLst>
     </a:fmtScheme>
   </a:themeElements>
+  <a:objectDefaults/>
+  <a:extraClrSchemeLst/>
 </a:theme>
 </file>
</xml_diff>